<commit_message>
some more stuff in playgound
</commit_message>
<xml_diff>
--- a/Presentation/Getting Started.pptx
+++ b/Presentation/Getting Started.pptx
@@ -223,7 +223,7 @@
           <a:p>
             <a:fld id="{91E551B2-72B9-4805-8062-4939F9ED4BD5}" type="datetimeFigureOut">
               <a:rPr lang="en-US"/>
-              <a:t>11/5/2022</a:t>
+              <a:t>11/7/2022</a:t>
             </a:fld>
             <a:endParaRPr lang="en-US"/>
           </a:p>
@@ -4442,35 +4442,17 @@
           <a:bodyPr/>
           <a:lstStyle/>
           <a:p>
-            <a:r>
-              <a:rPr lang="en-US" dirty="0"/>
-              <a:t>USA map with schools on the map</a:t>
-            </a:r>
-          </a:p>
-          <a:p>
-            <a:pPr lvl="1"/>
-            <a:r>
-              <a:rPr lang="en-US" dirty="0"/>
-              <a:t>Color coded by Quartile</a:t>
-            </a:r>
-          </a:p>
-          <a:p>
-            <a:pPr lvl="1"/>
-            <a:r>
-              <a:rPr lang="en-US" dirty="0"/>
-              <a:t>Quartile 1 is further color-coded by cost bins</a:t>
-            </a:r>
-          </a:p>
-          <a:p>
-            <a:r>
-              <a:rPr lang="en-US" dirty="0"/>
-              <a:t>Histogram of college tuition</a:t>
-            </a:r>
-          </a:p>
-          <a:p>
-            <a:r>
-              <a:rPr lang="en-US" dirty="0"/>
-              <a:t>Box plot of college tuition</a:t>
+            <a:endParaRPr lang="en-US" dirty="0"/>
+          </a:p>
+          <a:p>
+            <a:r>
+              <a:rPr lang="en-US" sz="1800" dirty="0">
+                <a:effectLst/>
+                <a:latin typeface="Gill Alt One MT" panose="020B0502020104020203" pitchFamily="34" charset="0"/>
+                <a:ea typeface="Calibri" panose="020F0502020204030204" pitchFamily="34" charset="0"/>
+                <a:cs typeface="Times New Roman" panose="02020603050405020304" pitchFamily="18" charset="0"/>
+              </a:rPr>
+              <a:t>https://collegescorecard.ed.gov/data/</a:t>
             </a:r>
           </a:p>
           <a:p>
@@ -4501,7 +4483,7 @@
           <a:p>
             <a:r>
               <a:rPr lang="en-US" dirty="0"/>
-              <a:t>Potential figures</a:t>
+              <a:t>Our Data</a:t>
             </a:r>
           </a:p>
         </p:txBody>
@@ -4557,42 +4539,6 @@
           <a:bodyPr/>
           <a:lstStyle/>
           <a:p>
-            <a:r>
-              <a:rPr lang="en-US" dirty="0"/>
-              <a:t>Comparison of Q1 to Q2, Q3, and Q4</a:t>
-            </a:r>
-          </a:p>
-          <a:p>
-            <a:pPr lvl="1"/>
-            <a:r>
-              <a:rPr lang="en-US" dirty="0"/>
-              <a:t>Box plots of:</a:t>
-            </a:r>
-          </a:p>
-          <a:p>
-            <a:pPr lvl="2"/>
-            <a:r>
-              <a:rPr lang="en-US" dirty="0"/>
-              <a:t>Student body Size</a:t>
-            </a:r>
-          </a:p>
-          <a:p>
-            <a:pPr lvl="2"/>
-            <a:r>
-              <a:rPr lang="en-US" dirty="0"/>
-              <a:t>Admission Rate</a:t>
-            </a:r>
-          </a:p>
-          <a:p>
-            <a:pPr lvl="2"/>
-            <a:r>
-              <a:rPr lang="en-US" dirty="0"/>
-              <a:t>Standardized </a:t>
-            </a:r>
-            <a:r>
-              <a:rPr lang="en-US"/>
-              <a:t>Test Score</a:t>
-            </a:r>
             <a:endParaRPr lang="en-US" dirty="0"/>
           </a:p>
         </p:txBody>
@@ -5391,7 +5337,7 @@
           <p:nvPr>
             <p:extLst>
               <p:ext uri="{D42A27DB-BD31-4B8C-83A1-F6EECF244321}">
-                <p14:modId xmlns:p14="http://schemas.microsoft.com/office/powerpoint/2010/main" val="3451975056"/>
+                <p14:modId xmlns:p14="http://schemas.microsoft.com/office/powerpoint/2010/main" val="1254112324"/>
               </p:ext>
             </p:extLst>
           </p:nvPr>
@@ -5508,6 +5454,10 @@
                     <a:lstStyle/>
                     <a:p>
                       <a:pPr algn="ctr"/>
+                      <a:r>
+                        <a:rPr lang="en-US" sz="2400"/>
+                        <a:t>443-932-9523</a:t>
+                      </a:r>
                       <a:endParaRPr lang="en-US" sz="2400" dirty="0"/>
                     </a:p>
                   </a:txBody>
@@ -5552,7 +5502,10 @@
                     <a:lstStyle/>
                     <a:p>
                       <a:pPr algn="ctr"/>
-                      <a:endParaRPr lang="en-US" sz="2400" dirty="0"/>
+                      <a:r>
+                        <a:rPr lang="en-US" sz="2400" dirty="0"/>
+                        <a:t>215-260-8671</a:t>
+                      </a:r>
                     </a:p>
                   </a:txBody>
                   <a:tcPr anchor="ctr"/>
@@ -5601,7 +5554,10 @@
                     <a:lstStyle/>
                     <a:p>
                       <a:pPr algn="ctr"/>
-                      <a:endParaRPr lang="en-US" sz="2400" dirty="0"/>
+                      <a:r>
+                        <a:rPr lang="en-US" sz="2400" dirty="0"/>
+                        <a:t>267-261-7827</a:t>
+                      </a:r>
                     </a:p>
                   </a:txBody>
                   <a:tcPr anchor="ctr"/>

</xml_diff>

<commit_message>
up date to presentation
</commit_message>
<xml_diff>
--- a/Presentation/Getting Started.pptx
+++ b/Presentation/Getting Started.pptx
@@ -5,25 +5,41 @@
     <p:sldMasterId id="2147483673" r:id="rId1"/>
   </p:sldMasterIdLst>
   <p:notesMasterIdLst>
-    <p:notesMasterId r:id="rId18"/>
+    <p:notesMasterId r:id="rId34"/>
   </p:notesMasterIdLst>
   <p:sldIdLst>
-    <p:sldId id="259" r:id="rId2"/>
-    <p:sldId id="260" r:id="rId3"/>
-    <p:sldId id="267" r:id="rId4"/>
-    <p:sldId id="270" r:id="rId5"/>
-    <p:sldId id="273" r:id="rId6"/>
-    <p:sldId id="271" r:id="rId7"/>
-    <p:sldId id="263" r:id="rId8"/>
-    <p:sldId id="265" r:id="rId9"/>
-    <p:sldId id="266" r:id="rId10"/>
-    <p:sldId id="264" r:id="rId11"/>
-    <p:sldId id="269" r:id="rId12"/>
-    <p:sldId id="268" r:id="rId13"/>
-    <p:sldId id="272" r:id="rId14"/>
-    <p:sldId id="274" r:id="rId15"/>
-    <p:sldId id="261" r:id="rId16"/>
-    <p:sldId id="258" r:id="rId17"/>
+    <p:sldId id="267" r:id="rId2"/>
+    <p:sldId id="270" r:id="rId3"/>
+    <p:sldId id="281" r:id="rId4"/>
+    <p:sldId id="276" r:id="rId5"/>
+    <p:sldId id="279" r:id="rId6"/>
+    <p:sldId id="280" r:id="rId7"/>
+    <p:sldId id="277" r:id="rId8"/>
+    <p:sldId id="285" r:id="rId9"/>
+    <p:sldId id="286" r:id="rId10"/>
+    <p:sldId id="278" r:id="rId11"/>
+    <p:sldId id="282" r:id="rId12"/>
+    <p:sldId id="283" r:id="rId13"/>
+    <p:sldId id="290" r:id="rId14"/>
+    <p:sldId id="284" r:id="rId15"/>
+    <p:sldId id="294" r:id="rId16"/>
+    <p:sldId id="287" r:id="rId17"/>
+    <p:sldId id="296" r:id="rId18"/>
+    <p:sldId id="291" r:id="rId19"/>
+    <p:sldId id="298" r:id="rId20"/>
+    <p:sldId id="299" r:id="rId21"/>
+    <p:sldId id="301" r:id="rId22"/>
+    <p:sldId id="300" r:id="rId23"/>
+    <p:sldId id="302" r:id="rId24"/>
+    <p:sldId id="303" r:id="rId25"/>
+    <p:sldId id="292" r:id="rId26"/>
+    <p:sldId id="295" r:id="rId27"/>
+    <p:sldId id="293" r:id="rId28"/>
+    <p:sldId id="297" r:id="rId29"/>
+    <p:sldId id="268" r:id="rId30"/>
+    <p:sldId id="274" r:id="rId31"/>
+    <p:sldId id="261" r:id="rId32"/>
+    <p:sldId id="258" r:id="rId33"/>
   </p:sldIdLst>
   <p:sldSz cx="12192000" cy="6858000"/>
   <p:notesSz cx="6858000" cy="9144000"/>
@@ -190,7 +206,7 @@
             </a:lvl1pPr>
           </a:lstStyle>
           <a:p>
-            <a:endParaRPr lang="en-US"/>
+            <a:endParaRPr lang="en-US" dirty="0"/>
           </a:p>
         </p:txBody>
       </p:sp>
@@ -223,9 +239,9 @@
           <a:p>
             <a:fld id="{91E551B2-72B9-4805-8062-4939F9ED4BD5}" type="datetimeFigureOut">
               <a:rPr lang="en-US"/>
-              <a:t>11/7/2022</a:t>
+              <a:t>11/10/2022</a:t>
             </a:fld>
-            <a:endParaRPr lang="en-US"/>
+            <a:endParaRPr lang="en-US" dirty="0"/>
           </a:p>
         </p:txBody>
       </p:sp>
@@ -258,7 +274,7 @@
           <a:bodyPr vert="horz" lIns="91440" tIns="45720" rIns="91440" bIns="45720" rtlCol="0" anchor="ctr"/>
           <a:lstStyle/>
           <a:p>
-            <a:endParaRPr lang="en-US"/>
+            <a:endParaRPr lang="en-US" dirty="0"/>
           </a:p>
         </p:txBody>
       </p:sp>
@@ -348,7 +364,7 @@
             </a:lvl1pPr>
           </a:lstStyle>
           <a:p>
-            <a:endParaRPr lang="en-US"/>
+            <a:endParaRPr lang="en-US" dirty="0"/>
           </a:p>
         </p:txBody>
       </p:sp>
@@ -383,7 +399,7 @@
               <a:rPr lang="en-US"/>
               <a:t>‹#›</a:t>
             </a:fld>
-            <a:endParaRPr lang="en-US"/>
+            <a:endParaRPr lang="en-US" dirty="0"/>
           </a:p>
         </p:txBody>
       </p:sp>
@@ -509,6 +525,93 @@
       </p:grpSpPr>
       <p:sp>
         <p:nvSpPr>
+          <p:cNvPr id="2" name="Slide Image Placeholder 1"/>
+          <p:cNvSpPr>
+            <a:spLocks noGrp="1" noRot="1" noChangeAspect="1"/>
+          </p:cNvSpPr>
+          <p:nvPr>
+            <p:ph type="sldImg"/>
+          </p:nvPr>
+        </p:nvSpPr>
+        <p:spPr/>
+      </p:sp>
+      <p:sp>
+        <p:nvSpPr>
+          <p:cNvPr id="3" name="Notes Placeholder 2"/>
+          <p:cNvSpPr>
+            <a:spLocks noGrp="1"/>
+          </p:cNvSpPr>
+          <p:nvPr>
+            <p:ph type="body" idx="1"/>
+          </p:nvPr>
+        </p:nvSpPr>
+        <p:spPr/>
+        <p:txBody>
+          <a:bodyPr/>
+          <a:lstStyle/>
+          <a:p>
+            <a:r>
+              <a:rPr lang="en-US" dirty="0"/>
+              <a:t>The College Scorecard project is designed to increase transparency, putting the power in the hands of students and families to compare how well individual postsecondary institutions are preparing their students to be successful. This project provides data to help students and families compare college costs and outcomes as they weigh the tradeoffs of different colleges, accounting for their own needs and educational goals. </a:t>
+            </a:r>
+          </a:p>
+        </p:txBody>
+      </p:sp>
+      <p:sp>
+        <p:nvSpPr>
+          <p:cNvPr id="4" name="Slide Number Placeholder 3"/>
+          <p:cNvSpPr>
+            <a:spLocks noGrp="1"/>
+          </p:cNvSpPr>
+          <p:nvPr>
+            <p:ph type="sldNum" sz="quarter" idx="5"/>
+          </p:nvPr>
+        </p:nvSpPr>
+        <p:spPr/>
+        <p:txBody>
+          <a:bodyPr/>
+          <a:lstStyle/>
+          <a:p>
+            <a:fld id="{9AC5F7B5-7C12-4AF2-B6DF-8CC8390A6C8D}" type="slidenum">
+              <a:rPr lang="en-US" smtClean="0"/>
+              <a:t>17</a:t>
+            </a:fld>
+            <a:endParaRPr lang="en-US"/>
+          </a:p>
+        </p:txBody>
+      </p:sp>
+    </p:spTree>
+    <p:extLst>
+      <p:ext uri="{BB962C8B-B14F-4D97-AF65-F5344CB8AC3E}">
+        <p14:creationId xmlns:p14="http://schemas.microsoft.com/office/powerpoint/2010/main" val="490107137"/>
+      </p:ext>
+    </p:extLst>
+  </p:cSld>
+  <p:clrMapOvr>
+    <a:masterClrMapping/>
+  </p:clrMapOvr>
+</p:notes>
+</file>
+
+<file path=ppt/notesSlides/notesSlide2.xml><?xml version="1.0" encoding="utf-8"?>
+<p:notes xmlns:a="http://schemas.openxmlformats.org/drawingml/2006/main" xmlns:r="http://schemas.openxmlformats.org/officeDocument/2006/relationships" xmlns:p="http://schemas.openxmlformats.org/presentationml/2006/main">
+  <p:cSld>
+    <p:spTree>
+      <p:nvGrpSpPr>
+        <p:cNvPr id="1" name=""/>
+        <p:cNvGrpSpPr/>
+        <p:nvPr/>
+      </p:nvGrpSpPr>
+      <p:grpSpPr>
+        <a:xfrm>
+          <a:off x="0" y="0"/>
+          <a:ext cx="0" cy="0"/>
+          <a:chOff x="0" y="0"/>
+          <a:chExt cx="0" cy="0"/>
+        </a:xfrm>
+      </p:grpSpPr>
+      <p:sp>
+        <p:nvSpPr>
           <p:cNvPr id="7" name="Rectangle 5"/>
           <p:cNvSpPr>
             <a:spLocks noGrp="1" noChangeArrowheads="1"/>
@@ -527,9 +630,9 @@
             <a:fld id="{7F1FCCB6-F9A8-465F-861C-256322524500}" type="slidenum">
               <a:rPr lang="en-US"/>
               <a:pPr/>
-              <a:t>15</a:t>
+              <a:t>31</a:t>
             </a:fld>
-            <a:endParaRPr lang="en-US"/>
+            <a:endParaRPr lang="en-US" dirty="0"/>
           </a:p>
         </p:txBody>
       </p:sp>
@@ -658,7 +761,76 @@
           <a:lstStyle/>
           <a:p>
             <a:pPr algn="ctr"/>
-            <a:endParaRPr lang="en-US" sz="1800"/>
+            <a:endParaRPr lang="en-US" sz="1800" dirty="0"/>
+          </a:p>
+        </p:txBody>
+      </p:sp>
+      <p:sp>
+        <p:nvSpPr>
+          <p:cNvPr id="3" name="Rectangle 2"/>
+          <p:cNvSpPr/>
+          <p:nvPr userDrawn="1"/>
+        </p:nvSpPr>
+        <p:spPr>
+          <a:xfrm>
+            <a:off x="7821637" y="6133515"/>
+            <a:ext cx="4351607" cy="604911"/>
+          </a:xfrm>
+          <a:prstGeom prst="rect">
+            <a:avLst/>
+          </a:prstGeom>
+          <a:solidFill>
+            <a:schemeClr val="bg1"/>
+          </a:solidFill>
+          <a:ln>
+            <a:solidFill>
+              <a:schemeClr val="bg1"/>
+            </a:solidFill>
+          </a:ln>
+        </p:spPr>
+        <p:txBody>
+          <a:bodyPr rtlCol="0" anchor="ctr"/>
+          <a:lstStyle/>
+          <a:p>
+            <a:pPr algn="ctr"/>
+            <a:endParaRPr lang="en-US" sz="1800" dirty="0"/>
+          </a:p>
+        </p:txBody>
+      </p:sp>
+      <p:sp>
+        <p:nvSpPr>
+          <p:cNvPr id="12" name="Picture Placeholder 11"/>
+          <p:cNvSpPr>
+            <a:spLocks noGrp="1"/>
+          </p:cNvSpPr>
+          <p:nvPr>
+            <p:ph type="pic" sz="quarter" idx="12"/>
+          </p:nvPr>
+        </p:nvSpPr>
+        <p:spPr>
+          <a:xfrm>
+            <a:off x="5341862" y="1073831"/>
+            <a:ext cx="5437717" cy="4616450"/>
+          </a:xfrm>
+          <a:prstGeom prst="rect">
+            <a:avLst/>
+          </a:prstGeom>
+          <a:noFill/>
+        </p:spPr>
+        <p:txBody>
+          <a:bodyPr/>
+          <a:lstStyle>
+            <a:lvl1pPr marL="0" indent="0">
+              <a:buFont typeface="+mj-lt"/>
+              <a:buNone/>
+              <a:defRPr/>
+            </a:lvl1pPr>
+          </a:lstStyle>
+          <a:p>
+            <a:r>
+              <a:rPr lang="en-US" dirty="0"/>
+              <a:t>Click icon to add picture</a:t>
+            </a:r>
           </a:p>
         </p:txBody>
       </p:sp>
@@ -725,76 +897,6 @@
               <a:t>Project 1: Undergrad Tuition</a:t>
             </a:r>
             <a:endParaRPr lang="de-DE" noProof="0" dirty="0"/>
-          </a:p>
-        </p:txBody>
-      </p:sp>
-      <p:sp>
-        <p:nvSpPr>
-          <p:cNvPr id="3" name="Rectangle 2"/>
-          <p:cNvSpPr/>
-          <p:nvPr userDrawn="1"/>
-        </p:nvSpPr>
-        <p:spPr>
-          <a:xfrm>
-            <a:off x="7821637" y="6133515"/>
-            <a:ext cx="4351607" cy="604911"/>
-          </a:xfrm>
-          <a:prstGeom prst="rect">
-            <a:avLst/>
-          </a:prstGeom>
-          <a:solidFill>
-            <a:schemeClr val="bg1"/>
-          </a:solidFill>
-          <a:ln>
-            <a:solidFill>
-              <a:schemeClr val="bg1"/>
-            </a:solidFill>
-          </a:ln>
-        </p:spPr>
-        <p:txBody>
-          <a:bodyPr rtlCol="0" anchor="ctr"/>
-          <a:lstStyle/>
-          <a:p>
-            <a:pPr algn="ctr"/>
-            <a:endParaRPr lang="en-US" sz="1800"/>
-          </a:p>
-        </p:txBody>
-      </p:sp>
-      <p:sp>
-        <p:nvSpPr>
-          <p:cNvPr id="12" name="Picture Placeholder 11"/>
-          <p:cNvSpPr>
-            <a:spLocks noGrp="1"/>
-          </p:cNvSpPr>
-          <p:nvPr>
-            <p:ph type="pic" sz="quarter" idx="12"/>
-          </p:nvPr>
-        </p:nvSpPr>
-        <p:spPr>
-          <a:xfrm>
-            <a:off x="5341862" y="1073831"/>
-            <a:ext cx="5437717" cy="4616450"/>
-          </a:xfrm>
-          <a:prstGeom prst="rect">
-            <a:avLst/>
-          </a:prstGeom>
-          <a:noFill/>
-        </p:spPr>
-        <p:txBody>
-          <a:bodyPr/>
-          <a:lstStyle>
-            <a:lvl1pPr marL="0" indent="0">
-              <a:buFont typeface="+mj-lt"/>
-              <a:buNone/>
-              <a:defRPr/>
-            </a:lvl1pPr>
-          </a:lstStyle>
-          <a:p>
-            <a:r>
-              <a:rPr lang="en-US"/>
-              <a:t>Click icon to add picture</a:t>
-            </a:r>
-            <a:endParaRPr lang="en-US" dirty="0"/>
           </a:p>
         </p:txBody>
       </p:sp>
@@ -3491,7 +3593,7 @@
           <a:lstStyle/>
           <a:p>
             <a:pPr algn="ctr"/>
-            <a:endParaRPr lang="en-US" sz="1800"/>
+            <a:endParaRPr lang="en-US" sz="1800" dirty="0"/>
           </a:p>
         </p:txBody>
       </p:sp>
@@ -4112,7 +4214,13 @@
       </p:grpSpPr>
       <p:sp>
         <p:nvSpPr>
-          <p:cNvPr id="6" name="Text Placeholder 5"/>
+          <p:cNvPr id="2" name="Text Placeholder 1">
+            <a:extLst>
+              <a:ext uri="{FF2B5EF4-FFF2-40B4-BE49-F238E27FC236}">
+                <a16:creationId xmlns:a16="http://schemas.microsoft.com/office/drawing/2014/main" id="{AFA7E690-C4F9-4CFF-9D6F-18BC72A74884}"/>
+              </a:ext>
+            </a:extLst>
+          </p:cNvPr>
           <p:cNvSpPr>
             <a:spLocks noGrp="1"/>
           </p:cNvSpPr>
@@ -4125,26 +4233,55 @@
           <a:bodyPr/>
           <a:lstStyle/>
           <a:p>
-            <a:endParaRPr lang="en-US"/>
-          </a:p>
-        </p:txBody>
-      </p:sp>
-      <p:sp>
-        <p:nvSpPr>
-          <p:cNvPr id="9" name="Picture Placeholder 8"/>
-          <p:cNvSpPr>
-            <a:spLocks noGrp="1"/>
-          </p:cNvSpPr>
-          <p:nvPr>
-            <p:ph type="pic" sz="quarter" idx="12"/>
-          </p:nvPr>
-        </p:nvSpPr>
-        <p:spPr/>
-      </p:sp>
+            <a:r>
+              <a:rPr lang="en-US" dirty="0"/>
+              <a:t>Project 1</a:t>
+            </a:r>
+          </a:p>
+        </p:txBody>
+      </p:sp>
+      <p:pic>
+        <p:nvPicPr>
+          <p:cNvPr id="3" name="Picture 2">
+            <a:extLst>
+              <a:ext uri="{FF2B5EF4-FFF2-40B4-BE49-F238E27FC236}">
+                <a16:creationId xmlns:a16="http://schemas.microsoft.com/office/drawing/2014/main" id="{A72588A5-3FB2-4DB2-8927-ED41D5DD63A3}"/>
+              </a:ext>
+            </a:extLst>
+          </p:cNvPr>
+          <p:cNvPicPr>
+            <a:picLocks noChangeAspect="1"/>
+          </p:cNvPicPr>
+          <p:nvPr/>
+        </p:nvPicPr>
+        <p:blipFill>
+          <a:blip r:embed="rId2">
+            <a:duotone>
+              <a:schemeClr val="accent6">
+                <a:shade val="45000"/>
+                <a:satMod val="135000"/>
+              </a:schemeClr>
+              <a:prstClr val="white"/>
+            </a:duotone>
+          </a:blip>
+          <a:stretch>
+            <a:fillRect/>
+          </a:stretch>
+        </p:blipFill>
+        <p:spPr>
+          <a:xfrm>
+            <a:off x="5739619" y="885825"/>
+            <a:ext cx="4876800" cy="4876800"/>
+          </a:xfrm>
+          <a:prstGeom prst="rect">
+            <a:avLst/>
+          </a:prstGeom>
+        </p:spPr>
+      </p:pic>
     </p:spTree>
     <p:extLst>
       <p:ext uri="{BB962C8B-B14F-4D97-AF65-F5344CB8AC3E}">
-        <p14:creationId xmlns:p14="http://schemas.microsoft.com/office/powerpoint/2010/main" val="4235324288"/>
+        <p14:creationId xmlns:p14="http://schemas.microsoft.com/office/powerpoint/2010/main" val="3032142056"/>
       </p:ext>
     </p:extLst>
   </p:cSld>
@@ -4176,7 +4313,7 @@
           <p:cNvPr id="3" name="Picture 2">
             <a:extLst>
               <a:ext uri="{FF2B5EF4-FFF2-40B4-BE49-F238E27FC236}">
-                <a16:creationId xmlns:a16="http://schemas.microsoft.com/office/drawing/2014/main" id="{4E24E1A5-FBE8-400E-9062-CE26E54CD788}"/>
+                <a16:creationId xmlns:a16="http://schemas.microsoft.com/office/drawing/2014/main" id="{CFA76F85-2BB7-4C0D-9819-344E941CD0D7}"/>
               </a:ext>
             </a:extLst>
           </p:cNvPr>
@@ -4193,8 +4330,8 @@
         </p:blipFill>
         <p:spPr>
           <a:xfrm>
-            <a:off x="914399" y="226568"/>
-            <a:ext cx="9910713" cy="5528009"/>
+            <a:off x="1362666" y="1019476"/>
+            <a:ext cx="9466667" cy="4819048"/>
           </a:xfrm>
           <a:prstGeom prst="rect">
             <a:avLst/>
@@ -4204,7 +4341,7 @@
     </p:spTree>
     <p:extLst>
       <p:ext uri="{BB962C8B-B14F-4D97-AF65-F5344CB8AC3E}">
-        <p14:creationId xmlns:p14="http://schemas.microsoft.com/office/powerpoint/2010/main" val="4211070273"/>
+        <p14:creationId xmlns:p14="http://schemas.microsoft.com/office/powerpoint/2010/main" val="97304364"/>
       </p:ext>
     </p:extLst>
   </p:cSld>
@@ -4233,138 +4370,57 @@
       </p:grpSpPr>
       <p:sp>
         <p:nvSpPr>
-          <p:cNvPr id="2" name="Title 1">
+          <p:cNvPr id="2" name="TextBox 1">
             <a:extLst>
               <a:ext uri="{FF2B5EF4-FFF2-40B4-BE49-F238E27FC236}">
-                <a16:creationId xmlns:a16="http://schemas.microsoft.com/office/drawing/2014/main" id="{1530752A-34D6-41D7-AE5A-2F36997FB136}"/>
+                <a16:creationId xmlns:a16="http://schemas.microsoft.com/office/drawing/2014/main" id="{DA2BD6CD-CB1E-4C42-AAF0-6B2B67A938CE}"/>
               </a:ext>
             </a:extLst>
           </p:cNvPr>
-          <p:cNvSpPr>
-            <a:spLocks noGrp="1"/>
-          </p:cNvSpPr>
-          <p:nvPr>
-            <p:ph type="title"/>
-          </p:nvPr>
-        </p:nvSpPr>
-        <p:spPr/>
-        <p:txBody>
-          <a:bodyPr/>
-          <a:lstStyle/>
+          <p:cNvSpPr txBox="1"/>
+          <p:nvPr/>
+        </p:nvSpPr>
+        <p:spPr>
+          <a:xfrm>
+            <a:off x="1270000" y="1217788"/>
+            <a:ext cx="9448800" cy="3279424"/>
+          </a:xfrm>
+          <a:prstGeom prst="rect">
+            <a:avLst/>
+          </a:prstGeom>
+          <a:noFill/>
+        </p:spPr>
+        <p:txBody>
+          <a:bodyPr wrap="square" rtlCol="0">
+            <a:spAutoFit/>
+          </a:bodyPr>
+          <a:lstStyle>
+            <a:defPPr>
+              <a:defRPr lang="en-US"/>
+            </a:defPPr>
+            <a:lvl1pPr algn="ctr">
+              <a:lnSpc>
+                <a:spcPct val="150000"/>
+              </a:lnSpc>
+              <a:defRPr sz="4800" b="1">
+                <a:solidFill>
+                  <a:schemeClr val="accent6"/>
+                </a:solidFill>
+              </a:defRPr>
+            </a:lvl1pPr>
+          </a:lstStyle>
           <a:p>
             <a:r>
               <a:rPr lang="en-US" dirty="0"/>
-              <a:t>Git Repo Structure</a:t>
-            </a:r>
-          </a:p>
-        </p:txBody>
-      </p:sp>
-      <p:pic>
-        <p:nvPicPr>
-          <p:cNvPr id="8" name="Picture 7">
-            <a:extLst>
-              <a:ext uri="{FF2B5EF4-FFF2-40B4-BE49-F238E27FC236}">
-                <a16:creationId xmlns:a16="http://schemas.microsoft.com/office/drawing/2014/main" id="{C27A042E-79BB-4078-929E-3A0D37F56164}"/>
-              </a:ext>
-            </a:extLst>
-          </p:cNvPr>
-          <p:cNvPicPr>
-            <a:picLocks noChangeAspect="1"/>
-          </p:cNvPicPr>
-          <p:nvPr/>
-        </p:nvPicPr>
-        <p:blipFill>
-          <a:blip r:embed="rId2"/>
-          <a:stretch>
-            <a:fillRect/>
-          </a:stretch>
-        </p:blipFill>
-        <p:spPr>
-          <a:xfrm>
-            <a:off x="878795" y="1357845"/>
-            <a:ext cx="10076190" cy="2238095"/>
-          </a:xfrm>
-          <a:prstGeom prst="rect">
-            <a:avLst/>
-          </a:prstGeom>
-          <a:noFill/>
-          <a:ln>
-            <a:solidFill>
-              <a:schemeClr val="accent6"/>
-            </a:solidFill>
-          </a:ln>
-        </p:spPr>
-      </p:pic>
-      <p:pic>
-        <p:nvPicPr>
-          <p:cNvPr id="10" name="Picture 9">
-            <a:extLst>
-              <a:ext uri="{FF2B5EF4-FFF2-40B4-BE49-F238E27FC236}">
-                <a16:creationId xmlns:a16="http://schemas.microsoft.com/office/drawing/2014/main" id="{54BEB54D-145F-4A4F-8AD5-8B81336B7950}"/>
-              </a:ext>
-            </a:extLst>
-          </p:cNvPr>
-          <p:cNvPicPr>
-            <a:picLocks noChangeAspect="1"/>
-          </p:cNvPicPr>
-          <p:nvPr/>
-        </p:nvPicPr>
-        <p:blipFill>
-          <a:blip r:embed="rId3"/>
-          <a:stretch>
-            <a:fillRect/>
-          </a:stretch>
-        </p:blipFill>
-        <p:spPr>
-          <a:xfrm>
-            <a:off x="878795" y="3926981"/>
-            <a:ext cx="7322525" cy="1085300"/>
-          </a:xfrm>
-          <a:prstGeom prst="rect">
-            <a:avLst/>
-          </a:prstGeom>
-          <a:noFill/>
-          <a:ln>
-            <a:solidFill>
-              <a:schemeClr val="accent6"/>
-            </a:solidFill>
-          </a:ln>
-        </p:spPr>
-      </p:pic>
-      <p:pic>
-        <p:nvPicPr>
-          <p:cNvPr id="12" name="Picture 11">
-            <a:extLst>
-              <a:ext uri="{FF2B5EF4-FFF2-40B4-BE49-F238E27FC236}">
-                <a16:creationId xmlns:a16="http://schemas.microsoft.com/office/drawing/2014/main" id="{D2550DB9-121E-44A9-A7AD-30A85ADD986D}"/>
-              </a:ext>
-            </a:extLst>
-          </p:cNvPr>
-          <p:cNvPicPr>
-            <a:picLocks noChangeAspect="1"/>
-          </p:cNvPicPr>
-          <p:nvPr/>
-        </p:nvPicPr>
-        <p:blipFill>
-          <a:blip r:embed="rId4"/>
-          <a:stretch>
-            <a:fillRect/>
-          </a:stretch>
-        </p:blipFill>
-        <p:spPr>
-          <a:xfrm>
-            <a:off x="8533388" y="3926981"/>
-            <a:ext cx="2666667" cy="1771429"/>
-          </a:xfrm>
-          <a:prstGeom prst="rect">
-            <a:avLst/>
-          </a:prstGeom>
-        </p:spPr>
-      </p:pic>
+              <a:t>Are there options that won’t leave me in debt for the rest of my life?</a:t>
+            </a:r>
+          </a:p>
+        </p:txBody>
+      </p:sp>
     </p:spTree>
     <p:extLst>
       <p:ext uri="{BB962C8B-B14F-4D97-AF65-F5344CB8AC3E}">
-        <p14:creationId xmlns:p14="http://schemas.microsoft.com/office/powerpoint/2010/main" val="764045507"/>
+        <p14:creationId xmlns:p14="http://schemas.microsoft.com/office/powerpoint/2010/main" val="612734563"/>
       </p:ext>
     </p:extLst>
   </p:cSld>
@@ -4391,10 +4447,59 @@
           <a:chExt cx="0" cy="0"/>
         </a:xfrm>
       </p:grpSpPr>
+      <p:sp>
+        <p:nvSpPr>
+          <p:cNvPr id="2" name="TextBox 1">
+            <a:extLst>
+              <a:ext uri="{FF2B5EF4-FFF2-40B4-BE49-F238E27FC236}">
+                <a16:creationId xmlns:a16="http://schemas.microsoft.com/office/drawing/2014/main" id="{DA2BD6CD-CB1E-4C42-AAF0-6B2B67A938CE}"/>
+              </a:ext>
+            </a:extLst>
+          </p:cNvPr>
+          <p:cNvSpPr txBox="1"/>
+          <p:nvPr/>
+        </p:nvSpPr>
+        <p:spPr>
+          <a:xfrm>
+            <a:off x="1619250" y="1217788"/>
+            <a:ext cx="8953500" cy="3279424"/>
+          </a:xfrm>
+          <a:prstGeom prst="rect">
+            <a:avLst/>
+          </a:prstGeom>
+          <a:noFill/>
+        </p:spPr>
+        <p:txBody>
+          <a:bodyPr wrap="square" rtlCol="0">
+            <a:spAutoFit/>
+          </a:bodyPr>
+          <a:lstStyle>
+            <a:defPPr>
+              <a:defRPr lang="en-US"/>
+            </a:defPPr>
+            <a:lvl1pPr algn="ctr">
+              <a:lnSpc>
+                <a:spcPct val="150000"/>
+              </a:lnSpc>
+              <a:defRPr sz="4800" b="1">
+                <a:solidFill>
+                  <a:schemeClr val="accent6"/>
+                </a:solidFill>
+              </a:defRPr>
+            </a:lvl1pPr>
+          </a:lstStyle>
+          <a:p>
+            <a:r>
+              <a:rPr lang="en-US" dirty="0"/>
+              <a:t>What compromises, if any, do I have to make to stay out of debt?</a:t>
+            </a:r>
+          </a:p>
+        </p:txBody>
+      </p:sp>
     </p:spTree>
     <p:extLst>
       <p:ext uri="{BB962C8B-B14F-4D97-AF65-F5344CB8AC3E}">
-        <p14:creationId xmlns:p14="http://schemas.microsoft.com/office/powerpoint/2010/main" val="3949269715"/>
+        <p14:creationId xmlns:p14="http://schemas.microsoft.com/office/powerpoint/2010/main" val="3122101512"/>
       </p:ext>
     </p:extLst>
   </p:cSld>
@@ -4423,67 +4528,49 @@
       </p:grpSpPr>
       <p:sp>
         <p:nvSpPr>
-          <p:cNvPr id="2" name="Content Placeholder 1">
+          <p:cNvPr id="2" name="TextBox 1">
             <a:extLst>
               <a:ext uri="{FF2B5EF4-FFF2-40B4-BE49-F238E27FC236}">
-                <a16:creationId xmlns:a16="http://schemas.microsoft.com/office/drawing/2014/main" id="{1D4E6E47-BCC3-49DE-8172-13468A3DED5B}"/>
+                <a16:creationId xmlns:a16="http://schemas.microsoft.com/office/drawing/2014/main" id="{DA2BD6CD-CB1E-4C42-AAF0-6B2B67A938CE}"/>
               </a:ext>
             </a:extLst>
           </p:cNvPr>
-          <p:cNvSpPr>
-            <a:spLocks noGrp="1"/>
-          </p:cNvSpPr>
-          <p:nvPr>
-            <p:ph idx="1"/>
-          </p:nvPr>
-        </p:nvSpPr>
-        <p:spPr/>
-        <p:txBody>
-          <a:bodyPr/>
-          <a:lstStyle/>
-          <a:p>
-            <a:endParaRPr lang="en-US" dirty="0"/>
-          </a:p>
-          <a:p>
-            <a:r>
-              <a:rPr lang="en-US" sz="1800" dirty="0">
-                <a:effectLst/>
-                <a:latin typeface="Gill Alt One MT" panose="020B0502020104020203" pitchFamily="34" charset="0"/>
-                <a:ea typeface="Calibri" panose="020F0502020204030204" pitchFamily="34" charset="0"/>
-                <a:cs typeface="Times New Roman" panose="02020603050405020304" pitchFamily="18" charset="0"/>
-              </a:rPr>
-              <a:t>https://collegescorecard.ed.gov/data/</a:t>
-            </a:r>
-          </a:p>
-          <a:p>
-            <a:endParaRPr lang="en-US" dirty="0"/>
-          </a:p>
-        </p:txBody>
-      </p:sp>
-      <p:sp>
-        <p:nvSpPr>
-          <p:cNvPr id="3" name="Title 2">
-            <a:extLst>
-              <a:ext uri="{FF2B5EF4-FFF2-40B4-BE49-F238E27FC236}">
-                <a16:creationId xmlns:a16="http://schemas.microsoft.com/office/drawing/2014/main" id="{5CC16D2A-5756-4AB7-B5BC-54FAEE8709AD}"/>
-              </a:ext>
-            </a:extLst>
-          </p:cNvPr>
-          <p:cNvSpPr>
-            <a:spLocks noGrp="1"/>
-          </p:cNvSpPr>
-          <p:nvPr>
-            <p:ph type="title"/>
-          </p:nvPr>
-        </p:nvSpPr>
-        <p:spPr/>
-        <p:txBody>
-          <a:bodyPr/>
-          <a:lstStyle/>
+          <p:cNvSpPr txBox="1"/>
+          <p:nvPr/>
+        </p:nvSpPr>
+        <p:spPr>
+          <a:xfrm>
+            <a:off x="2290762" y="1771786"/>
+            <a:ext cx="7610475" cy="2171428"/>
+          </a:xfrm>
+          <a:prstGeom prst="rect">
+            <a:avLst/>
+          </a:prstGeom>
+          <a:noFill/>
+        </p:spPr>
+        <p:txBody>
+          <a:bodyPr wrap="square" rtlCol="0">
+            <a:spAutoFit/>
+          </a:bodyPr>
+          <a:lstStyle>
+            <a:defPPr>
+              <a:defRPr lang="en-US"/>
+            </a:defPPr>
+            <a:lvl1pPr algn="ctr">
+              <a:lnSpc>
+                <a:spcPct val="150000"/>
+              </a:lnSpc>
+              <a:defRPr sz="4800" b="1">
+                <a:solidFill>
+                  <a:schemeClr val="accent6"/>
+                </a:solidFill>
+              </a:defRPr>
+            </a:lvl1pPr>
+          </a:lstStyle>
           <a:p>
             <a:r>
               <a:rPr lang="en-US" dirty="0"/>
-              <a:t>Our Data</a:t>
+              <a:t>If there are options, can I get in?</a:t>
             </a:r>
           </a:p>
         </p:txBody>
@@ -4491,7 +4578,7 @@
     </p:spTree>
     <p:extLst>
       <p:ext uri="{BB962C8B-B14F-4D97-AF65-F5344CB8AC3E}">
-        <p14:creationId xmlns:p14="http://schemas.microsoft.com/office/powerpoint/2010/main" val="1007975194"/>
+        <p14:creationId xmlns:p14="http://schemas.microsoft.com/office/powerpoint/2010/main" val="2492401609"/>
       </p:ext>
     </p:extLst>
   </p:cSld>
@@ -4520,53 +4607,56 @@
       </p:grpSpPr>
       <p:sp>
         <p:nvSpPr>
-          <p:cNvPr id="2" name="Content Placeholder 1">
+          <p:cNvPr id="2" name="TextBox 1">
             <a:extLst>
               <a:ext uri="{FF2B5EF4-FFF2-40B4-BE49-F238E27FC236}">
-                <a16:creationId xmlns:a16="http://schemas.microsoft.com/office/drawing/2014/main" id="{0DBAF39D-5F98-4E1B-9ABF-8AA7152B85E4}"/>
+                <a16:creationId xmlns:a16="http://schemas.microsoft.com/office/drawing/2014/main" id="{DA2BD6CD-CB1E-4C42-AAF0-6B2B67A938CE}"/>
               </a:ext>
             </a:extLst>
           </p:cNvPr>
-          <p:cNvSpPr>
-            <a:spLocks noGrp="1"/>
-          </p:cNvSpPr>
-          <p:nvPr>
-            <p:ph idx="1"/>
-          </p:nvPr>
-        </p:nvSpPr>
-        <p:spPr/>
-        <p:txBody>
-          <a:bodyPr/>
-          <a:lstStyle/>
-          <a:p>
-            <a:endParaRPr lang="en-US" dirty="0"/>
-          </a:p>
-        </p:txBody>
-      </p:sp>
-      <p:sp>
-        <p:nvSpPr>
-          <p:cNvPr id="3" name="Title 2">
-            <a:extLst>
-              <a:ext uri="{FF2B5EF4-FFF2-40B4-BE49-F238E27FC236}">
-                <a16:creationId xmlns:a16="http://schemas.microsoft.com/office/drawing/2014/main" id="{ABA857AD-AE79-4871-A159-61A8AD407E99}"/>
-              </a:ext>
-            </a:extLst>
-          </p:cNvPr>
-          <p:cNvSpPr>
-            <a:spLocks noGrp="1"/>
-          </p:cNvSpPr>
-          <p:nvPr>
-            <p:ph type="title"/>
-          </p:nvPr>
-        </p:nvSpPr>
-        <p:spPr/>
-        <p:txBody>
-          <a:bodyPr/>
-          <a:lstStyle/>
+          <p:cNvSpPr txBox="1"/>
+          <p:nvPr/>
+        </p:nvSpPr>
+        <p:spPr>
+          <a:xfrm>
+            <a:off x="1619250" y="1771786"/>
+            <a:ext cx="8953500" cy="2171428"/>
+          </a:xfrm>
+          <a:prstGeom prst="rect">
+            <a:avLst/>
+          </a:prstGeom>
+          <a:noFill/>
+        </p:spPr>
+        <p:txBody>
+          <a:bodyPr wrap="square" rtlCol="0">
+            <a:spAutoFit/>
+          </a:bodyPr>
+          <a:lstStyle>
+            <a:defPPr>
+              <a:defRPr lang="en-US"/>
+            </a:defPPr>
+            <a:lvl1pPr algn="ctr">
+              <a:lnSpc>
+                <a:spcPct val="150000"/>
+              </a:lnSpc>
+              <a:defRPr sz="4800" b="1">
+                <a:solidFill>
+                  <a:schemeClr val="accent6"/>
+                </a:solidFill>
+              </a:defRPr>
+            </a:lvl1pPr>
+          </a:lstStyle>
           <a:p>
             <a:r>
               <a:rPr lang="en-US" dirty="0"/>
-              <a:t>Potential Statistics</a:t>
+              <a:t>If there are options,</a:t>
+            </a:r>
+            <a:br>
+              <a:rPr lang="en-US" dirty="0"/>
+            </a:br>
+            <a:r>
+              <a:rPr lang="en-US" dirty="0"/>
+              <a:t>I’m I likely to graduate?</a:t>
             </a:r>
           </a:p>
         </p:txBody>
@@ -4574,7 +4664,7 @@
     </p:spTree>
     <p:extLst>
       <p:ext uri="{BB962C8B-B14F-4D97-AF65-F5344CB8AC3E}">
-        <p14:creationId xmlns:p14="http://schemas.microsoft.com/office/powerpoint/2010/main" val="3603813485"/>
+        <p14:creationId xmlns:p14="http://schemas.microsoft.com/office/powerpoint/2010/main" val="1411858660"/>
       </p:ext>
     </p:extLst>
   </p:cSld>
@@ -4603,45 +4693,49 @@
       </p:grpSpPr>
       <p:sp>
         <p:nvSpPr>
-          <p:cNvPr id="1682440" name="Rectangle 8"/>
-          <p:cNvSpPr>
-            <a:spLocks noGrp="1" noChangeArrowheads="1"/>
-          </p:cNvSpPr>
-          <p:nvPr>
-            <p:ph type="title"/>
-          </p:nvPr>
-        </p:nvSpPr>
-        <p:spPr/>
-        <p:txBody>
-          <a:bodyPr/>
-          <a:lstStyle/>
-          <a:p>
-            <a:r>
-              <a:rPr lang="en-US"/>
-              <a:t>“… when an online service is free, you’re not the customer. You’re the product.”</a:t>
-            </a:r>
-            <a:endParaRPr lang="en-US" dirty="0"/>
-          </a:p>
-        </p:txBody>
-      </p:sp>
-      <p:sp>
-        <p:nvSpPr>
-          <p:cNvPr id="3" name="Rectangle 9"/>
-          <p:cNvSpPr>
-            <a:spLocks noGrp="1" noChangeArrowheads="1"/>
-          </p:cNvSpPr>
-          <p:nvPr>
-            <p:ph type="subTitle" idx="1"/>
-          </p:nvPr>
-        </p:nvSpPr>
-        <p:spPr/>
-        <p:txBody>
-          <a:bodyPr/>
-          <a:lstStyle/>
+          <p:cNvPr id="2" name="TextBox 1">
+            <a:extLst>
+              <a:ext uri="{FF2B5EF4-FFF2-40B4-BE49-F238E27FC236}">
+                <a16:creationId xmlns:a16="http://schemas.microsoft.com/office/drawing/2014/main" id="{DA2BD6CD-CB1E-4C42-AAF0-6B2B67A938CE}"/>
+              </a:ext>
+            </a:extLst>
+          </p:cNvPr>
+          <p:cNvSpPr txBox="1"/>
+          <p:nvPr/>
+        </p:nvSpPr>
+        <p:spPr>
+          <a:xfrm>
+            <a:off x="1619250" y="1217788"/>
+            <a:ext cx="8953500" cy="3279424"/>
+          </a:xfrm>
+          <a:prstGeom prst="rect">
+            <a:avLst/>
+          </a:prstGeom>
+          <a:noFill/>
+        </p:spPr>
+        <p:txBody>
+          <a:bodyPr wrap="square" rtlCol="0">
+            <a:spAutoFit/>
+          </a:bodyPr>
+          <a:lstStyle>
+            <a:defPPr>
+              <a:defRPr lang="en-US"/>
+            </a:defPPr>
+            <a:lvl1pPr algn="ctr">
+              <a:lnSpc>
+                <a:spcPct val="150000"/>
+              </a:lnSpc>
+              <a:defRPr sz="4800" b="1">
+                <a:solidFill>
+                  <a:schemeClr val="accent6"/>
+                </a:solidFill>
+              </a:defRPr>
+            </a:lvl1pPr>
+          </a:lstStyle>
           <a:p>
             <a:r>
               <a:rPr lang="en-US" dirty="0"/>
-              <a:t>Tim Cook, open letter to customers September 17, 2014</a:t>
+              <a:t>How will a more affordable choice affect my future earnings?</a:t>
             </a:r>
           </a:p>
         </p:txBody>
@@ -4649,7 +4743,7 @@
     </p:spTree>
     <p:extLst>
       <p:ext uri="{BB962C8B-B14F-4D97-AF65-F5344CB8AC3E}">
-        <p14:creationId xmlns:p14="http://schemas.microsoft.com/office/powerpoint/2010/main" val="604499499"/>
+        <p14:creationId xmlns:p14="http://schemas.microsoft.com/office/powerpoint/2010/main" val="3372186573"/>
       </p:ext>
     </p:extLst>
   </p:cSld>
@@ -4678,478 +4772,57 @@
       </p:grpSpPr>
       <p:sp>
         <p:nvSpPr>
-          <p:cNvPr id="7" name="Rectangle 6"/>
-          <p:cNvSpPr/>
+          <p:cNvPr id="6" name="TextBox 5">
+            <a:extLst>
+              <a:ext uri="{FF2B5EF4-FFF2-40B4-BE49-F238E27FC236}">
+                <a16:creationId xmlns:a16="http://schemas.microsoft.com/office/drawing/2014/main" id="{2527CE40-CEEB-4F33-AC48-12DC1AF66A59}"/>
+              </a:ext>
+            </a:extLst>
+          </p:cNvPr>
+          <p:cNvSpPr txBox="1"/>
           <p:nvPr/>
         </p:nvSpPr>
         <p:spPr>
           <a:xfrm>
-            <a:off x="5029200" y="927100"/>
-            <a:ext cx="2374900" cy="1701800"/>
-          </a:xfrm>
-          <a:prstGeom prst="rect">
-            <a:avLst/>
-          </a:prstGeom>
-          <a:solidFill>
-            <a:schemeClr val="bg2"/>
-          </a:solidFill>
-        </p:spPr>
-        <p:style>
-          <a:lnRef idx="2">
-            <a:schemeClr val="accent1">
-              <a:shade val="50000"/>
-            </a:schemeClr>
-          </a:lnRef>
-          <a:fillRef idx="1">
-            <a:schemeClr val="accent1"/>
-          </a:fillRef>
-          <a:effectRef idx="0">
-            <a:schemeClr val="accent1"/>
-          </a:effectRef>
-          <a:fontRef idx="minor">
-            <a:schemeClr val="lt1"/>
-          </a:fontRef>
-        </p:style>
-        <p:txBody>
-          <a:bodyPr rtlCol="0" anchor="ctr"/>
-          <a:lstStyle/>
-          <a:p>
-            <a:pPr algn="ctr" defTabSz="914400"/>
-            <a:endParaRPr lang="en-US">
-              <a:solidFill>
-                <a:prstClr val="white"/>
-              </a:solidFill>
-            </a:endParaRPr>
-          </a:p>
-        </p:txBody>
-      </p:sp>
-      <p:sp>
-        <p:nvSpPr>
-          <p:cNvPr id="8" name="Rectangle 7"/>
-          <p:cNvSpPr/>
-          <p:nvPr/>
-        </p:nvSpPr>
-        <p:spPr>
-          <a:xfrm>
-            <a:off x="7620000" y="927100"/>
-            <a:ext cx="2374900" cy="1701800"/>
-          </a:xfrm>
-          <a:prstGeom prst="rect">
-            <a:avLst/>
-          </a:prstGeom>
-          <a:solidFill>
-            <a:schemeClr val="tx2"/>
-          </a:solidFill>
-        </p:spPr>
-        <p:style>
-          <a:lnRef idx="2">
-            <a:schemeClr val="accent1">
-              <a:shade val="50000"/>
-            </a:schemeClr>
-          </a:lnRef>
-          <a:fillRef idx="1">
-            <a:schemeClr val="accent1"/>
-          </a:fillRef>
-          <a:effectRef idx="0">
-            <a:schemeClr val="accent1"/>
-          </a:effectRef>
-          <a:fontRef idx="minor">
-            <a:schemeClr val="lt1"/>
-          </a:fontRef>
-        </p:style>
-        <p:txBody>
-          <a:bodyPr rtlCol="0" anchor="ctr"/>
-          <a:lstStyle/>
-          <a:p>
-            <a:pPr algn="ctr" defTabSz="914400"/>
-            <a:endParaRPr lang="en-US">
-              <a:solidFill>
-                <a:prstClr val="white"/>
-              </a:solidFill>
-            </a:endParaRPr>
-          </a:p>
-        </p:txBody>
-      </p:sp>
-      <p:sp>
-        <p:nvSpPr>
-          <p:cNvPr id="9" name="Rectangle 8"/>
-          <p:cNvSpPr/>
-          <p:nvPr/>
-        </p:nvSpPr>
-        <p:spPr>
-          <a:xfrm>
-            <a:off x="2298700" y="2908300"/>
-            <a:ext cx="2374900" cy="1701800"/>
-          </a:xfrm>
-          <a:prstGeom prst="rect">
-            <a:avLst/>
-          </a:prstGeom>
-          <a:solidFill>
-            <a:schemeClr val="accent1"/>
-          </a:solidFill>
-        </p:spPr>
-        <p:style>
-          <a:lnRef idx="2">
-            <a:schemeClr val="accent1">
-              <a:shade val="50000"/>
-            </a:schemeClr>
-          </a:lnRef>
-          <a:fillRef idx="1">
-            <a:schemeClr val="accent1"/>
-          </a:fillRef>
-          <a:effectRef idx="0">
-            <a:schemeClr val="accent1"/>
-          </a:effectRef>
-          <a:fontRef idx="minor">
-            <a:schemeClr val="lt1"/>
-          </a:fontRef>
-        </p:style>
-        <p:txBody>
-          <a:bodyPr rtlCol="0" anchor="ctr"/>
-          <a:lstStyle/>
-          <a:p>
-            <a:pPr algn="ctr" defTabSz="914400"/>
-            <a:endParaRPr lang="en-US">
-              <a:solidFill>
-                <a:prstClr val="white"/>
-              </a:solidFill>
-            </a:endParaRPr>
-          </a:p>
-        </p:txBody>
-      </p:sp>
-      <p:sp>
-        <p:nvSpPr>
-          <p:cNvPr id="10" name="Rectangle 9"/>
-          <p:cNvSpPr/>
-          <p:nvPr/>
-        </p:nvSpPr>
-        <p:spPr>
-          <a:xfrm>
-            <a:off x="5029200" y="2908300"/>
-            <a:ext cx="2374900" cy="1701800"/>
-          </a:xfrm>
-          <a:prstGeom prst="rect">
-            <a:avLst/>
-          </a:prstGeom>
-          <a:solidFill>
-            <a:schemeClr val="accent2"/>
-          </a:solidFill>
-        </p:spPr>
-        <p:style>
-          <a:lnRef idx="2">
-            <a:schemeClr val="accent1">
-              <a:shade val="50000"/>
-            </a:schemeClr>
-          </a:lnRef>
-          <a:fillRef idx="1">
-            <a:schemeClr val="accent1"/>
-          </a:fillRef>
-          <a:effectRef idx="0">
-            <a:schemeClr val="accent1"/>
-          </a:effectRef>
-          <a:fontRef idx="minor">
-            <a:schemeClr val="lt1"/>
-          </a:fontRef>
-        </p:style>
-        <p:txBody>
-          <a:bodyPr rtlCol="0" anchor="ctr"/>
-          <a:lstStyle/>
-          <a:p>
-            <a:pPr algn="ctr" defTabSz="914400"/>
-            <a:endParaRPr lang="en-US">
-              <a:solidFill>
-                <a:prstClr val="white"/>
-              </a:solidFill>
-            </a:endParaRPr>
-          </a:p>
-        </p:txBody>
-      </p:sp>
-      <p:sp>
-        <p:nvSpPr>
-          <p:cNvPr id="11" name="Rectangle 10"/>
-          <p:cNvSpPr/>
-          <p:nvPr/>
-        </p:nvSpPr>
-        <p:spPr>
-          <a:xfrm>
-            <a:off x="7620000" y="2908300"/>
-            <a:ext cx="2374900" cy="1701800"/>
-          </a:xfrm>
-          <a:prstGeom prst="rect">
-            <a:avLst/>
-          </a:prstGeom>
-          <a:solidFill>
-            <a:schemeClr val="accent3"/>
-          </a:solidFill>
-        </p:spPr>
-        <p:style>
-          <a:lnRef idx="2">
-            <a:schemeClr val="accent1">
-              <a:shade val="50000"/>
-            </a:schemeClr>
-          </a:lnRef>
-          <a:fillRef idx="1">
-            <a:schemeClr val="accent1"/>
-          </a:fillRef>
-          <a:effectRef idx="0">
-            <a:schemeClr val="accent1"/>
-          </a:effectRef>
-          <a:fontRef idx="minor">
-            <a:schemeClr val="lt1"/>
-          </a:fontRef>
-        </p:style>
-        <p:txBody>
-          <a:bodyPr rtlCol="0" anchor="ctr"/>
-          <a:lstStyle/>
-          <a:p>
-            <a:pPr algn="ctr" defTabSz="914400"/>
-            <a:endParaRPr lang="en-US">
-              <a:solidFill>
-                <a:prstClr val="white"/>
-              </a:solidFill>
-            </a:endParaRPr>
-          </a:p>
-        </p:txBody>
-      </p:sp>
-      <p:sp>
-        <p:nvSpPr>
-          <p:cNvPr id="12" name="Rectangle 11"/>
-          <p:cNvSpPr/>
-          <p:nvPr/>
-        </p:nvSpPr>
-        <p:spPr>
-          <a:xfrm>
-            <a:off x="2298700" y="4876800"/>
-            <a:ext cx="2374900" cy="1701800"/>
-          </a:xfrm>
-          <a:prstGeom prst="rect">
-            <a:avLst/>
-          </a:prstGeom>
-          <a:solidFill>
-            <a:schemeClr val="accent4"/>
-          </a:solidFill>
-        </p:spPr>
-        <p:style>
-          <a:lnRef idx="2">
-            <a:schemeClr val="accent1">
-              <a:shade val="50000"/>
-            </a:schemeClr>
-          </a:lnRef>
-          <a:fillRef idx="1">
-            <a:schemeClr val="accent1"/>
-          </a:fillRef>
-          <a:effectRef idx="0">
-            <a:schemeClr val="accent1"/>
-          </a:effectRef>
-          <a:fontRef idx="minor">
-            <a:schemeClr val="lt1"/>
-          </a:fontRef>
-        </p:style>
-        <p:txBody>
-          <a:bodyPr rtlCol="0" anchor="ctr"/>
-          <a:lstStyle/>
-          <a:p>
-            <a:pPr algn="ctr" defTabSz="914400"/>
-            <a:endParaRPr lang="en-US">
-              <a:solidFill>
-                <a:prstClr val="white"/>
-              </a:solidFill>
-            </a:endParaRPr>
-          </a:p>
-        </p:txBody>
-      </p:sp>
-      <p:sp>
-        <p:nvSpPr>
-          <p:cNvPr id="13" name="Rectangle 12"/>
-          <p:cNvSpPr/>
-          <p:nvPr/>
-        </p:nvSpPr>
-        <p:spPr>
-          <a:xfrm>
-            <a:off x="5029200" y="4889500"/>
-            <a:ext cx="2374900" cy="1701800"/>
-          </a:xfrm>
-          <a:prstGeom prst="rect">
-            <a:avLst/>
-          </a:prstGeom>
-          <a:solidFill>
-            <a:schemeClr val="accent5"/>
-          </a:solidFill>
-        </p:spPr>
-        <p:style>
-          <a:lnRef idx="2">
-            <a:schemeClr val="accent1">
-              <a:shade val="50000"/>
-            </a:schemeClr>
-          </a:lnRef>
-          <a:fillRef idx="1">
-            <a:schemeClr val="accent1"/>
-          </a:fillRef>
-          <a:effectRef idx="0">
-            <a:schemeClr val="accent1"/>
-          </a:effectRef>
-          <a:fontRef idx="minor">
-            <a:schemeClr val="lt1"/>
-          </a:fontRef>
-        </p:style>
-        <p:txBody>
-          <a:bodyPr rtlCol="0" anchor="ctr"/>
-          <a:lstStyle/>
-          <a:p>
-            <a:pPr algn="ctr" defTabSz="914400"/>
-            <a:endParaRPr lang="en-US">
-              <a:solidFill>
-                <a:prstClr val="white"/>
-              </a:solidFill>
-            </a:endParaRPr>
-          </a:p>
-        </p:txBody>
-      </p:sp>
-      <p:sp>
-        <p:nvSpPr>
-          <p:cNvPr id="14" name="Rectangle 13"/>
-          <p:cNvSpPr/>
-          <p:nvPr/>
-        </p:nvSpPr>
-        <p:spPr>
-          <a:xfrm>
-            <a:off x="7620000" y="4889500"/>
-            <a:ext cx="2374900" cy="1701800"/>
-          </a:xfrm>
-          <a:prstGeom prst="rect">
-            <a:avLst/>
-          </a:prstGeom>
-          <a:solidFill>
-            <a:schemeClr val="accent6"/>
-          </a:solidFill>
-        </p:spPr>
-        <p:style>
-          <a:lnRef idx="2">
-            <a:schemeClr val="accent1">
-              <a:shade val="50000"/>
-            </a:schemeClr>
-          </a:lnRef>
-          <a:fillRef idx="1">
-            <a:schemeClr val="accent1"/>
-          </a:fillRef>
-          <a:effectRef idx="0">
-            <a:schemeClr val="accent1"/>
-          </a:effectRef>
-          <a:fontRef idx="minor">
-            <a:schemeClr val="lt1"/>
-          </a:fontRef>
-        </p:style>
-        <p:txBody>
-          <a:bodyPr rtlCol="0" anchor="ctr"/>
-          <a:lstStyle/>
-          <a:p>
-            <a:pPr algn="ctr" defTabSz="914400"/>
-            <a:endParaRPr lang="en-US">
-              <a:solidFill>
-                <a:prstClr val="white"/>
-              </a:solidFill>
-            </a:endParaRPr>
-          </a:p>
-        </p:txBody>
-      </p:sp>
-      <p:sp>
-        <p:nvSpPr>
-          <p:cNvPr id="15" name="Rectangle 14"/>
-          <p:cNvSpPr/>
-          <p:nvPr/>
-        </p:nvSpPr>
-        <p:spPr>
-          <a:xfrm>
-            <a:off x="2298700" y="939800"/>
-            <a:ext cx="1181100" cy="1701800"/>
-          </a:xfrm>
-          <a:prstGeom prst="rect">
-            <a:avLst/>
-          </a:prstGeom>
-          <a:solidFill>
-            <a:schemeClr val="bg1"/>
-          </a:solidFill>
-        </p:spPr>
-        <p:style>
-          <a:lnRef idx="2">
-            <a:schemeClr val="accent1">
-              <a:shade val="50000"/>
-            </a:schemeClr>
-          </a:lnRef>
-          <a:fillRef idx="1">
-            <a:schemeClr val="accent1"/>
-          </a:fillRef>
-          <a:effectRef idx="0">
-            <a:schemeClr val="accent1"/>
-          </a:effectRef>
-          <a:fontRef idx="minor">
-            <a:schemeClr val="lt1"/>
-          </a:fontRef>
-        </p:style>
-        <p:txBody>
-          <a:bodyPr rtlCol="0" anchor="ctr"/>
-          <a:lstStyle/>
-          <a:p>
-            <a:pPr algn="ctr" defTabSz="914400"/>
-            <a:endParaRPr lang="en-US">
-              <a:solidFill>
-                <a:prstClr val="white"/>
-              </a:solidFill>
-            </a:endParaRPr>
-          </a:p>
-        </p:txBody>
-      </p:sp>
-      <p:sp>
-        <p:nvSpPr>
-          <p:cNvPr id="16" name="Rectangle 15"/>
-          <p:cNvSpPr/>
-          <p:nvPr/>
-        </p:nvSpPr>
-        <p:spPr>
-          <a:xfrm>
-            <a:off x="3492500" y="939800"/>
-            <a:ext cx="1181100" cy="1701800"/>
-          </a:xfrm>
-          <a:prstGeom prst="rect">
-            <a:avLst/>
-          </a:prstGeom>
-          <a:solidFill>
-            <a:schemeClr val="tx1"/>
-          </a:solidFill>
-        </p:spPr>
-        <p:style>
-          <a:lnRef idx="2">
-            <a:schemeClr val="accent1">
-              <a:shade val="50000"/>
-            </a:schemeClr>
-          </a:lnRef>
-          <a:fillRef idx="1">
-            <a:schemeClr val="accent1"/>
-          </a:fillRef>
-          <a:effectRef idx="0">
-            <a:schemeClr val="accent1"/>
-          </a:effectRef>
-          <a:fontRef idx="minor">
-            <a:schemeClr val="lt1"/>
-          </a:fontRef>
-        </p:style>
-        <p:txBody>
-          <a:bodyPr rtlCol="0" anchor="ctr"/>
-          <a:lstStyle/>
-          <a:p>
-            <a:pPr algn="ctr" defTabSz="914400"/>
-            <a:endParaRPr lang="en-US">
-              <a:solidFill>
-                <a:prstClr val="white"/>
-              </a:solidFill>
-            </a:endParaRPr>
+            <a:off x="1619250" y="2325783"/>
+            <a:ext cx="8953500" cy="1063433"/>
+          </a:xfrm>
+          <a:prstGeom prst="rect">
+            <a:avLst/>
+          </a:prstGeom>
+          <a:noFill/>
+        </p:spPr>
+        <p:txBody>
+          <a:bodyPr wrap="square" rtlCol="0">
+            <a:spAutoFit/>
+          </a:bodyPr>
+          <a:lstStyle>
+            <a:defPPr>
+              <a:defRPr lang="en-US"/>
+            </a:defPPr>
+            <a:lvl1pPr algn="ctr">
+              <a:lnSpc>
+                <a:spcPct val="150000"/>
+              </a:lnSpc>
+              <a:defRPr sz="4800" b="1">
+                <a:solidFill>
+                  <a:schemeClr val="accent6"/>
+                </a:solidFill>
+              </a:defRPr>
+            </a:lvl1pPr>
+          </a:lstStyle>
+          <a:p>
+            <a:r>
+              <a:rPr lang="en-US" dirty="0"/>
+              <a:t>Are There Options?</a:t>
+            </a:r>
           </a:p>
         </p:txBody>
       </p:sp>
     </p:spTree>
     <p:extLst>
       <p:ext uri="{BB962C8B-B14F-4D97-AF65-F5344CB8AC3E}">
-        <p14:creationId xmlns:p14="http://schemas.microsoft.com/office/powerpoint/2010/main" val="1548161044"/>
+        <p14:creationId xmlns:p14="http://schemas.microsoft.com/office/powerpoint/2010/main" val="494161712"/>
       </p:ext>
     </p:extLst>
   </p:cSld>
@@ -5159,37 +4832,7 @@
 </p:sld>
 </file>
 
-<file path=ppt/slides/slide2.xml><?xml version="1.0" encoding="utf-8"?>
-<p:sld xmlns:a="http://schemas.openxmlformats.org/drawingml/2006/main" xmlns:r="http://schemas.openxmlformats.org/officeDocument/2006/relationships" xmlns:p="http://schemas.openxmlformats.org/presentationml/2006/main" show="0">
-  <p:cSld>
-    <p:spTree>
-      <p:nvGrpSpPr>
-        <p:cNvPr id="1" name=""/>
-        <p:cNvGrpSpPr/>
-        <p:nvPr/>
-      </p:nvGrpSpPr>
-      <p:grpSpPr>
-        <a:xfrm>
-          <a:off x="0" y="0"/>
-          <a:ext cx="0" cy="0"/>
-          <a:chOff x="0" y="0"/>
-          <a:chExt cx="0" cy="0"/>
-        </a:xfrm>
-      </p:grpSpPr>
-    </p:spTree>
-    <p:extLst>
-      <p:ext uri="{BB962C8B-B14F-4D97-AF65-F5344CB8AC3E}">
-        <p14:creationId xmlns:p14="http://schemas.microsoft.com/office/powerpoint/2010/main" val="765759388"/>
-      </p:ext>
-    </p:extLst>
-  </p:cSld>
-  <p:clrMapOvr>
-    <a:masterClrMapping/>
-  </p:clrMapOvr>
-</p:sld>
-</file>
-
-<file path=ppt/slides/slide3.xml><?xml version="1.0" encoding="utf-8"?>
+<file path=ppt/slides/slide17.xml><?xml version="1.0" encoding="utf-8"?>
 <p:sld xmlns:a="http://schemas.openxmlformats.org/drawingml/2006/main" xmlns:r="http://schemas.openxmlformats.org/officeDocument/2006/relationships" xmlns:p="http://schemas.openxmlformats.org/presentationml/2006/main">
   <p:cSld>
     <p:spTree>
@@ -5208,10 +4851,10 @@
       </p:grpSpPr>
       <p:sp>
         <p:nvSpPr>
-          <p:cNvPr id="2" name="Text Placeholder 1">
+          <p:cNvPr id="2" name="Content Placeholder 1">
             <a:extLst>
               <a:ext uri="{FF2B5EF4-FFF2-40B4-BE49-F238E27FC236}">
-                <a16:creationId xmlns:a16="http://schemas.microsoft.com/office/drawing/2014/main" id="{AFA7E690-C4F9-4CFF-9D6F-18BC72A74884}"/>
+                <a16:creationId xmlns:a16="http://schemas.microsoft.com/office/drawing/2014/main" id="{454466A7-79F0-4D9E-8AF2-71588F17FF64}"/>
               </a:ext>
             </a:extLst>
           </p:cNvPr>
@@ -5219,27 +4862,221 @@
             <a:spLocks noGrp="1"/>
           </p:cNvSpPr>
           <p:nvPr>
-            <p:ph type="body" sz="quarter" idx="11"/>
+            <p:ph idx="1"/>
           </p:nvPr>
         </p:nvSpPr>
-        <p:spPr/>
+        <p:spPr>
+          <a:xfrm>
+            <a:off x="527050" y="1268414"/>
+            <a:ext cx="6597650" cy="4608511"/>
+          </a:xfrm>
+        </p:spPr>
         <p:txBody>
           <a:bodyPr/>
           <a:lstStyle/>
           <a:p>
             <a:r>
+              <a:rPr lang="en-US" dirty="0">
+                <a:latin typeface="Gill Alt One MT" panose="020B0502020104020203" pitchFamily="34" charset="0"/>
+                <a:ea typeface="Calibri" panose="020F0502020204030204" pitchFamily="34" charset="0"/>
+                <a:cs typeface="Times New Roman" panose="02020603050405020304" pitchFamily="18" charset="0"/>
+              </a:rPr>
+              <a:t>College Scorecard Institution-Level Data</a:t>
+            </a:r>
+          </a:p>
+          <a:p>
+            <a:pPr lvl="1"/>
+            <a:r>
+              <a:rPr lang="en-US" dirty="0">
+                <a:latin typeface="Gill Alt One MT" panose="020B0502020104020203" pitchFamily="34" charset="0"/>
+                <a:ea typeface="Calibri" panose="020F0502020204030204" pitchFamily="34" charset="0"/>
+                <a:cs typeface="Times New Roman" panose="02020603050405020304" pitchFamily="18" charset="0"/>
+              </a:rPr>
+              <a:t>Data are provided through federal reporting</a:t>
+            </a:r>
+          </a:p>
+          <a:p>
+            <a:pPr lvl="1"/>
+            <a:r>
+              <a:rPr lang="en-US" dirty="0">
+                <a:latin typeface="Gill Alt One MT" panose="020B0502020104020203" pitchFamily="34" charset="0"/>
+                <a:ea typeface="Calibri" panose="020F0502020204030204" pitchFamily="34" charset="0"/>
+                <a:cs typeface="Times New Roman" panose="02020603050405020304" pitchFamily="18" charset="0"/>
+              </a:rPr>
+              <a:t>Institutions Participate in Title IV programs </a:t>
+            </a:r>
+          </a:p>
+          <a:p>
+            <a:pPr lvl="1"/>
+            <a:r>
+              <a:rPr lang="en-US" dirty="0">
+                <a:latin typeface="Gill Alt One MT" panose="020B0502020104020203" pitchFamily="34" charset="0"/>
+                <a:ea typeface="Calibri" panose="020F0502020204030204" pitchFamily="34" charset="0"/>
+                <a:cs typeface="Times New Roman" panose="02020603050405020304" pitchFamily="18" charset="0"/>
+              </a:rPr>
+              <a:t>6,681 institutions</a:t>
+            </a:r>
+          </a:p>
+          <a:p>
+            <a:pPr lvl="1"/>
+            <a:r>
+              <a:rPr lang="en-US" dirty="0">
+                <a:effectLst/>
+                <a:latin typeface="Gill Alt One MT" panose="020B0502020104020203" pitchFamily="34" charset="0"/>
+                <a:ea typeface="Calibri" panose="020F0502020204030204" pitchFamily="34" charset="0"/>
+                <a:cs typeface="Times New Roman" panose="02020603050405020304" pitchFamily="18" charset="0"/>
+              </a:rPr>
+              <a:t>2,989 </a:t>
+            </a:r>
+            <a:r>
+              <a:rPr lang="en-US" dirty="0">
+                <a:latin typeface="Gill Alt One MT" panose="020B0502020104020203" pitchFamily="34" charset="0"/>
+                <a:ea typeface="Calibri" panose="020F0502020204030204" pitchFamily="34" charset="0"/>
+                <a:cs typeface="Times New Roman" panose="02020603050405020304" pitchFamily="18" charset="0"/>
+              </a:rPr>
+              <a:t>potential variables</a:t>
+            </a:r>
+          </a:p>
+          <a:p>
+            <a:pPr marL="355600" lvl="1" indent="0">
+              <a:buNone/>
+            </a:pPr>
+            <a:endParaRPr lang="en-US" dirty="0">
+              <a:latin typeface="Gill Alt One MT" panose="020B0502020104020203" pitchFamily="34" charset="0"/>
+              <a:ea typeface="Calibri" panose="020F0502020204030204" pitchFamily="34" charset="0"/>
+              <a:cs typeface="Times New Roman" panose="02020603050405020304" pitchFamily="18" charset="0"/>
+            </a:endParaRPr>
+          </a:p>
+          <a:p>
+            <a:r>
+              <a:rPr lang="en-US" dirty="0">
+                <a:effectLst/>
+                <a:latin typeface="Gill Alt One MT" panose="020B0502020104020203" pitchFamily="34" charset="0"/>
+                <a:ea typeface="Calibri" panose="020F0502020204030204" pitchFamily="34" charset="0"/>
+                <a:cs typeface="Times New Roman" panose="02020603050405020304" pitchFamily="18" charset="0"/>
+              </a:rPr>
+              <a:t>O</a:t>
+            </a:r>
+            <a:r>
+              <a:rPr lang="en-US" dirty="0">
+                <a:latin typeface="Gill Alt One MT" panose="020B0502020104020203" pitchFamily="34" charset="0"/>
+                <a:ea typeface="Calibri" panose="020F0502020204030204" pitchFamily="34" charset="0"/>
+                <a:cs typeface="Times New Roman" panose="02020603050405020304" pitchFamily="18" charset="0"/>
+              </a:rPr>
+              <a:t>ur Data Set</a:t>
+            </a:r>
+            <a:endParaRPr lang="en-US" dirty="0">
+              <a:effectLst/>
+              <a:latin typeface="Gill Alt One MT" panose="020B0502020104020203" pitchFamily="34" charset="0"/>
+              <a:ea typeface="Calibri" panose="020F0502020204030204" pitchFamily="34" charset="0"/>
+              <a:cs typeface="Times New Roman" panose="02020603050405020304" pitchFamily="18" charset="0"/>
+            </a:endParaRPr>
+          </a:p>
+          <a:p>
+            <a:pPr lvl="1"/>
+            <a:r>
               <a:rPr lang="en-US" dirty="0"/>
-              <a:t>Git Setup</a:t>
-            </a:r>
+              <a:t>1550 accredited schools offering 4-year bachelor’s degrees</a:t>
+            </a:r>
+          </a:p>
+          <a:p>
+            <a:pPr lvl="1"/>
+            <a:r>
+              <a:rPr lang="en-US" dirty="0"/>
+              <a:t>Reporting</a:t>
+            </a:r>
+          </a:p>
+          <a:p>
+            <a:pPr lvl="2"/>
+            <a:r>
+              <a:rPr lang="en-US" dirty="0"/>
+              <a:t>Admission rate, graduation rates, family income, tuition cost</a:t>
+            </a:r>
+          </a:p>
+        </p:txBody>
+      </p:sp>
+      <p:sp>
+        <p:nvSpPr>
+          <p:cNvPr id="3" name="Title 2">
+            <a:extLst>
+              <a:ext uri="{FF2B5EF4-FFF2-40B4-BE49-F238E27FC236}">
+                <a16:creationId xmlns:a16="http://schemas.microsoft.com/office/drawing/2014/main" id="{23E2EBF5-D3AF-45E6-9A10-BC536FB82978}"/>
+              </a:ext>
+            </a:extLst>
+          </p:cNvPr>
+          <p:cNvSpPr>
+            <a:spLocks noGrp="1"/>
+          </p:cNvSpPr>
+          <p:nvPr>
+            <p:ph type="title"/>
+          </p:nvPr>
+        </p:nvSpPr>
+        <p:spPr/>
+        <p:txBody>
+          <a:bodyPr/>
+          <a:lstStyle/>
+          <a:p>
+            <a:r>
+              <a:rPr lang="en-US" dirty="0"/>
+              <a:t>The Data Set</a:t>
+            </a:r>
+          </a:p>
+        </p:txBody>
+      </p:sp>
+      <p:sp>
+        <p:nvSpPr>
+          <p:cNvPr id="6" name="TextBox 5">
+            <a:extLst>
+              <a:ext uri="{FF2B5EF4-FFF2-40B4-BE49-F238E27FC236}">
+                <a16:creationId xmlns:a16="http://schemas.microsoft.com/office/drawing/2014/main" id="{33D0DE1A-9DEF-446C-A3BF-D490DDFA58AF}"/>
+              </a:ext>
+            </a:extLst>
+          </p:cNvPr>
+          <p:cNvSpPr txBox="1"/>
+          <p:nvPr/>
+        </p:nvSpPr>
+        <p:spPr>
+          <a:xfrm>
+            <a:off x="527050" y="6211669"/>
+            <a:ext cx="5156200" cy="646331"/>
+          </a:xfrm>
+          <a:prstGeom prst="rect">
+            <a:avLst/>
+          </a:prstGeom>
+          <a:noFill/>
+        </p:spPr>
+        <p:txBody>
+          <a:bodyPr wrap="square" rtlCol="0">
+            <a:spAutoFit/>
+          </a:bodyPr>
+          <a:lstStyle/>
+          <a:p>
+            <a:r>
+              <a:rPr lang="en-US" dirty="0">
+                <a:latin typeface="Gill Alt One MT" panose="020B0502020104020203" pitchFamily="34" charset="0"/>
+                <a:ea typeface="Calibri" panose="020F0502020204030204" pitchFamily="34" charset="0"/>
+                <a:cs typeface="Times New Roman" panose="02020603050405020304" pitchFamily="18" charset="0"/>
+              </a:rPr>
+              <a:t>Source:  https://collegescorecard.ed.gov/data/</a:t>
+            </a:r>
+            <a:endParaRPr lang="en-US" dirty="0">
+              <a:effectLst/>
+              <a:latin typeface="Gill Alt One MT" panose="020B0502020104020203" pitchFamily="34" charset="0"/>
+              <a:ea typeface="Calibri" panose="020F0502020204030204" pitchFamily="34" charset="0"/>
+              <a:cs typeface="Times New Roman" panose="02020603050405020304" pitchFamily="18" charset="0"/>
+            </a:endParaRPr>
+          </a:p>
+          <a:p>
+            <a:endParaRPr lang="en-US" dirty="0"/>
           </a:p>
         </p:txBody>
       </p:sp>
       <p:pic>
         <p:nvPicPr>
-          <p:cNvPr id="4" name="Picture 3">
+          <p:cNvPr id="8" name="Picture 7">
             <a:extLst>
               <a:ext uri="{FF2B5EF4-FFF2-40B4-BE49-F238E27FC236}">
-                <a16:creationId xmlns:a16="http://schemas.microsoft.com/office/drawing/2014/main" id="{2DC60EAC-A609-4CA6-8DD7-F0BB8A0B1165}"/>
+                <a16:creationId xmlns:a16="http://schemas.microsoft.com/office/drawing/2014/main" id="{7987390A-EE6E-4471-A10F-599270CAF02D}"/>
               </a:ext>
             </a:extLst>
           </p:cNvPr>
@@ -5249,15 +5086,23 @@
           <p:nvPr/>
         </p:nvPicPr>
         <p:blipFill>
-          <a:blip r:embed="rId2"/>
+          <a:blip r:embed="rId3">
+            <a:duotone>
+              <a:schemeClr val="accent6">
+                <a:shade val="45000"/>
+                <a:satMod val="135000"/>
+              </a:schemeClr>
+              <a:prstClr val="white"/>
+            </a:duotone>
+          </a:blip>
           <a:stretch>
             <a:fillRect/>
           </a:stretch>
         </p:blipFill>
         <p:spPr>
           <a:xfrm>
-            <a:off x="5866095" y="1117076"/>
-            <a:ext cx="4623847" cy="4623847"/>
+            <a:off x="8153400" y="1911350"/>
+            <a:ext cx="3035300" cy="3035300"/>
           </a:xfrm>
           <a:prstGeom prst="rect">
             <a:avLst/>
@@ -5267,7 +5112,7 @@
     </p:spTree>
     <p:extLst>
       <p:ext uri="{BB962C8B-B14F-4D97-AF65-F5344CB8AC3E}">
-        <p14:creationId xmlns:p14="http://schemas.microsoft.com/office/powerpoint/2010/main" val="3032142056"/>
+        <p14:creationId xmlns:p14="http://schemas.microsoft.com/office/powerpoint/2010/main" val="745556629"/>
       </p:ext>
     </p:extLst>
   </p:cSld>
@@ -5277,7 +5122,7 @@
 </p:sld>
 </file>
 
-<file path=ppt/slides/slide4.xml><?xml version="1.0" encoding="utf-8"?>
+<file path=ppt/slides/slide18.xml><?xml version="1.0" encoding="utf-8"?>
 <p:sld xmlns:a="http://schemas.openxmlformats.org/drawingml/2006/main" xmlns:r="http://schemas.openxmlformats.org/officeDocument/2006/relationships" xmlns:p="http://schemas.openxmlformats.org/presentationml/2006/main">
   <p:cSld>
     <p:spTree>
@@ -5296,6 +5141,252 @@
       </p:grpSpPr>
       <p:sp>
         <p:nvSpPr>
+          <p:cNvPr id="6" name="TextBox 5">
+            <a:extLst>
+              <a:ext uri="{FF2B5EF4-FFF2-40B4-BE49-F238E27FC236}">
+                <a16:creationId xmlns:a16="http://schemas.microsoft.com/office/drawing/2014/main" id="{2527CE40-CEEB-4F33-AC48-12DC1AF66A59}"/>
+              </a:ext>
+            </a:extLst>
+          </p:cNvPr>
+          <p:cNvSpPr txBox="1"/>
+          <p:nvPr/>
+        </p:nvSpPr>
+        <p:spPr>
+          <a:xfrm>
+            <a:off x="965201" y="1724025"/>
+            <a:ext cx="7289800" cy="3211007"/>
+          </a:xfrm>
+          <a:prstGeom prst="rect">
+            <a:avLst/>
+          </a:prstGeom>
+          <a:noFill/>
+        </p:spPr>
+        <p:txBody>
+          <a:bodyPr wrap="square" rtlCol="0">
+            <a:spAutoFit/>
+          </a:bodyPr>
+          <a:lstStyle/>
+          <a:p>
+            <a:pPr algn="ctr">
+              <a:lnSpc>
+                <a:spcPct val="150000"/>
+              </a:lnSpc>
+            </a:pPr>
+            <a:r>
+              <a:rPr lang="en-US" sz="7200" b="1" dirty="0">
+                <a:solidFill>
+                  <a:schemeClr val="accent6"/>
+                </a:solidFill>
+              </a:rPr>
+              <a:t>Must I Compromise?</a:t>
+            </a:r>
+          </a:p>
+        </p:txBody>
+      </p:sp>
+      <p:pic>
+        <p:nvPicPr>
+          <p:cNvPr id="5" name="Picture 4">
+            <a:extLst>
+              <a:ext uri="{FF2B5EF4-FFF2-40B4-BE49-F238E27FC236}">
+                <a16:creationId xmlns:a16="http://schemas.microsoft.com/office/drawing/2014/main" id="{3FCE9FCA-E218-48B2-9820-DFAF9B71369C}"/>
+              </a:ext>
+            </a:extLst>
+          </p:cNvPr>
+          <p:cNvPicPr>
+            <a:picLocks noChangeAspect="1"/>
+          </p:cNvPicPr>
+          <p:nvPr/>
+        </p:nvPicPr>
+        <p:blipFill>
+          <a:blip r:embed="rId2">
+            <a:duotone>
+              <a:schemeClr val="accent6">
+                <a:shade val="45000"/>
+                <a:satMod val="135000"/>
+              </a:schemeClr>
+              <a:prstClr val="white"/>
+            </a:duotone>
+          </a:blip>
+          <a:stretch>
+            <a:fillRect/>
+          </a:stretch>
+        </p:blipFill>
+        <p:spPr>
+          <a:xfrm flipH="1">
+            <a:off x="8255001" y="1892300"/>
+            <a:ext cx="3073399" cy="3073399"/>
+          </a:xfrm>
+          <a:prstGeom prst="rect">
+            <a:avLst/>
+          </a:prstGeom>
+        </p:spPr>
+      </p:pic>
+    </p:spTree>
+    <p:extLst>
+      <p:ext uri="{BB962C8B-B14F-4D97-AF65-F5344CB8AC3E}">
+        <p14:creationId xmlns:p14="http://schemas.microsoft.com/office/powerpoint/2010/main" val="1087119737"/>
+      </p:ext>
+    </p:extLst>
+  </p:cSld>
+  <p:clrMapOvr>
+    <a:masterClrMapping/>
+  </p:clrMapOvr>
+</p:sld>
+</file>
+
+<file path=ppt/slides/slide19.xml><?xml version="1.0" encoding="utf-8"?>
+<p:sld xmlns:a="http://schemas.openxmlformats.org/drawingml/2006/main" xmlns:r="http://schemas.openxmlformats.org/officeDocument/2006/relationships" xmlns:p="http://schemas.openxmlformats.org/presentationml/2006/main">
+  <p:cSld>
+    <p:spTree>
+      <p:nvGrpSpPr>
+        <p:cNvPr id="1" name=""/>
+        <p:cNvGrpSpPr/>
+        <p:nvPr/>
+      </p:nvGrpSpPr>
+      <p:grpSpPr>
+        <a:xfrm>
+          <a:off x="0" y="0"/>
+          <a:ext cx="0" cy="0"/>
+          <a:chOff x="0" y="0"/>
+          <a:chExt cx="0" cy="0"/>
+        </a:xfrm>
+      </p:grpSpPr>
+      <p:sp>
+        <p:nvSpPr>
+          <p:cNvPr id="2" name="Title 1">
+            <a:extLst>
+              <a:ext uri="{FF2B5EF4-FFF2-40B4-BE49-F238E27FC236}">
+                <a16:creationId xmlns:a16="http://schemas.microsoft.com/office/drawing/2014/main" id="{768F0036-0E07-4FB1-AD31-33969149FF69}"/>
+              </a:ext>
+            </a:extLst>
+          </p:cNvPr>
+          <p:cNvSpPr>
+            <a:spLocks noGrp="1"/>
+          </p:cNvSpPr>
+          <p:nvPr>
+            <p:ph type="title"/>
+          </p:nvPr>
+        </p:nvSpPr>
+        <p:spPr/>
+        <p:txBody>
+          <a:bodyPr/>
+          <a:lstStyle/>
+          <a:p>
+            <a:r>
+              <a:rPr lang="en-US" dirty="0"/>
+              <a:t>Distribution of Average Net Price of Tuitions</a:t>
+            </a:r>
+          </a:p>
+        </p:txBody>
+      </p:sp>
+      <p:pic>
+        <p:nvPicPr>
+          <p:cNvPr id="4" name="Picture 3" descr="Chart, histogram&#10;&#10;Description automatically generated">
+            <a:extLst>
+              <a:ext uri="{FF2B5EF4-FFF2-40B4-BE49-F238E27FC236}">
+                <a16:creationId xmlns:a16="http://schemas.microsoft.com/office/drawing/2014/main" id="{AF1420BC-D189-4BDB-96A4-C855EEE25C53}"/>
+              </a:ext>
+            </a:extLst>
+          </p:cNvPr>
+          <p:cNvPicPr>
+            <a:picLocks noChangeAspect="1"/>
+          </p:cNvPicPr>
+          <p:nvPr/>
+        </p:nvPicPr>
+        <p:blipFill>
+          <a:blip r:embed="rId2"/>
+          <a:stretch>
+            <a:fillRect/>
+          </a:stretch>
+        </p:blipFill>
+        <p:spPr>
+          <a:xfrm>
+            <a:off x="673100" y="1196975"/>
+            <a:ext cx="7748590" cy="5038212"/>
+          </a:xfrm>
+          <a:prstGeom prst="rect">
+            <a:avLst/>
+          </a:prstGeom>
+        </p:spPr>
+      </p:pic>
+      <p:sp>
+        <p:nvSpPr>
+          <p:cNvPr id="6" name="TextBox 5">
+            <a:extLst>
+              <a:ext uri="{FF2B5EF4-FFF2-40B4-BE49-F238E27FC236}">
+                <a16:creationId xmlns:a16="http://schemas.microsoft.com/office/drawing/2014/main" id="{9B2CA274-C0F1-4831-8697-16E5D9E1FC9E}"/>
+              </a:ext>
+            </a:extLst>
+          </p:cNvPr>
+          <p:cNvSpPr txBox="1"/>
+          <p:nvPr/>
+        </p:nvSpPr>
+        <p:spPr>
+          <a:xfrm>
+            <a:off x="8724900" y="1524000"/>
+            <a:ext cx="2940050" cy="3477875"/>
+          </a:xfrm>
+          <a:prstGeom prst="rect">
+            <a:avLst/>
+          </a:prstGeom>
+          <a:noFill/>
+        </p:spPr>
+        <p:txBody>
+          <a:bodyPr wrap="square" rtlCol="0">
+            <a:spAutoFit/>
+          </a:bodyPr>
+          <a:lstStyle/>
+          <a:p>
+            <a:r>
+              <a:rPr lang="en-US" sz="2000" b="0" i="0" dirty="0">
+                <a:solidFill>
+                  <a:srgbClr val="786E6E"/>
+                </a:solidFill>
+                <a:effectLst/>
+                <a:latin typeface="Open Sans" panose="020B0606030504020204" pitchFamily="34" charset="0"/>
+              </a:rPr>
+              <a:t>Lorem ipsum dolor sit amet, consectetur adipiscing elit. Ut venenatis eget augue eget vulputate. Proin placerat est mattis dignissim blandit. Duis lectus diam, scelerisque sed posuere blandit, euismod sit amet sem</a:t>
+            </a:r>
+            <a:endParaRPr lang="en-US" sz="2000" dirty="0">
+              <a:solidFill>
+                <a:srgbClr val="786E6E"/>
+              </a:solidFill>
+            </a:endParaRPr>
+          </a:p>
+        </p:txBody>
+      </p:sp>
+    </p:spTree>
+    <p:extLst>
+      <p:ext uri="{BB962C8B-B14F-4D97-AF65-F5344CB8AC3E}">
+        <p14:creationId xmlns:p14="http://schemas.microsoft.com/office/powerpoint/2010/main" val="3193461322"/>
+      </p:ext>
+    </p:extLst>
+  </p:cSld>
+  <p:clrMapOvr>
+    <a:masterClrMapping/>
+  </p:clrMapOvr>
+</p:sld>
+</file>
+
+<file path=ppt/slides/slide2.xml><?xml version="1.0" encoding="utf-8"?>
+<p:sld xmlns:a="http://schemas.openxmlformats.org/drawingml/2006/main" xmlns:r="http://schemas.openxmlformats.org/officeDocument/2006/relationships" xmlns:p="http://schemas.openxmlformats.org/presentationml/2006/main">
+  <p:cSld>
+    <p:spTree>
+      <p:nvGrpSpPr>
+        <p:cNvPr id="1" name=""/>
+        <p:cNvGrpSpPr/>
+        <p:nvPr/>
+      </p:nvGrpSpPr>
+      <p:grpSpPr>
+        <a:xfrm>
+          <a:off x="0" y="0"/>
+          <a:ext cx="0" cy="0"/>
+          <a:chOff x="0" y="0"/>
+          <a:chExt cx="0" cy="0"/>
+        </a:xfrm>
+      </p:grpSpPr>
+      <p:sp>
+        <p:nvSpPr>
           <p:cNvPr id="3" name="Title 2">
             <a:extLst>
               <a:ext uri="{FF2B5EF4-FFF2-40B4-BE49-F238E27FC236}">
@@ -5317,7 +5408,7 @@
           <a:p>
             <a:r>
               <a:rPr lang="en-US" dirty="0"/>
-              <a:t>Team</a:t>
+              <a:t>The Team</a:t>
             </a:r>
           </a:p>
         </p:txBody>
@@ -5337,20 +5428,20 @@
           <p:nvPr>
             <p:extLst>
               <p:ext uri="{D42A27DB-BD31-4B8C-83A1-F6EECF244321}">
-                <p14:modId xmlns:p14="http://schemas.microsoft.com/office/powerpoint/2010/main" val="1254112324"/>
+                <p14:modId xmlns:p14="http://schemas.microsoft.com/office/powerpoint/2010/main" val="3608024366"/>
               </p:ext>
             </p:extLst>
           </p:nvPr>
         </p:nvGraphicFramePr>
         <p:xfrm>
-          <a:off x="527051" y="1574800"/>
+          <a:off x="631826" y="1831975"/>
           <a:ext cx="10747407" cy="3562810"/>
         </p:xfrm>
         <a:graphic>
           <a:graphicData uri="http://schemas.openxmlformats.org/drawingml/2006/table">
             <a:tbl>
               <a:tblPr firstRow="1" bandRow="1">
-                <a:tableStyleId>{5C22544A-7EE6-4342-B048-85BDC9FD1C3A}</a:tableStyleId>
+                <a:tableStyleId>{93296810-A885-4BE3-A3E7-6D5BEEA58F35}</a:tableStyleId>
               </a:tblPr>
               <a:tblGrid>
                 <a:gridCol w="3045708">
@@ -5455,10 +5546,9 @@
                     <a:p>
                       <a:pPr algn="ctr"/>
                       <a:r>
-                        <a:rPr lang="en-US" sz="2400"/>
+                        <a:rPr lang="en-US" sz="2400" dirty="0"/>
                         <a:t>443-932-9523</a:t>
                       </a:r>
-                      <a:endParaRPr lang="en-US" sz="2400" dirty="0"/>
                     </a:p>
                   </a:txBody>
                   <a:tcPr anchor="ctr"/>
@@ -5619,12 +5709,100 @@
           </a:graphicData>
         </a:graphic>
       </p:graphicFrame>
-      <p:sp>
-        <p:nvSpPr>
-          <p:cNvPr id="2" name="TextBox 1">
+    </p:spTree>
+    <p:extLst>
+      <p:ext uri="{BB962C8B-B14F-4D97-AF65-F5344CB8AC3E}">
+        <p14:creationId xmlns:p14="http://schemas.microsoft.com/office/powerpoint/2010/main" val="3830361461"/>
+      </p:ext>
+    </p:extLst>
+  </p:cSld>
+  <p:clrMapOvr>
+    <a:masterClrMapping/>
+  </p:clrMapOvr>
+</p:sld>
+</file>
+
+<file path=ppt/slides/slide20.xml><?xml version="1.0" encoding="utf-8"?>
+<p:sld xmlns:a="http://schemas.openxmlformats.org/drawingml/2006/main" xmlns:r="http://schemas.openxmlformats.org/officeDocument/2006/relationships" xmlns:p="http://schemas.openxmlformats.org/presentationml/2006/main">
+  <p:cSld>
+    <p:spTree>
+      <p:nvGrpSpPr>
+        <p:cNvPr id="1" name=""/>
+        <p:cNvGrpSpPr/>
+        <p:nvPr/>
+      </p:nvGrpSpPr>
+      <p:grpSpPr>
+        <a:xfrm>
+          <a:off x="0" y="0"/>
+          <a:ext cx="0" cy="0"/>
+          <a:chOff x="0" y="0"/>
+          <a:chExt cx="0" cy="0"/>
+        </a:xfrm>
+      </p:grpSpPr>
+      <p:sp>
+        <p:nvSpPr>
+          <p:cNvPr id="2" name="Title 1">
             <a:extLst>
               <a:ext uri="{FF2B5EF4-FFF2-40B4-BE49-F238E27FC236}">
-                <a16:creationId xmlns:a16="http://schemas.microsoft.com/office/drawing/2014/main" id="{77017AFB-224F-4ECD-83EF-E39C510C29D2}"/>
+                <a16:creationId xmlns:a16="http://schemas.microsoft.com/office/drawing/2014/main" id="{CE80E47A-A32A-4566-B3CC-AA307CF729DB}"/>
+              </a:ext>
+            </a:extLst>
+          </p:cNvPr>
+          <p:cNvSpPr>
+            <a:spLocks noGrp="1"/>
+          </p:cNvSpPr>
+          <p:nvPr>
+            <p:ph type="title"/>
+          </p:nvPr>
+        </p:nvSpPr>
+        <p:spPr/>
+        <p:txBody>
+          <a:bodyPr/>
+          <a:lstStyle/>
+          <a:p>
+            <a:r>
+              <a:rPr lang="en-US" dirty="0"/>
+              <a:t>Average Net Price - Quartiles</a:t>
+            </a:r>
+          </a:p>
+        </p:txBody>
+      </p:sp>
+      <p:pic>
+        <p:nvPicPr>
+          <p:cNvPr id="4" name="Picture 3" descr="Chart, box and whisker chart&#10;&#10;Description automatically generated">
+            <a:extLst>
+              <a:ext uri="{FF2B5EF4-FFF2-40B4-BE49-F238E27FC236}">
+                <a16:creationId xmlns:a16="http://schemas.microsoft.com/office/drawing/2014/main" id="{4B559267-EC73-4494-B203-AA953EC0F4A6}"/>
+              </a:ext>
+            </a:extLst>
+          </p:cNvPr>
+          <p:cNvPicPr>
+            <a:picLocks noChangeAspect="1"/>
+          </p:cNvPicPr>
+          <p:nvPr/>
+        </p:nvPicPr>
+        <p:blipFill>
+          <a:blip r:embed="rId2"/>
+          <a:stretch>
+            <a:fillRect/>
+          </a:stretch>
+        </p:blipFill>
+        <p:spPr>
+          <a:xfrm>
+            <a:off x="527050" y="1321444"/>
+            <a:ext cx="7531100" cy="4793605"/>
+          </a:xfrm>
+          <a:prstGeom prst="rect">
+            <a:avLst/>
+          </a:prstGeom>
+        </p:spPr>
+      </p:pic>
+      <p:sp>
+        <p:nvSpPr>
+          <p:cNvPr id="5" name="TextBox 4">
+            <a:extLst>
+              <a:ext uri="{FF2B5EF4-FFF2-40B4-BE49-F238E27FC236}">
+                <a16:creationId xmlns:a16="http://schemas.microsoft.com/office/drawing/2014/main" id="{1F002200-35E7-4BB6-9926-106CF7739F44}"/>
               </a:ext>
             </a:extLst>
           </p:cNvPr>
@@ -5633,8 +5811,8 @@
         </p:nvSpPr>
         <p:spPr>
           <a:xfrm>
-            <a:off x="2214281" y="5719482"/>
-            <a:ext cx="3236784" cy="646331"/>
+            <a:off x="8724900" y="1524000"/>
+            <a:ext cx="2940050" cy="3477875"/>
           </a:xfrm>
           <a:prstGeom prst="rect">
             <a:avLst/>
@@ -5642,25 +5820,1846 @@
           <a:noFill/>
         </p:spPr>
         <p:txBody>
-          <a:bodyPr wrap="none" rtlCol="0">
+          <a:bodyPr wrap="square" rtlCol="0">
             <a:spAutoFit/>
           </a:bodyPr>
           <a:lstStyle/>
           <a:p>
             <a:r>
-              <a:rPr lang="en-US" sz="3600" dirty="0">
-                <a:hlinkClick r:id="rId2"/>
+              <a:rPr lang="en-US" sz="2000" b="0" i="0" dirty="0">
+                <a:solidFill>
+                  <a:srgbClr val="786E6E"/>
+                </a:solidFill>
+                <a:effectLst/>
+                <a:latin typeface="Open Sans" panose="020B0606030504020204" pitchFamily="34" charset="0"/>
               </a:rPr>
-              <a:t>One Drive Link</a:t>
-            </a:r>
-            <a:endParaRPr lang="en-US" sz="3600" dirty="0"/>
+              <a:t>Lorem ipsum dolor sit amet, consectetur adipiscing elit. Ut venenatis eget augue eget vulputate. Proin placerat est mattis dignissim blandit. Duis lectus diam, scelerisque sed posuere blandit, euismod sit amet sem</a:t>
+            </a:r>
+            <a:endParaRPr lang="en-US" sz="2000" dirty="0">
+              <a:solidFill>
+                <a:srgbClr val="786E6E"/>
+              </a:solidFill>
+            </a:endParaRPr>
           </a:p>
         </p:txBody>
       </p:sp>
     </p:spTree>
     <p:extLst>
       <p:ext uri="{BB962C8B-B14F-4D97-AF65-F5344CB8AC3E}">
-        <p14:creationId xmlns:p14="http://schemas.microsoft.com/office/powerpoint/2010/main" val="3830361461"/>
+        <p14:creationId xmlns:p14="http://schemas.microsoft.com/office/powerpoint/2010/main" val="3247578005"/>
+      </p:ext>
+    </p:extLst>
+  </p:cSld>
+  <p:clrMapOvr>
+    <a:masterClrMapping/>
+  </p:clrMapOvr>
+</p:sld>
+</file>
+
+<file path=ppt/slides/slide21.xml><?xml version="1.0" encoding="utf-8"?>
+<p:sld xmlns:a="http://schemas.openxmlformats.org/drawingml/2006/main" xmlns:r="http://schemas.openxmlformats.org/officeDocument/2006/relationships" xmlns:p="http://schemas.openxmlformats.org/presentationml/2006/main">
+  <p:cSld>
+    <p:spTree>
+      <p:nvGrpSpPr>
+        <p:cNvPr id="1" name=""/>
+        <p:cNvGrpSpPr/>
+        <p:nvPr/>
+      </p:nvGrpSpPr>
+      <p:grpSpPr>
+        <a:xfrm>
+          <a:off x="0" y="0"/>
+          <a:ext cx="0" cy="0"/>
+          <a:chOff x="0" y="0"/>
+          <a:chExt cx="0" cy="0"/>
+        </a:xfrm>
+      </p:grpSpPr>
+      <p:sp>
+        <p:nvSpPr>
+          <p:cNvPr id="2" name="Title 1">
+            <a:extLst>
+              <a:ext uri="{FF2B5EF4-FFF2-40B4-BE49-F238E27FC236}">
+                <a16:creationId xmlns:a16="http://schemas.microsoft.com/office/drawing/2014/main" id="{677184D2-9F9D-4DAE-BC9A-1C71B8D13A04}"/>
+              </a:ext>
+            </a:extLst>
+          </p:cNvPr>
+          <p:cNvSpPr>
+            <a:spLocks noGrp="1"/>
+          </p:cNvSpPr>
+          <p:nvPr>
+            <p:ph type="title"/>
+          </p:nvPr>
+        </p:nvSpPr>
+        <p:spPr/>
+        <p:txBody>
+          <a:bodyPr/>
+          <a:lstStyle/>
+          <a:p>
+            <a:r>
+              <a:rPr lang="en-US" dirty="0"/>
+              <a:t>Distribution of Average Net Price of Tuitions – Q1</a:t>
+            </a:r>
+          </a:p>
+        </p:txBody>
+      </p:sp>
+      <p:pic>
+        <p:nvPicPr>
+          <p:cNvPr id="4" name="Picture 3" descr="Chart, histogram&#10;&#10;Description automatically generated">
+            <a:extLst>
+              <a:ext uri="{FF2B5EF4-FFF2-40B4-BE49-F238E27FC236}">
+                <a16:creationId xmlns:a16="http://schemas.microsoft.com/office/drawing/2014/main" id="{8B14362A-C844-4846-B81B-9DE6F8E71B3A}"/>
+              </a:ext>
+            </a:extLst>
+          </p:cNvPr>
+          <p:cNvPicPr>
+            <a:picLocks noChangeAspect="1"/>
+          </p:cNvPicPr>
+          <p:nvPr/>
+        </p:nvPicPr>
+        <p:blipFill>
+          <a:blip r:embed="rId2"/>
+          <a:stretch>
+            <a:fillRect/>
+          </a:stretch>
+        </p:blipFill>
+        <p:spPr>
+          <a:xfrm>
+            <a:off x="775368" y="1196975"/>
+            <a:ext cx="7364663" cy="4997450"/>
+          </a:xfrm>
+          <a:prstGeom prst="rect">
+            <a:avLst/>
+          </a:prstGeom>
+        </p:spPr>
+      </p:pic>
+      <p:sp>
+        <p:nvSpPr>
+          <p:cNvPr id="5" name="TextBox 4">
+            <a:extLst>
+              <a:ext uri="{FF2B5EF4-FFF2-40B4-BE49-F238E27FC236}">
+                <a16:creationId xmlns:a16="http://schemas.microsoft.com/office/drawing/2014/main" id="{C01F0B17-3A4D-4CC5-9F6A-3356F29842B1}"/>
+              </a:ext>
+            </a:extLst>
+          </p:cNvPr>
+          <p:cNvSpPr txBox="1"/>
+          <p:nvPr/>
+        </p:nvSpPr>
+        <p:spPr>
+          <a:xfrm>
+            <a:off x="8724900" y="1524000"/>
+            <a:ext cx="2940050" cy="3477875"/>
+          </a:xfrm>
+          <a:prstGeom prst="rect">
+            <a:avLst/>
+          </a:prstGeom>
+          <a:noFill/>
+        </p:spPr>
+        <p:txBody>
+          <a:bodyPr wrap="square" rtlCol="0">
+            <a:spAutoFit/>
+          </a:bodyPr>
+          <a:lstStyle/>
+          <a:p>
+            <a:r>
+              <a:rPr lang="en-US" sz="2000" b="0" i="0" dirty="0">
+                <a:solidFill>
+                  <a:srgbClr val="786E6E"/>
+                </a:solidFill>
+                <a:effectLst/>
+                <a:latin typeface="Open Sans" panose="020B0606030504020204" pitchFamily="34" charset="0"/>
+              </a:rPr>
+              <a:t>Lorem ipsum dolor sit amet, consectetur adipiscing elit. Ut venenatis eget augue eget vulputate. Proin placerat est mattis dignissim blandit. Duis lectus diam, scelerisque sed posuere blandit, euismod sit amet sem</a:t>
+            </a:r>
+            <a:endParaRPr lang="en-US" sz="2000" dirty="0">
+              <a:solidFill>
+                <a:srgbClr val="786E6E"/>
+              </a:solidFill>
+            </a:endParaRPr>
+          </a:p>
+        </p:txBody>
+      </p:sp>
+    </p:spTree>
+    <p:extLst>
+      <p:ext uri="{BB962C8B-B14F-4D97-AF65-F5344CB8AC3E}">
+        <p14:creationId xmlns:p14="http://schemas.microsoft.com/office/powerpoint/2010/main" val="1685302603"/>
+      </p:ext>
+    </p:extLst>
+  </p:cSld>
+  <p:clrMapOvr>
+    <a:masterClrMapping/>
+  </p:clrMapOvr>
+</p:sld>
+</file>
+
+<file path=ppt/slides/slide22.xml><?xml version="1.0" encoding="utf-8"?>
+<p:sld xmlns:a="http://schemas.openxmlformats.org/drawingml/2006/main" xmlns:r="http://schemas.openxmlformats.org/officeDocument/2006/relationships" xmlns:p="http://schemas.openxmlformats.org/presentationml/2006/main" show="0">
+  <p:cSld>
+    <p:spTree>
+      <p:nvGrpSpPr>
+        <p:cNvPr id="1" name=""/>
+        <p:cNvGrpSpPr/>
+        <p:nvPr/>
+      </p:nvGrpSpPr>
+      <p:grpSpPr>
+        <a:xfrm>
+          <a:off x="0" y="0"/>
+          <a:ext cx="0" cy="0"/>
+          <a:chOff x="0" y="0"/>
+          <a:chExt cx="0" cy="0"/>
+        </a:xfrm>
+      </p:grpSpPr>
+      <p:pic>
+        <p:nvPicPr>
+          <p:cNvPr id="4" name="Picture 3">
+            <a:extLst>
+              <a:ext uri="{FF2B5EF4-FFF2-40B4-BE49-F238E27FC236}">
+                <a16:creationId xmlns:a16="http://schemas.microsoft.com/office/drawing/2014/main" id="{38A0E1E0-0EE9-46D3-8943-18405E79CC5D}"/>
+              </a:ext>
+            </a:extLst>
+          </p:cNvPr>
+          <p:cNvPicPr>
+            <a:picLocks noChangeAspect="1"/>
+          </p:cNvPicPr>
+          <p:nvPr/>
+        </p:nvPicPr>
+        <p:blipFill>
+          <a:blip r:embed="rId2"/>
+          <a:stretch>
+            <a:fillRect/>
+          </a:stretch>
+        </p:blipFill>
+        <p:spPr>
+          <a:xfrm>
+            <a:off x="335461" y="0"/>
+            <a:ext cx="11521077" cy="6858000"/>
+          </a:xfrm>
+          <a:prstGeom prst="rect">
+            <a:avLst/>
+          </a:prstGeom>
+        </p:spPr>
+      </p:pic>
+      <p:sp>
+        <p:nvSpPr>
+          <p:cNvPr id="5" name="TextBox 4">
+            <a:extLst>
+              <a:ext uri="{FF2B5EF4-FFF2-40B4-BE49-F238E27FC236}">
+                <a16:creationId xmlns:a16="http://schemas.microsoft.com/office/drawing/2014/main" id="{4B812974-6929-4234-97CA-F66EB18D1462}"/>
+              </a:ext>
+            </a:extLst>
+          </p:cNvPr>
+          <p:cNvSpPr txBox="1"/>
+          <p:nvPr/>
+        </p:nvSpPr>
+        <p:spPr>
+          <a:xfrm>
+            <a:off x="1271088" y="3530600"/>
+            <a:ext cx="2132512" cy="2462213"/>
+          </a:xfrm>
+          <a:prstGeom prst="rect">
+            <a:avLst/>
+          </a:prstGeom>
+          <a:noFill/>
+        </p:spPr>
+        <p:txBody>
+          <a:bodyPr wrap="square" rtlCol="0">
+            <a:spAutoFit/>
+          </a:bodyPr>
+          <a:lstStyle/>
+          <a:p>
+            <a:r>
+              <a:rPr lang="en-US" sz="1400" b="0" i="0" dirty="0">
+                <a:solidFill>
+                  <a:srgbClr val="786E6E"/>
+                </a:solidFill>
+                <a:effectLst/>
+                <a:latin typeface="Open Sans" panose="020B0606030504020204" pitchFamily="34" charset="0"/>
+              </a:rPr>
+              <a:t>Lorem ipsum dolor sit amet, consectetur adipiscing elit. Ut venenatis eget augue eget vulputate. Proin placerat est mattis dignissim blandit. Duis lectus diam, scelerisque sed posuere blandit, euismod sit amet sem</a:t>
+            </a:r>
+            <a:endParaRPr lang="en-US" sz="1400" dirty="0">
+              <a:solidFill>
+                <a:srgbClr val="786E6E"/>
+              </a:solidFill>
+            </a:endParaRPr>
+          </a:p>
+        </p:txBody>
+      </p:sp>
+    </p:spTree>
+    <p:extLst>
+      <p:ext uri="{BB962C8B-B14F-4D97-AF65-F5344CB8AC3E}">
+        <p14:creationId xmlns:p14="http://schemas.microsoft.com/office/powerpoint/2010/main" val="3636843643"/>
+      </p:ext>
+    </p:extLst>
+  </p:cSld>
+  <p:clrMapOvr>
+    <a:masterClrMapping/>
+  </p:clrMapOvr>
+</p:sld>
+</file>
+
+<file path=ppt/slides/slide23.xml><?xml version="1.0" encoding="utf-8"?>
+<p:sld xmlns:a="http://schemas.openxmlformats.org/drawingml/2006/main" xmlns:r="http://schemas.openxmlformats.org/officeDocument/2006/relationships" xmlns:p="http://schemas.openxmlformats.org/presentationml/2006/main">
+  <p:cSld>
+    <p:spTree>
+      <p:nvGrpSpPr>
+        <p:cNvPr id="1" name=""/>
+        <p:cNvGrpSpPr/>
+        <p:nvPr/>
+      </p:nvGrpSpPr>
+      <p:grpSpPr>
+        <a:xfrm>
+          <a:off x="0" y="0"/>
+          <a:ext cx="0" cy="0"/>
+          <a:chOff x="0" y="0"/>
+          <a:chExt cx="0" cy="0"/>
+        </a:xfrm>
+      </p:grpSpPr>
+      <p:pic>
+        <p:nvPicPr>
+          <p:cNvPr id="3" name="Picture 2">
+            <a:extLst>
+              <a:ext uri="{FF2B5EF4-FFF2-40B4-BE49-F238E27FC236}">
+                <a16:creationId xmlns:a16="http://schemas.microsoft.com/office/drawing/2014/main" id="{DD61B2D0-77CF-444A-825A-69D0D47685A2}"/>
+              </a:ext>
+            </a:extLst>
+          </p:cNvPr>
+          <p:cNvPicPr>
+            <a:picLocks noChangeAspect="1"/>
+          </p:cNvPicPr>
+          <p:nvPr/>
+        </p:nvPicPr>
+        <p:blipFill>
+          <a:blip r:embed="rId2"/>
+          <a:stretch>
+            <a:fillRect/>
+          </a:stretch>
+        </p:blipFill>
+        <p:spPr>
+          <a:xfrm>
+            <a:off x="260529" y="0"/>
+            <a:ext cx="11670941" cy="6858000"/>
+          </a:xfrm>
+          <a:prstGeom prst="rect">
+            <a:avLst/>
+          </a:prstGeom>
+        </p:spPr>
+      </p:pic>
+      <p:sp>
+        <p:nvSpPr>
+          <p:cNvPr id="5" name="TextBox 4">
+            <a:extLst>
+              <a:ext uri="{FF2B5EF4-FFF2-40B4-BE49-F238E27FC236}">
+                <a16:creationId xmlns:a16="http://schemas.microsoft.com/office/drawing/2014/main" id="{7DC9F103-DE6C-4B25-8324-506DEF5EF46B}"/>
+              </a:ext>
+            </a:extLst>
+          </p:cNvPr>
+          <p:cNvSpPr txBox="1"/>
+          <p:nvPr/>
+        </p:nvSpPr>
+        <p:spPr>
+          <a:xfrm>
+            <a:off x="1271088" y="3530600"/>
+            <a:ext cx="2132512" cy="2462213"/>
+          </a:xfrm>
+          <a:prstGeom prst="rect">
+            <a:avLst/>
+          </a:prstGeom>
+          <a:noFill/>
+        </p:spPr>
+        <p:txBody>
+          <a:bodyPr wrap="square" rtlCol="0">
+            <a:spAutoFit/>
+          </a:bodyPr>
+          <a:lstStyle/>
+          <a:p>
+            <a:r>
+              <a:rPr lang="en-US" sz="1400" b="0" i="0" dirty="0">
+                <a:solidFill>
+                  <a:srgbClr val="786E6E"/>
+                </a:solidFill>
+                <a:effectLst/>
+                <a:latin typeface="Open Sans" panose="020B0606030504020204" pitchFamily="34" charset="0"/>
+              </a:rPr>
+              <a:t>Lorem ipsum dolor sit amet, consectetur adipiscing elit. Ut venenatis eget augue eget vulputate. Proin placerat est mattis dignissim blandit. Duis lectus diam, scelerisque sed posuere blandit, euismod sit amet sem</a:t>
+            </a:r>
+            <a:endParaRPr lang="en-US" sz="1400" dirty="0">
+              <a:solidFill>
+                <a:srgbClr val="786E6E"/>
+              </a:solidFill>
+            </a:endParaRPr>
+          </a:p>
+        </p:txBody>
+      </p:sp>
+    </p:spTree>
+    <p:extLst>
+      <p:ext uri="{BB962C8B-B14F-4D97-AF65-F5344CB8AC3E}">
+        <p14:creationId xmlns:p14="http://schemas.microsoft.com/office/powerpoint/2010/main" val="118389558"/>
+      </p:ext>
+    </p:extLst>
+  </p:cSld>
+  <p:clrMapOvr>
+    <a:masterClrMapping/>
+  </p:clrMapOvr>
+</p:sld>
+</file>
+
+<file path=ppt/slides/slide24.xml><?xml version="1.0" encoding="utf-8"?>
+<p:sld xmlns:a="http://schemas.openxmlformats.org/drawingml/2006/main" xmlns:r="http://schemas.openxmlformats.org/officeDocument/2006/relationships" xmlns:p="http://schemas.openxmlformats.org/presentationml/2006/main" show="0">
+  <p:cSld>
+    <p:spTree>
+      <p:nvGrpSpPr>
+        <p:cNvPr id="1" name=""/>
+        <p:cNvGrpSpPr/>
+        <p:nvPr/>
+      </p:nvGrpSpPr>
+      <p:grpSpPr>
+        <a:xfrm>
+          <a:off x="0" y="0"/>
+          <a:ext cx="0" cy="0"/>
+          <a:chOff x="0" y="0"/>
+          <a:chExt cx="0" cy="0"/>
+        </a:xfrm>
+      </p:grpSpPr>
+      <p:pic>
+        <p:nvPicPr>
+          <p:cNvPr id="3" name="Picture 2">
+            <a:extLst>
+              <a:ext uri="{FF2B5EF4-FFF2-40B4-BE49-F238E27FC236}">
+                <a16:creationId xmlns:a16="http://schemas.microsoft.com/office/drawing/2014/main" id="{C79BC6A8-167E-4963-880A-FF0CD9F07589}"/>
+              </a:ext>
+            </a:extLst>
+          </p:cNvPr>
+          <p:cNvPicPr>
+            <a:picLocks noChangeAspect="1"/>
+          </p:cNvPicPr>
+          <p:nvPr/>
+        </p:nvPicPr>
+        <p:blipFill>
+          <a:blip r:embed="rId2"/>
+          <a:stretch>
+            <a:fillRect/>
+          </a:stretch>
+        </p:blipFill>
+        <p:spPr>
+          <a:xfrm>
+            <a:off x="512771" y="0"/>
+            <a:ext cx="11166458" cy="6858000"/>
+          </a:xfrm>
+          <a:prstGeom prst="rect">
+            <a:avLst/>
+          </a:prstGeom>
+        </p:spPr>
+      </p:pic>
+      <p:sp>
+        <p:nvSpPr>
+          <p:cNvPr id="5" name="TextBox 4">
+            <a:extLst>
+              <a:ext uri="{FF2B5EF4-FFF2-40B4-BE49-F238E27FC236}">
+                <a16:creationId xmlns:a16="http://schemas.microsoft.com/office/drawing/2014/main" id="{9E39C366-A849-4C70-8D9C-E2E30842862C}"/>
+              </a:ext>
+            </a:extLst>
+          </p:cNvPr>
+          <p:cNvSpPr txBox="1"/>
+          <p:nvPr/>
+        </p:nvSpPr>
+        <p:spPr>
+          <a:xfrm>
+            <a:off x="1271088" y="3530600"/>
+            <a:ext cx="2132512" cy="2462213"/>
+          </a:xfrm>
+          <a:prstGeom prst="rect">
+            <a:avLst/>
+          </a:prstGeom>
+          <a:noFill/>
+        </p:spPr>
+        <p:txBody>
+          <a:bodyPr wrap="square" rtlCol="0">
+            <a:spAutoFit/>
+          </a:bodyPr>
+          <a:lstStyle/>
+          <a:p>
+            <a:r>
+              <a:rPr lang="en-US" sz="1400" b="0" i="0" dirty="0">
+                <a:solidFill>
+                  <a:srgbClr val="786E6E"/>
+                </a:solidFill>
+                <a:effectLst/>
+                <a:latin typeface="Open Sans" panose="020B0606030504020204" pitchFamily="34" charset="0"/>
+              </a:rPr>
+              <a:t>Lorem ipsum dolor sit amet, consectetur adipiscing elit. Ut venenatis eget augue eget vulputate. Proin placerat est mattis dignissim blandit. Duis lectus diam, scelerisque sed posuere blandit, euismod sit amet sem</a:t>
+            </a:r>
+            <a:endParaRPr lang="en-US" sz="1400" dirty="0">
+              <a:solidFill>
+                <a:srgbClr val="786E6E"/>
+              </a:solidFill>
+            </a:endParaRPr>
+          </a:p>
+        </p:txBody>
+      </p:sp>
+    </p:spTree>
+    <p:extLst>
+      <p:ext uri="{BB962C8B-B14F-4D97-AF65-F5344CB8AC3E}">
+        <p14:creationId xmlns:p14="http://schemas.microsoft.com/office/powerpoint/2010/main" val="2963159764"/>
+      </p:ext>
+    </p:extLst>
+  </p:cSld>
+  <p:clrMapOvr>
+    <a:masterClrMapping/>
+  </p:clrMapOvr>
+</p:sld>
+</file>
+
+<file path=ppt/slides/slide25.xml><?xml version="1.0" encoding="utf-8"?>
+<p:sld xmlns:a="http://schemas.openxmlformats.org/drawingml/2006/main" xmlns:r="http://schemas.openxmlformats.org/officeDocument/2006/relationships" xmlns:p="http://schemas.openxmlformats.org/presentationml/2006/main">
+  <p:cSld>
+    <p:spTree>
+      <p:nvGrpSpPr>
+        <p:cNvPr id="1" name=""/>
+        <p:cNvGrpSpPr/>
+        <p:nvPr/>
+      </p:nvGrpSpPr>
+      <p:grpSpPr>
+        <a:xfrm>
+          <a:off x="0" y="0"/>
+          <a:ext cx="0" cy="0"/>
+          <a:chOff x="0" y="0"/>
+          <a:chExt cx="0" cy="0"/>
+        </a:xfrm>
+      </p:grpSpPr>
+      <p:sp>
+        <p:nvSpPr>
+          <p:cNvPr id="6" name="TextBox 5">
+            <a:extLst>
+              <a:ext uri="{FF2B5EF4-FFF2-40B4-BE49-F238E27FC236}">
+                <a16:creationId xmlns:a16="http://schemas.microsoft.com/office/drawing/2014/main" id="{2527CE40-CEEB-4F33-AC48-12DC1AF66A59}"/>
+              </a:ext>
+            </a:extLst>
+          </p:cNvPr>
+          <p:cNvSpPr txBox="1"/>
+          <p:nvPr/>
+        </p:nvSpPr>
+        <p:spPr>
+          <a:xfrm>
+            <a:off x="1619250" y="2047875"/>
+            <a:ext cx="5289550" cy="3211007"/>
+          </a:xfrm>
+          <a:prstGeom prst="rect">
+            <a:avLst/>
+          </a:prstGeom>
+          <a:noFill/>
+        </p:spPr>
+        <p:txBody>
+          <a:bodyPr wrap="square" rtlCol="0">
+            <a:spAutoFit/>
+          </a:bodyPr>
+          <a:lstStyle/>
+          <a:p>
+            <a:pPr algn="ctr">
+              <a:lnSpc>
+                <a:spcPct val="150000"/>
+              </a:lnSpc>
+            </a:pPr>
+            <a:r>
+              <a:rPr lang="en-US" sz="7200" b="1" dirty="0">
+                <a:solidFill>
+                  <a:schemeClr val="accent6"/>
+                </a:solidFill>
+              </a:rPr>
+              <a:t>Can I get in?</a:t>
+            </a:r>
+          </a:p>
+        </p:txBody>
+      </p:sp>
+      <p:pic>
+        <p:nvPicPr>
+          <p:cNvPr id="3" name="Picture 2">
+            <a:extLst>
+              <a:ext uri="{FF2B5EF4-FFF2-40B4-BE49-F238E27FC236}">
+                <a16:creationId xmlns:a16="http://schemas.microsoft.com/office/drawing/2014/main" id="{CF7B6682-9F3E-46BA-B61F-4A3B9F176540}"/>
+              </a:ext>
+            </a:extLst>
+          </p:cNvPr>
+          <p:cNvPicPr>
+            <a:picLocks noChangeAspect="1"/>
+          </p:cNvPicPr>
+          <p:nvPr/>
+        </p:nvPicPr>
+        <p:blipFill>
+          <a:blip r:embed="rId2">
+            <a:duotone>
+              <a:schemeClr val="accent6">
+                <a:shade val="45000"/>
+                <a:satMod val="135000"/>
+              </a:schemeClr>
+              <a:prstClr val="white"/>
+            </a:duotone>
+          </a:blip>
+          <a:stretch>
+            <a:fillRect/>
+          </a:stretch>
+        </p:blipFill>
+        <p:spPr>
+          <a:xfrm>
+            <a:off x="8089900" y="1924050"/>
+            <a:ext cx="3009900" cy="3009900"/>
+          </a:xfrm>
+          <a:prstGeom prst="rect">
+            <a:avLst/>
+          </a:prstGeom>
+        </p:spPr>
+      </p:pic>
+    </p:spTree>
+    <p:extLst>
+      <p:ext uri="{BB962C8B-B14F-4D97-AF65-F5344CB8AC3E}">
+        <p14:creationId xmlns:p14="http://schemas.microsoft.com/office/powerpoint/2010/main" val="2337597564"/>
+      </p:ext>
+    </p:extLst>
+  </p:cSld>
+  <p:clrMapOvr>
+    <a:masterClrMapping/>
+  </p:clrMapOvr>
+</p:sld>
+</file>
+
+<file path=ppt/slides/slide26.xml><?xml version="1.0" encoding="utf-8"?>
+<p:sld xmlns:a="http://schemas.openxmlformats.org/drawingml/2006/main" xmlns:r="http://schemas.openxmlformats.org/officeDocument/2006/relationships" xmlns:p="http://schemas.openxmlformats.org/presentationml/2006/main">
+  <p:cSld>
+    <p:spTree>
+      <p:nvGrpSpPr>
+        <p:cNvPr id="1" name=""/>
+        <p:cNvGrpSpPr/>
+        <p:nvPr/>
+      </p:nvGrpSpPr>
+      <p:grpSpPr>
+        <a:xfrm>
+          <a:off x="0" y="0"/>
+          <a:ext cx="0" cy="0"/>
+          <a:chOff x="0" y="0"/>
+          <a:chExt cx="0" cy="0"/>
+        </a:xfrm>
+      </p:grpSpPr>
+      <p:sp>
+        <p:nvSpPr>
+          <p:cNvPr id="6" name="TextBox 5">
+            <a:extLst>
+              <a:ext uri="{FF2B5EF4-FFF2-40B4-BE49-F238E27FC236}">
+                <a16:creationId xmlns:a16="http://schemas.microsoft.com/office/drawing/2014/main" id="{2527CE40-CEEB-4F33-AC48-12DC1AF66A59}"/>
+              </a:ext>
+            </a:extLst>
+          </p:cNvPr>
+          <p:cNvSpPr txBox="1"/>
+          <p:nvPr/>
+        </p:nvSpPr>
+        <p:spPr>
+          <a:xfrm>
+            <a:off x="1035050" y="2136775"/>
+            <a:ext cx="6521450" cy="1549014"/>
+          </a:xfrm>
+          <a:prstGeom prst="rect">
+            <a:avLst/>
+          </a:prstGeom>
+          <a:noFill/>
+        </p:spPr>
+        <p:txBody>
+          <a:bodyPr wrap="square" rtlCol="0">
+            <a:spAutoFit/>
+          </a:bodyPr>
+          <a:lstStyle/>
+          <a:p>
+            <a:pPr algn="ctr">
+              <a:lnSpc>
+                <a:spcPct val="150000"/>
+              </a:lnSpc>
+            </a:pPr>
+            <a:r>
+              <a:rPr lang="en-US" sz="7200" b="1" dirty="0">
+                <a:solidFill>
+                  <a:schemeClr val="accent6"/>
+                </a:solidFill>
+              </a:rPr>
+              <a:t>Can I get out?</a:t>
+            </a:r>
+          </a:p>
+        </p:txBody>
+      </p:sp>
+      <p:pic>
+        <p:nvPicPr>
+          <p:cNvPr id="8" name="Picture 7">
+            <a:extLst>
+              <a:ext uri="{FF2B5EF4-FFF2-40B4-BE49-F238E27FC236}">
+                <a16:creationId xmlns:a16="http://schemas.microsoft.com/office/drawing/2014/main" id="{568890B8-5F2E-4888-A448-992028272183}"/>
+              </a:ext>
+            </a:extLst>
+          </p:cNvPr>
+          <p:cNvPicPr>
+            <a:picLocks noChangeAspect="1"/>
+          </p:cNvPicPr>
+          <p:nvPr/>
+        </p:nvPicPr>
+        <p:blipFill>
+          <a:blip r:embed="rId2">
+            <a:duotone>
+              <a:schemeClr val="accent6">
+                <a:shade val="45000"/>
+                <a:satMod val="135000"/>
+              </a:schemeClr>
+              <a:prstClr val="white"/>
+            </a:duotone>
+          </a:blip>
+          <a:stretch>
+            <a:fillRect/>
+          </a:stretch>
+        </p:blipFill>
+        <p:spPr>
+          <a:xfrm>
+            <a:off x="8242300" y="1777614"/>
+            <a:ext cx="3200400" cy="3200400"/>
+          </a:xfrm>
+          <a:prstGeom prst="rect">
+            <a:avLst/>
+          </a:prstGeom>
+        </p:spPr>
+      </p:pic>
+    </p:spTree>
+    <p:extLst>
+      <p:ext uri="{BB962C8B-B14F-4D97-AF65-F5344CB8AC3E}">
+        <p14:creationId xmlns:p14="http://schemas.microsoft.com/office/powerpoint/2010/main" val="2142660946"/>
+      </p:ext>
+    </p:extLst>
+  </p:cSld>
+  <p:clrMapOvr>
+    <a:masterClrMapping/>
+  </p:clrMapOvr>
+</p:sld>
+</file>
+
+<file path=ppt/slides/slide27.xml><?xml version="1.0" encoding="utf-8"?>
+<p:sld xmlns:a="http://schemas.openxmlformats.org/drawingml/2006/main" xmlns:r="http://schemas.openxmlformats.org/officeDocument/2006/relationships" xmlns:p="http://schemas.openxmlformats.org/presentationml/2006/main">
+  <p:cSld>
+    <p:spTree>
+      <p:nvGrpSpPr>
+        <p:cNvPr id="1" name=""/>
+        <p:cNvGrpSpPr/>
+        <p:nvPr/>
+      </p:nvGrpSpPr>
+      <p:grpSpPr>
+        <a:xfrm>
+          <a:off x="0" y="0"/>
+          <a:ext cx="0" cy="0"/>
+          <a:chOff x="0" y="0"/>
+          <a:chExt cx="0" cy="0"/>
+        </a:xfrm>
+      </p:grpSpPr>
+      <p:sp>
+        <p:nvSpPr>
+          <p:cNvPr id="6" name="TextBox 5">
+            <a:extLst>
+              <a:ext uri="{FF2B5EF4-FFF2-40B4-BE49-F238E27FC236}">
+                <a16:creationId xmlns:a16="http://schemas.microsoft.com/office/drawing/2014/main" id="{2527CE40-CEEB-4F33-AC48-12DC1AF66A59}"/>
+              </a:ext>
+            </a:extLst>
+          </p:cNvPr>
+          <p:cNvSpPr txBox="1"/>
+          <p:nvPr/>
+        </p:nvSpPr>
+        <p:spPr>
+          <a:xfrm>
+            <a:off x="254000" y="2124075"/>
+            <a:ext cx="8229600" cy="1549014"/>
+          </a:xfrm>
+          <a:prstGeom prst="rect">
+            <a:avLst/>
+          </a:prstGeom>
+          <a:noFill/>
+        </p:spPr>
+        <p:txBody>
+          <a:bodyPr wrap="square" rtlCol="0">
+            <a:spAutoFit/>
+          </a:bodyPr>
+          <a:lstStyle/>
+          <a:p>
+            <a:pPr algn="ctr">
+              <a:lnSpc>
+                <a:spcPct val="150000"/>
+              </a:lnSpc>
+            </a:pPr>
+            <a:r>
+              <a:rPr lang="en-US" sz="7200" b="1" dirty="0">
+                <a:solidFill>
+                  <a:schemeClr val="accent6"/>
+                </a:solidFill>
+              </a:rPr>
+              <a:t>… and my future?</a:t>
+            </a:r>
+          </a:p>
+        </p:txBody>
+      </p:sp>
+      <p:pic>
+        <p:nvPicPr>
+          <p:cNvPr id="4" name="Picture 3">
+            <a:extLst>
+              <a:ext uri="{FF2B5EF4-FFF2-40B4-BE49-F238E27FC236}">
+                <a16:creationId xmlns:a16="http://schemas.microsoft.com/office/drawing/2014/main" id="{F87565B4-F909-47D0-805B-FB2FA6764199}"/>
+              </a:ext>
+            </a:extLst>
+          </p:cNvPr>
+          <p:cNvPicPr>
+            <a:picLocks noChangeAspect="1"/>
+          </p:cNvPicPr>
+          <p:nvPr/>
+        </p:nvPicPr>
+        <p:blipFill>
+          <a:blip r:embed="rId2">
+            <a:duotone>
+              <a:schemeClr val="accent6">
+                <a:shade val="45000"/>
+                <a:satMod val="135000"/>
+              </a:schemeClr>
+              <a:prstClr val="white"/>
+            </a:duotone>
+          </a:blip>
+          <a:stretch>
+            <a:fillRect/>
+          </a:stretch>
+        </p:blipFill>
+        <p:spPr>
+          <a:xfrm>
+            <a:off x="8842375" y="1958974"/>
+            <a:ext cx="2676525" cy="2676525"/>
+          </a:xfrm>
+          <a:prstGeom prst="rect">
+            <a:avLst/>
+          </a:prstGeom>
+        </p:spPr>
+      </p:pic>
+    </p:spTree>
+    <p:extLst>
+      <p:ext uri="{BB962C8B-B14F-4D97-AF65-F5344CB8AC3E}">
+        <p14:creationId xmlns:p14="http://schemas.microsoft.com/office/powerpoint/2010/main" val="1286827543"/>
+      </p:ext>
+    </p:extLst>
+  </p:cSld>
+  <p:clrMapOvr>
+    <a:masterClrMapping/>
+  </p:clrMapOvr>
+</p:sld>
+</file>
+
+<file path=ppt/slides/slide28.xml><?xml version="1.0" encoding="utf-8"?>
+<p:sld xmlns:a="http://schemas.openxmlformats.org/drawingml/2006/main" xmlns:r="http://schemas.openxmlformats.org/officeDocument/2006/relationships" xmlns:p="http://schemas.openxmlformats.org/presentationml/2006/main">
+  <p:cSld>
+    <p:spTree>
+      <p:nvGrpSpPr>
+        <p:cNvPr id="1" name=""/>
+        <p:cNvGrpSpPr/>
+        <p:nvPr/>
+      </p:nvGrpSpPr>
+      <p:grpSpPr>
+        <a:xfrm>
+          <a:off x="0" y="0"/>
+          <a:ext cx="0" cy="0"/>
+          <a:chOff x="0" y="0"/>
+          <a:chExt cx="0" cy="0"/>
+        </a:xfrm>
+      </p:grpSpPr>
+      <p:pic>
+        <p:nvPicPr>
+          <p:cNvPr id="2" name="Picture 1">
+            <a:extLst>
+              <a:ext uri="{FF2B5EF4-FFF2-40B4-BE49-F238E27FC236}">
+                <a16:creationId xmlns:a16="http://schemas.microsoft.com/office/drawing/2014/main" id="{F65A6E3E-4E1D-4355-B281-06B30C083271}"/>
+              </a:ext>
+            </a:extLst>
+          </p:cNvPr>
+          <p:cNvPicPr>
+            <a:picLocks noChangeAspect="1"/>
+          </p:cNvPicPr>
+          <p:nvPr/>
+        </p:nvPicPr>
+        <p:blipFill>
+          <a:blip r:embed="rId2"/>
+          <a:stretch>
+            <a:fillRect/>
+          </a:stretch>
+        </p:blipFill>
+        <p:spPr>
+          <a:xfrm>
+            <a:off x="0" y="933994"/>
+            <a:ext cx="12192000" cy="4990011"/>
+          </a:xfrm>
+          <a:prstGeom prst="rect">
+            <a:avLst/>
+          </a:prstGeom>
+        </p:spPr>
+      </p:pic>
+    </p:spTree>
+    <p:extLst>
+      <p:ext uri="{BB962C8B-B14F-4D97-AF65-F5344CB8AC3E}">
+        <p14:creationId xmlns:p14="http://schemas.microsoft.com/office/powerpoint/2010/main" val="3839672882"/>
+      </p:ext>
+    </p:extLst>
+  </p:cSld>
+  <p:clrMapOvr>
+    <a:masterClrMapping/>
+  </p:clrMapOvr>
+</p:sld>
+</file>
+
+<file path=ppt/slides/slide29.xml><?xml version="1.0" encoding="utf-8"?>
+<p:sld xmlns:a="http://schemas.openxmlformats.org/drawingml/2006/main" xmlns:r="http://schemas.openxmlformats.org/officeDocument/2006/relationships" xmlns:p="http://schemas.openxmlformats.org/presentationml/2006/main">
+  <p:cSld>
+    <p:spTree>
+      <p:nvGrpSpPr>
+        <p:cNvPr id="1" name=""/>
+        <p:cNvGrpSpPr/>
+        <p:nvPr/>
+      </p:nvGrpSpPr>
+      <p:grpSpPr>
+        <a:xfrm>
+          <a:off x="0" y="0"/>
+          <a:ext cx="0" cy="0"/>
+          <a:chOff x="0" y="0"/>
+          <a:chExt cx="0" cy="0"/>
+        </a:xfrm>
+      </p:grpSpPr>
+    </p:spTree>
+    <p:extLst>
+      <p:ext uri="{BB962C8B-B14F-4D97-AF65-F5344CB8AC3E}">
+        <p14:creationId xmlns:p14="http://schemas.microsoft.com/office/powerpoint/2010/main" val="3949269715"/>
+      </p:ext>
+    </p:extLst>
+  </p:cSld>
+  <p:clrMapOvr>
+    <a:masterClrMapping/>
+  </p:clrMapOvr>
+</p:sld>
+</file>
+
+<file path=ppt/slides/slide3.xml><?xml version="1.0" encoding="utf-8"?>
+<p:sld xmlns:a="http://schemas.openxmlformats.org/drawingml/2006/main" xmlns:r="http://schemas.openxmlformats.org/officeDocument/2006/relationships" xmlns:p="http://schemas.openxmlformats.org/presentationml/2006/main">
+  <p:cSld>
+    <p:spTree>
+      <p:nvGrpSpPr>
+        <p:cNvPr id="1" name=""/>
+        <p:cNvGrpSpPr/>
+        <p:nvPr/>
+      </p:nvGrpSpPr>
+      <p:grpSpPr>
+        <a:xfrm>
+          <a:off x="0" y="0"/>
+          <a:ext cx="0" cy="0"/>
+          <a:chOff x="0" y="0"/>
+          <a:chExt cx="0" cy="0"/>
+        </a:xfrm>
+      </p:grpSpPr>
+      <p:sp>
+        <p:nvSpPr>
+          <p:cNvPr id="2" name="Text Placeholder 1">
+            <a:extLst>
+              <a:ext uri="{FF2B5EF4-FFF2-40B4-BE49-F238E27FC236}">
+                <a16:creationId xmlns:a16="http://schemas.microsoft.com/office/drawing/2014/main" id="{853E6ABC-64F6-41BD-8F43-BD908D52D1E8}"/>
+              </a:ext>
+            </a:extLst>
+          </p:cNvPr>
+          <p:cNvSpPr>
+            <a:spLocks noGrp="1"/>
+          </p:cNvSpPr>
+          <p:nvPr>
+            <p:ph type="body" sz="quarter" idx="11"/>
+          </p:nvPr>
+        </p:nvSpPr>
+        <p:spPr>
+          <a:xfrm>
+            <a:off x="-18756" y="4734117"/>
+            <a:ext cx="4032739" cy="495108"/>
+          </a:xfrm>
+        </p:spPr>
+        <p:txBody>
+          <a:bodyPr/>
+          <a:lstStyle/>
+          <a:p>
+            <a:r>
+              <a:rPr lang="en-US" sz="1800" b="0" dirty="0">
+                <a:solidFill>
+                  <a:schemeClr val="bg1"/>
+                </a:solidFill>
+              </a:rPr>
+              <a:t>Project 1: Undergrad Tuition</a:t>
+            </a:r>
+            <a:endParaRPr lang="de-DE" noProof="0" dirty="0"/>
+          </a:p>
+        </p:txBody>
+      </p:sp>
+      <p:pic>
+        <p:nvPicPr>
+          <p:cNvPr id="4" name="Picture Placeholder 3">
+            <a:extLst>
+              <a:ext uri="{FF2B5EF4-FFF2-40B4-BE49-F238E27FC236}">
+                <a16:creationId xmlns:a16="http://schemas.microsoft.com/office/drawing/2014/main" id="{44F8D7A7-2563-44A7-AA56-D06E8C6DE972}"/>
+              </a:ext>
+            </a:extLst>
+          </p:cNvPr>
+          <p:cNvPicPr>
+            <a:picLocks noGrp="1" noChangeAspect="1"/>
+          </p:cNvPicPr>
+          <p:nvPr>
+            <p:ph type="pic" sz="quarter" idx="12"/>
+          </p:nvPr>
+        </p:nvPicPr>
+        <p:blipFill rotWithShape="1">
+          <a:blip r:embed="rId2"/>
+          <a:srcRect l="10740" r="10740"/>
+          <a:stretch/>
+        </p:blipFill>
+        <p:spPr>
+          <a:xfrm>
+            <a:off x="5219701" y="721596"/>
+            <a:ext cx="6486524" cy="5507390"/>
+          </a:xfrm>
+          <a:prstGeom prst="rect">
+            <a:avLst/>
+          </a:prstGeom>
+          <a:effectLst>
+            <a:softEdge rad="469900"/>
+          </a:effectLst>
+        </p:spPr>
+      </p:pic>
+      <p:sp>
+        <p:nvSpPr>
+          <p:cNvPr id="5" name="TextBox 4">
+            <a:extLst>
+              <a:ext uri="{FF2B5EF4-FFF2-40B4-BE49-F238E27FC236}">
+                <a16:creationId xmlns:a16="http://schemas.microsoft.com/office/drawing/2014/main" id="{B87581BE-8396-414F-9881-ABD2E818ADE8}"/>
+              </a:ext>
+            </a:extLst>
+          </p:cNvPr>
+          <p:cNvSpPr txBox="1"/>
+          <p:nvPr/>
+        </p:nvSpPr>
+        <p:spPr>
+          <a:xfrm>
+            <a:off x="695325" y="721596"/>
+            <a:ext cx="3829050" cy="3279424"/>
+          </a:xfrm>
+          <a:prstGeom prst="rect">
+            <a:avLst/>
+          </a:prstGeom>
+          <a:noFill/>
+        </p:spPr>
+        <p:txBody>
+          <a:bodyPr wrap="square" rtlCol="0">
+            <a:spAutoFit/>
+          </a:bodyPr>
+          <a:lstStyle/>
+          <a:p>
+            <a:pPr>
+              <a:lnSpc>
+                <a:spcPct val="150000"/>
+              </a:lnSpc>
+            </a:pPr>
+            <a:r>
+              <a:rPr lang="en-US" sz="4800" b="1" dirty="0">
+                <a:solidFill>
+                  <a:schemeClr val="accent6"/>
+                </a:solidFill>
+              </a:rPr>
+              <a:t>We have all seen the headlines …</a:t>
+            </a:r>
+          </a:p>
+        </p:txBody>
+      </p:sp>
+    </p:spTree>
+    <p:extLst>
+      <p:ext uri="{BB962C8B-B14F-4D97-AF65-F5344CB8AC3E}">
+        <p14:creationId xmlns:p14="http://schemas.microsoft.com/office/powerpoint/2010/main" val="3078574832"/>
+      </p:ext>
+    </p:extLst>
+  </p:cSld>
+  <p:clrMapOvr>
+    <a:masterClrMapping/>
+  </p:clrMapOvr>
+</p:sld>
+</file>
+
+<file path=ppt/slides/slide30.xml><?xml version="1.0" encoding="utf-8"?>
+<p:sld xmlns:a="http://schemas.openxmlformats.org/drawingml/2006/main" xmlns:r="http://schemas.openxmlformats.org/officeDocument/2006/relationships" xmlns:p="http://schemas.openxmlformats.org/presentationml/2006/main">
+  <p:cSld>
+    <p:spTree>
+      <p:nvGrpSpPr>
+        <p:cNvPr id="1" name=""/>
+        <p:cNvGrpSpPr/>
+        <p:nvPr/>
+      </p:nvGrpSpPr>
+      <p:grpSpPr>
+        <a:xfrm>
+          <a:off x="0" y="0"/>
+          <a:ext cx="0" cy="0"/>
+          <a:chOff x="0" y="0"/>
+          <a:chExt cx="0" cy="0"/>
+        </a:xfrm>
+      </p:grpSpPr>
+      <p:sp>
+        <p:nvSpPr>
+          <p:cNvPr id="2" name="Content Placeholder 1">
+            <a:extLst>
+              <a:ext uri="{FF2B5EF4-FFF2-40B4-BE49-F238E27FC236}">
+                <a16:creationId xmlns:a16="http://schemas.microsoft.com/office/drawing/2014/main" id="{0DBAF39D-5F98-4E1B-9ABF-8AA7152B85E4}"/>
+              </a:ext>
+            </a:extLst>
+          </p:cNvPr>
+          <p:cNvSpPr>
+            <a:spLocks noGrp="1"/>
+          </p:cNvSpPr>
+          <p:nvPr>
+            <p:ph idx="1"/>
+          </p:nvPr>
+        </p:nvSpPr>
+        <p:spPr/>
+        <p:txBody>
+          <a:bodyPr/>
+          <a:lstStyle/>
+          <a:p>
+            <a:endParaRPr lang="en-US" dirty="0"/>
+          </a:p>
+        </p:txBody>
+      </p:sp>
+      <p:sp>
+        <p:nvSpPr>
+          <p:cNvPr id="3" name="Title 2">
+            <a:extLst>
+              <a:ext uri="{FF2B5EF4-FFF2-40B4-BE49-F238E27FC236}">
+                <a16:creationId xmlns:a16="http://schemas.microsoft.com/office/drawing/2014/main" id="{ABA857AD-AE79-4871-A159-61A8AD407E99}"/>
+              </a:ext>
+            </a:extLst>
+          </p:cNvPr>
+          <p:cNvSpPr>
+            <a:spLocks noGrp="1"/>
+          </p:cNvSpPr>
+          <p:nvPr>
+            <p:ph type="title"/>
+          </p:nvPr>
+        </p:nvSpPr>
+        <p:spPr/>
+        <p:txBody>
+          <a:bodyPr/>
+          <a:lstStyle/>
+          <a:p>
+            <a:r>
+              <a:rPr lang="en-US" dirty="0"/>
+              <a:t>Potential Statistics</a:t>
+            </a:r>
+          </a:p>
+        </p:txBody>
+      </p:sp>
+    </p:spTree>
+    <p:extLst>
+      <p:ext uri="{BB962C8B-B14F-4D97-AF65-F5344CB8AC3E}">
+        <p14:creationId xmlns:p14="http://schemas.microsoft.com/office/powerpoint/2010/main" val="3603813485"/>
+      </p:ext>
+    </p:extLst>
+  </p:cSld>
+  <p:clrMapOvr>
+    <a:masterClrMapping/>
+  </p:clrMapOvr>
+</p:sld>
+</file>
+
+<file path=ppt/slides/slide31.xml><?xml version="1.0" encoding="utf-8"?>
+<p:sld xmlns:a="http://schemas.openxmlformats.org/drawingml/2006/main" xmlns:r="http://schemas.openxmlformats.org/officeDocument/2006/relationships" xmlns:p="http://schemas.openxmlformats.org/presentationml/2006/main">
+  <p:cSld>
+    <p:spTree>
+      <p:nvGrpSpPr>
+        <p:cNvPr id="1" name=""/>
+        <p:cNvGrpSpPr/>
+        <p:nvPr/>
+      </p:nvGrpSpPr>
+      <p:grpSpPr>
+        <a:xfrm>
+          <a:off x="0" y="0"/>
+          <a:ext cx="0" cy="0"/>
+          <a:chOff x="0" y="0"/>
+          <a:chExt cx="0" cy="0"/>
+        </a:xfrm>
+      </p:grpSpPr>
+      <p:sp>
+        <p:nvSpPr>
+          <p:cNvPr id="1682440" name="Rectangle 8"/>
+          <p:cNvSpPr>
+            <a:spLocks noGrp="1" noChangeArrowheads="1"/>
+          </p:cNvSpPr>
+          <p:nvPr>
+            <p:ph type="title"/>
+          </p:nvPr>
+        </p:nvSpPr>
+        <p:spPr/>
+        <p:txBody>
+          <a:bodyPr/>
+          <a:lstStyle/>
+          <a:p>
+            <a:r>
+              <a:rPr lang="en-US" dirty="0"/>
+              <a:t>“… when an online service is free, you’re not the customer. You’re the product.”</a:t>
+            </a:r>
+          </a:p>
+        </p:txBody>
+      </p:sp>
+      <p:sp>
+        <p:nvSpPr>
+          <p:cNvPr id="3" name="Rectangle 9"/>
+          <p:cNvSpPr>
+            <a:spLocks noGrp="1" noChangeArrowheads="1"/>
+          </p:cNvSpPr>
+          <p:nvPr>
+            <p:ph type="subTitle" idx="1"/>
+          </p:nvPr>
+        </p:nvSpPr>
+        <p:spPr/>
+        <p:txBody>
+          <a:bodyPr/>
+          <a:lstStyle/>
+          <a:p>
+            <a:r>
+              <a:rPr lang="en-US" dirty="0"/>
+              <a:t>Tim Cook, open letter to customers September 17, 2014</a:t>
+            </a:r>
+          </a:p>
+        </p:txBody>
+      </p:sp>
+    </p:spTree>
+    <p:extLst>
+      <p:ext uri="{BB962C8B-B14F-4D97-AF65-F5344CB8AC3E}">
+        <p14:creationId xmlns:p14="http://schemas.microsoft.com/office/powerpoint/2010/main" val="604499499"/>
+      </p:ext>
+    </p:extLst>
+  </p:cSld>
+  <p:clrMapOvr>
+    <a:masterClrMapping/>
+  </p:clrMapOvr>
+</p:sld>
+</file>
+
+<file path=ppt/slides/slide32.xml><?xml version="1.0" encoding="utf-8"?>
+<p:sld xmlns:a="http://schemas.openxmlformats.org/drawingml/2006/main" xmlns:r="http://schemas.openxmlformats.org/officeDocument/2006/relationships" xmlns:p="http://schemas.openxmlformats.org/presentationml/2006/main">
+  <p:cSld>
+    <p:spTree>
+      <p:nvGrpSpPr>
+        <p:cNvPr id="1" name=""/>
+        <p:cNvGrpSpPr/>
+        <p:nvPr/>
+      </p:nvGrpSpPr>
+      <p:grpSpPr>
+        <a:xfrm>
+          <a:off x="0" y="0"/>
+          <a:ext cx="0" cy="0"/>
+          <a:chOff x="0" y="0"/>
+          <a:chExt cx="0" cy="0"/>
+        </a:xfrm>
+      </p:grpSpPr>
+      <p:sp>
+        <p:nvSpPr>
+          <p:cNvPr id="7" name="Rectangle 6"/>
+          <p:cNvSpPr/>
+          <p:nvPr/>
+        </p:nvSpPr>
+        <p:spPr>
+          <a:xfrm>
+            <a:off x="5029200" y="927100"/>
+            <a:ext cx="2374900" cy="1701800"/>
+          </a:xfrm>
+          <a:prstGeom prst="rect">
+            <a:avLst/>
+          </a:prstGeom>
+          <a:solidFill>
+            <a:schemeClr val="bg2"/>
+          </a:solidFill>
+        </p:spPr>
+        <p:style>
+          <a:lnRef idx="2">
+            <a:schemeClr val="accent1">
+              <a:shade val="50000"/>
+            </a:schemeClr>
+          </a:lnRef>
+          <a:fillRef idx="1">
+            <a:schemeClr val="accent1"/>
+          </a:fillRef>
+          <a:effectRef idx="0">
+            <a:schemeClr val="accent1"/>
+          </a:effectRef>
+          <a:fontRef idx="minor">
+            <a:schemeClr val="lt1"/>
+          </a:fontRef>
+        </p:style>
+        <p:txBody>
+          <a:bodyPr rtlCol="0" anchor="ctr"/>
+          <a:lstStyle/>
+          <a:p>
+            <a:pPr algn="ctr" defTabSz="914400"/>
+            <a:endParaRPr lang="en-US" dirty="0">
+              <a:solidFill>
+                <a:prstClr val="white"/>
+              </a:solidFill>
+            </a:endParaRPr>
+          </a:p>
+        </p:txBody>
+      </p:sp>
+      <p:sp>
+        <p:nvSpPr>
+          <p:cNvPr id="8" name="Rectangle 7"/>
+          <p:cNvSpPr/>
+          <p:nvPr/>
+        </p:nvSpPr>
+        <p:spPr>
+          <a:xfrm>
+            <a:off x="7620000" y="927100"/>
+            <a:ext cx="2374900" cy="1701800"/>
+          </a:xfrm>
+          <a:prstGeom prst="rect">
+            <a:avLst/>
+          </a:prstGeom>
+          <a:solidFill>
+            <a:schemeClr val="tx2"/>
+          </a:solidFill>
+        </p:spPr>
+        <p:style>
+          <a:lnRef idx="2">
+            <a:schemeClr val="accent1">
+              <a:shade val="50000"/>
+            </a:schemeClr>
+          </a:lnRef>
+          <a:fillRef idx="1">
+            <a:schemeClr val="accent1"/>
+          </a:fillRef>
+          <a:effectRef idx="0">
+            <a:schemeClr val="accent1"/>
+          </a:effectRef>
+          <a:fontRef idx="minor">
+            <a:schemeClr val="lt1"/>
+          </a:fontRef>
+        </p:style>
+        <p:txBody>
+          <a:bodyPr rtlCol="0" anchor="ctr"/>
+          <a:lstStyle/>
+          <a:p>
+            <a:pPr algn="ctr" defTabSz="914400"/>
+            <a:endParaRPr lang="en-US" dirty="0">
+              <a:solidFill>
+                <a:prstClr val="white"/>
+              </a:solidFill>
+            </a:endParaRPr>
+          </a:p>
+        </p:txBody>
+      </p:sp>
+      <p:sp>
+        <p:nvSpPr>
+          <p:cNvPr id="9" name="Rectangle 8"/>
+          <p:cNvSpPr/>
+          <p:nvPr/>
+        </p:nvSpPr>
+        <p:spPr>
+          <a:xfrm>
+            <a:off x="2298700" y="2908300"/>
+            <a:ext cx="2374900" cy="1701800"/>
+          </a:xfrm>
+          <a:prstGeom prst="rect">
+            <a:avLst/>
+          </a:prstGeom>
+          <a:solidFill>
+            <a:schemeClr val="accent1"/>
+          </a:solidFill>
+        </p:spPr>
+        <p:style>
+          <a:lnRef idx="2">
+            <a:schemeClr val="accent1">
+              <a:shade val="50000"/>
+            </a:schemeClr>
+          </a:lnRef>
+          <a:fillRef idx="1">
+            <a:schemeClr val="accent1"/>
+          </a:fillRef>
+          <a:effectRef idx="0">
+            <a:schemeClr val="accent1"/>
+          </a:effectRef>
+          <a:fontRef idx="minor">
+            <a:schemeClr val="lt1"/>
+          </a:fontRef>
+        </p:style>
+        <p:txBody>
+          <a:bodyPr rtlCol="0" anchor="ctr"/>
+          <a:lstStyle/>
+          <a:p>
+            <a:pPr algn="ctr" defTabSz="914400"/>
+            <a:endParaRPr lang="en-US" dirty="0">
+              <a:solidFill>
+                <a:prstClr val="white"/>
+              </a:solidFill>
+            </a:endParaRPr>
+          </a:p>
+        </p:txBody>
+      </p:sp>
+      <p:sp>
+        <p:nvSpPr>
+          <p:cNvPr id="10" name="Rectangle 9"/>
+          <p:cNvSpPr/>
+          <p:nvPr/>
+        </p:nvSpPr>
+        <p:spPr>
+          <a:xfrm>
+            <a:off x="5029200" y="2908300"/>
+            <a:ext cx="2374900" cy="1701800"/>
+          </a:xfrm>
+          <a:prstGeom prst="rect">
+            <a:avLst/>
+          </a:prstGeom>
+          <a:solidFill>
+            <a:schemeClr val="accent2"/>
+          </a:solidFill>
+        </p:spPr>
+        <p:style>
+          <a:lnRef idx="2">
+            <a:schemeClr val="accent1">
+              <a:shade val="50000"/>
+            </a:schemeClr>
+          </a:lnRef>
+          <a:fillRef idx="1">
+            <a:schemeClr val="accent1"/>
+          </a:fillRef>
+          <a:effectRef idx="0">
+            <a:schemeClr val="accent1"/>
+          </a:effectRef>
+          <a:fontRef idx="minor">
+            <a:schemeClr val="lt1"/>
+          </a:fontRef>
+        </p:style>
+        <p:txBody>
+          <a:bodyPr rtlCol="0" anchor="ctr"/>
+          <a:lstStyle/>
+          <a:p>
+            <a:pPr algn="ctr" defTabSz="914400"/>
+            <a:endParaRPr lang="en-US" dirty="0">
+              <a:solidFill>
+                <a:prstClr val="white"/>
+              </a:solidFill>
+            </a:endParaRPr>
+          </a:p>
+        </p:txBody>
+      </p:sp>
+      <p:sp>
+        <p:nvSpPr>
+          <p:cNvPr id="11" name="Rectangle 10"/>
+          <p:cNvSpPr/>
+          <p:nvPr/>
+        </p:nvSpPr>
+        <p:spPr>
+          <a:xfrm>
+            <a:off x="7620000" y="2908300"/>
+            <a:ext cx="2374900" cy="1701800"/>
+          </a:xfrm>
+          <a:prstGeom prst="rect">
+            <a:avLst/>
+          </a:prstGeom>
+          <a:solidFill>
+            <a:schemeClr val="accent3"/>
+          </a:solidFill>
+        </p:spPr>
+        <p:style>
+          <a:lnRef idx="2">
+            <a:schemeClr val="accent1">
+              <a:shade val="50000"/>
+            </a:schemeClr>
+          </a:lnRef>
+          <a:fillRef idx="1">
+            <a:schemeClr val="accent1"/>
+          </a:fillRef>
+          <a:effectRef idx="0">
+            <a:schemeClr val="accent1"/>
+          </a:effectRef>
+          <a:fontRef idx="minor">
+            <a:schemeClr val="lt1"/>
+          </a:fontRef>
+        </p:style>
+        <p:txBody>
+          <a:bodyPr rtlCol="0" anchor="ctr"/>
+          <a:lstStyle/>
+          <a:p>
+            <a:pPr algn="ctr" defTabSz="914400"/>
+            <a:endParaRPr lang="en-US" dirty="0">
+              <a:solidFill>
+                <a:prstClr val="white"/>
+              </a:solidFill>
+            </a:endParaRPr>
+          </a:p>
+        </p:txBody>
+      </p:sp>
+      <p:sp>
+        <p:nvSpPr>
+          <p:cNvPr id="12" name="Rectangle 11"/>
+          <p:cNvSpPr/>
+          <p:nvPr/>
+        </p:nvSpPr>
+        <p:spPr>
+          <a:xfrm>
+            <a:off x="2298700" y="4876800"/>
+            <a:ext cx="2374900" cy="1701800"/>
+          </a:xfrm>
+          <a:prstGeom prst="rect">
+            <a:avLst/>
+          </a:prstGeom>
+          <a:solidFill>
+            <a:schemeClr val="accent4"/>
+          </a:solidFill>
+        </p:spPr>
+        <p:style>
+          <a:lnRef idx="2">
+            <a:schemeClr val="accent1">
+              <a:shade val="50000"/>
+            </a:schemeClr>
+          </a:lnRef>
+          <a:fillRef idx="1">
+            <a:schemeClr val="accent1"/>
+          </a:fillRef>
+          <a:effectRef idx="0">
+            <a:schemeClr val="accent1"/>
+          </a:effectRef>
+          <a:fontRef idx="minor">
+            <a:schemeClr val="lt1"/>
+          </a:fontRef>
+        </p:style>
+        <p:txBody>
+          <a:bodyPr rtlCol="0" anchor="ctr"/>
+          <a:lstStyle/>
+          <a:p>
+            <a:pPr algn="ctr" defTabSz="914400"/>
+            <a:endParaRPr lang="en-US" dirty="0">
+              <a:solidFill>
+                <a:prstClr val="white"/>
+              </a:solidFill>
+            </a:endParaRPr>
+          </a:p>
+        </p:txBody>
+      </p:sp>
+      <p:sp>
+        <p:nvSpPr>
+          <p:cNvPr id="13" name="Rectangle 12"/>
+          <p:cNvSpPr/>
+          <p:nvPr/>
+        </p:nvSpPr>
+        <p:spPr>
+          <a:xfrm>
+            <a:off x="5029200" y="4889500"/>
+            <a:ext cx="2374900" cy="1701800"/>
+          </a:xfrm>
+          <a:prstGeom prst="rect">
+            <a:avLst/>
+          </a:prstGeom>
+          <a:solidFill>
+            <a:schemeClr val="accent5"/>
+          </a:solidFill>
+        </p:spPr>
+        <p:style>
+          <a:lnRef idx="2">
+            <a:schemeClr val="accent1">
+              <a:shade val="50000"/>
+            </a:schemeClr>
+          </a:lnRef>
+          <a:fillRef idx="1">
+            <a:schemeClr val="accent1"/>
+          </a:fillRef>
+          <a:effectRef idx="0">
+            <a:schemeClr val="accent1"/>
+          </a:effectRef>
+          <a:fontRef idx="minor">
+            <a:schemeClr val="lt1"/>
+          </a:fontRef>
+        </p:style>
+        <p:txBody>
+          <a:bodyPr rtlCol="0" anchor="ctr"/>
+          <a:lstStyle/>
+          <a:p>
+            <a:pPr algn="ctr" defTabSz="914400"/>
+            <a:endParaRPr lang="en-US" dirty="0">
+              <a:solidFill>
+                <a:prstClr val="white"/>
+              </a:solidFill>
+            </a:endParaRPr>
+          </a:p>
+        </p:txBody>
+      </p:sp>
+      <p:sp>
+        <p:nvSpPr>
+          <p:cNvPr id="14" name="Rectangle 13"/>
+          <p:cNvSpPr/>
+          <p:nvPr/>
+        </p:nvSpPr>
+        <p:spPr>
+          <a:xfrm>
+            <a:off x="7620000" y="4889500"/>
+            <a:ext cx="2374900" cy="1701800"/>
+          </a:xfrm>
+          <a:prstGeom prst="rect">
+            <a:avLst/>
+          </a:prstGeom>
+          <a:solidFill>
+            <a:schemeClr val="accent6"/>
+          </a:solidFill>
+        </p:spPr>
+        <p:style>
+          <a:lnRef idx="2">
+            <a:schemeClr val="accent1">
+              <a:shade val="50000"/>
+            </a:schemeClr>
+          </a:lnRef>
+          <a:fillRef idx="1">
+            <a:schemeClr val="accent1"/>
+          </a:fillRef>
+          <a:effectRef idx="0">
+            <a:schemeClr val="accent1"/>
+          </a:effectRef>
+          <a:fontRef idx="minor">
+            <a:schemeClr val="lt1"/>
+          </a:fontRef>
+        </p:style>
+        <p:txBody>
+          <a:bodyPr rtlCol="0" anchor="ctr"/>
+          <a:lstStyle/>
+          <a:p>
+            <a:pPr algn="ctr" defTabSz="914400"/>
+            <a:endParaRPr lang="en-US" dirty="0">
+              <a:solidFill>
+                <a:prstClr val="white"/>
+              </a:solidFill>
+            </a:endParaRPr>
+          </a:p>
+        </p:txBody>
+      </p:sp>
+      <p:sp>
+        <p:nvSpPr>
+          <p:cNvPr id="15" name="Rectangle 14"/>
+          <p:cNvSpPr/>
+          <p:nvPr/>
+        </p:nvSpPr>
+        <p:spPr>
+          <a:xfrm>
+            <a:off x="2298700" y="939800"/>
+            <a:ext cx="1181100" cy="1701800"/>
+          </a:xfrm>
+          <a:prstGeom prst="rect">
+            <a:avLst/>
+          </a:prstGeom>
+          <a:solidFill>
+            <a:schemeClr val="bg1"/>
+          </a:solidFill>
+        </p:spPr>
+        <p:style>
+          <a:lnRef idx="2">
+            <a:schemeClr val="accent1">
+              <a:shade val="50000"/>
+            </a:schemeClr>
+          </a:lnRef>
+          <a:fillRef idx="1">
+            <a:schemeClr val="accent1"/>
+          </a:fillRef>
+          <a:effectRef idx="0">
+            <a:schemeClr val="accent1"/>
+          </a:effectRef>
+          <a:fontRef idx="minor">
+            <a:schemeClr val="lt1"/>
+          </a:fontRef>
+        </p:style>
+        <p:txBody>
+          <a:bodyPr rtlCol="0" anchor="ctr"/>
+          <a:lstStyle/>
+          <a:p>
+            <a:pPr algn="ctr" defTabSz="914400"/>
+            <a:endParaRPr lang="en-US" dirty="0">
+              <a:solidFill>
+                <a:prstClr val="white"/>
+              </a:solidFill>
+            </a:endParaRPr>
+          </a:p>
+        </p:txBody>
+      </p:sp>
+      <p:sp>
+        <p:nvSpPr>
+          <p:cNvPr id="16" name="Rectangle 15"/>
+          <p:cNvSpPr/>
+          <p:nvPr/>
+        </p:nvSpPr>
+        <p:spPr>
+          <a:xfrm>
+            <a:off x="3492500" y="939800"/>
+            <a:ext cx="1181100" cy="1701800"/>
+          </a:xfrm>
+          <a:prstGeom prst="rect">
+            <a:avLst/>
+          </a:prstGeom>
+          <a:solidFill>
+            <a:schemeClr val="tx1"/>
+          </a:solidFill>
+        </p:spPr>
+        <p:style>
+          <a:lnRef idx="2">
+            <a:schemeClr val="accent1">
+              <a:shade val="50000"/>
+            </a:schemeClr>
+          </a:lnRef>
+          <a:fillRef idx="1">
+            <a:schemeClr val="accent1"/>
+          </a:fillRef>
+          <a:effectRef idx="0">
+            <a:schemeClr val="accent1"/>
+          </a:effectRef>
+          <a:fontRef idx="minor">
+            <a:schemeClr val="lt1"/>
+          </a:fontRef>
+        </p:style>
+        <p:txBody>
+          <a:bodyPr rtlCol="0" anchor="ctr"/>
+          <a:lstStyle/>
+          <a:p>
+            <a:pPr algn="ctr" defTabSz="914400"/>
+            <a:endParaRPr lang="en-US" dirty="0">
+              <a:solidFill>
+                <a:prstClr val="white"/>
+              </a:solidFill>
+            </a:endParaRPr>
+          </a:p>
+        </p:txBody>
+      </p:sp>
+    </p:spTree>
+    <p:extLst>
+      <p:ext uri="{BB962C8B-B14F-4D97-AF65-F5344CB8AC3E}">
+        <p14:creationId xmlns:p14="http://schemas.microsoft.com/office/powerpoint/2010/main" val="1548161044"/>
+      </p:ext>
+    </p:extLst>
+  </p:cSld>
+  <p:clrMapOvr>
+    <a:masterClrMapping/>
+  </p:clrMapOvr>
+</p:sld>
+</file>
+
+<file path=ppt/slides/slide4.xml><?xml version="1.0" encoding="utf-8"?>
+<p:sld xmlns:a="http://schemas.openxmlformats.org/drawingml/2006/main" xmlns:r="http://schemas.openxmlformats.org/officeDocument/2006/relationships" xmlns:p="http://schemas.openxmlformats.org/presentationml/2006/main">
+  <p:cSld>
+    <p:spTree>
+      <p:nvGrpSpPr>
+        <p:cNvPr id="1" name=""/>
+        <p:cNvGrpSpPr/>
+        <p:nvPr/>
+      </p:nvGrpSpPr>
+      <p:grpSpPr>
+        <a:xfrm>
+          <a:off x="0" y="0"/>
+          <a:ext cx="0" cy="0"/>
+          <a:chOff x="0" y="0"/>
+          <a:chExt cx="0" cy="0"/>
+        </a:xfrm>
+      </p:grpSpPr>
+      <p:pic>
+        <p:nvPicPr>
+          <p:cNvPr id="3" name="Picture 2">
+            <a:extLst>
+              <a:ext uri="{FF2B5EF4-FFF2-40B4-BE49-F238E27FC236}">
+                <a16:creationId xmlns:a16="http://schemas.microsoft.com/office/drawing/2014/main" id="{9ABD5F62-9CAD-4A3C-A127-9820C021000E}"/>
+              </a:ext>
+            </a:extLst>
+          </p:cNvPr>
+          <p:cNvPicPr>
+            <a:picLocks noChangeAspect="1"/>
+          </p:cNvPicPr>
+          <p:nvPr/>
+        </p:nvPicPr>
+        <p:blipFill>
+          <a:blip r:embed="rId2"/>
+          <a:stretch>
+            <a:fillRect/>
+          </a:stretch>
+        </p:blipFill>
+        <p:spPr>
+          <a:xfrm>
+            <a:off x="1086476" y="1590905"/>
+            <a:ext cx="10019048" cy="3676190"/>
+          </a:xfrm>
+          <a:prstGeom prst="rect">
+            <a:avLst/>
+          </a:prstGeom>
+        </p:spPr>
+      </p:pic>
+      <p:sp>
+        <p:nvSpPr>
+          <p:cNvPr id="4" name="Rectangle 3">
+            <a:extLst>
+              <a:ext uri="{FF2B5EF4-FFF2-40B4-BE49-F238E27FC236}">
+                <a16:creationId xmlns:a16="http://schemas.microsoft.com/office/drawing/2014/main" id="{C7265A1D-64EA-46CD-826C-6249ACB154F7}"/>
+              </a:ext>
+            </a:extLst>
+          </p:cNvPr>
+          <p:cNvSpPr/>
+          <p:nvPr/>
+        </p:nvSpPr>
+        <p:spPr>
+          <a:xfrm>
+            <a:off x="3095625" y="1676400"/>
+            <a:ext cx="5991225" cy="419100"/>
+          </a:xfrm>
+          <a:prstGeom prst="rect">
+            <a:avLst/>
+          </a:prstGeom>
+          <a:solidFill>
+            <a:srgbClr val="101010"/>
+          </a:solidFill>
+          <a:ln>
+            <a:noFill/>
+          </a:ln>
+        </p:spPr>
+        <p:txBody>
+          <a:bodyPr rtlCol="0" anchor="ctr"/>
+          <a:lstStyle/>
+          <a:p>
+            <a:pPr algn="ctr"/>
+            <a:endParaRPr lang="en-US"/>
+          </a:p>
+        </p:txBody>
+      </p:sp>
+      <p:sp>
+        <p:nvSpPr>
+          <p:cNvPr id="5" name="Rectangle 4">
+            <a:extLst>
+              <a:ext uri="{FF2B5EF4-FFF2-40B4-BE49-F238E27FC236}">
+                <a16:creationId xmlns:a16="http://schemas.microsoft.com/office/drawing/2014/main" id="{6035EB78-59E0-4353-8EFB-4A5E9A1F04FC}"/>
+              </a:ext>
+            </a:extLst>
+          </p:cNvPr>
+          <p:cNvSpPr/>
+          <p:nvPr/>
+        </p:nvSpPr>
+        <p:spPr>
+          <a:xfrm>
+            <a:off x="9086850" y="4333875"/>
+            <a:ext cx="1381125" cy="419100"/>
+          </a:xfrm>
+          <a:prstGeom prst="rect">
+            <a:avLst/>
+          </a:prstGeom>
+          <a:solidFill>
+            <a:srgbClr val="101010"/>
+          </a:solidFill>
+          <a:ln>
+            <a:noFill/>
+          </a:ln>
+        </p:spPr>
+        <p:txBody>
+          <a:bodyPr rtlCol="0" anchor="ctr"/>
+          <a:lstStyle/>
+          <a:p>
+            <a:pPr algn="ctr"/>
+            <a:endParaRPr lang="en-US"/>
+          </a:p>
+        </p:txBody>
+      </p:sp>
+    </p:spTree>
+    <p:extLst>
+      <p:ext uri="{BB962C8B-B14F-4D97-AF65-F5344CB8AC3E}">
+        <p14:creationId xmlns:p14="http://schemas.microsoft.com/office/powerpoint/2010/main" val="1402708782"/>
       </p:ext>
     </p:extLst>
   </p:cSld>
@@ -5687,40 +7686,12 @@
           <a:chExt cx="0" cy="0"/>
         </a:xfrm>
       </p:grpSpPr>
-      <p:sp>
-        <p:nvSpPr>
-          <p:cNvPr id="2" name="Title 1">
+      <p:pic>
+        <p:nvPicPr>
+          <p:cNvPr id="5" name="Picture 4">
             <a:extLst>
               <a:ext uri="{FF2B5EF4-FFF2-40B4-BE49-F238E27FC236}">
-                <a16:creationId xmlns:a16="http://schemas.microsoft.com/office/drawing/2014/main" id="{4512B151-9838-492D-8F50-0DCD01538E32}"/>
-              </a:ext>
-            </a:extLst>
-          </p:cNvPr>
-          <p:cNvSpPr>
-            <a:spLocks noGrp="1"/>
-          </p:cNvSpPr>
-          <p:nvPr>
-            <p:ph type="title"/>
-          </p:nvPr>
-        </p:nvSpPr>
-        <p:spPr/>
-        <p:txBody>
-          <a:bodyPr/>
-          <a:lstStyle/>
-          <a:p>
-            <a:r>
-              <a:rPr lang="en-US" dirty="0"/>
-              <a:t>One Drive</a:t>
-            </a:r>
-          </a:p>
-        </p:txBody>
-      </p:sp>
-      <p:pic>
-        <p:nvPicPr>
-          <p:cNvPr id="4" name="Picture 3">
-            <a:extLst>
-              <a:ext uri="{FF2B5EF4-FFF2-40B4-BE49-F238E27FC236}">
-                <a16:creationId xmlns:a16="http://schemas.microsoft.com/office/drawing/2014/main" id="{7914790F-4349-42C9-A1E7-AEEF0E7722E6}"/>
+                <a16:creationId xmlns:a16="http://schemas.microsoft.com/office/drawing/2014/main" id="{234BC3BD-3A62-4DFC-8200-441CFFF0D04C}"/>
               </a:ext>
             </a:extLst>
           </p:cNvPr>
@@ -5737,8 +7708,8 @@
         </p:blipFill>
         <p:spPr>
           <a:xfrm>
-            <a:off x="486476" y="1924238"/>
-            <a:ext cx="11219047" cy="3009524"/>
+            <a:off x="829333" y="1362333"/>
+            <a:ext cx="10533333" cy="4133333"/>
           </a:xfrm>
           <a:prstGeom prst="rect">
             <a:avLst/>
@@ -5747,46 +7718,44 @@
       </p:pic>
       <p:sp>
         <p:nvSpPr>
-          <p:cNvPr id="5" name="TextBox 4">
+          <p:cNvPr id="6" name="Rectangle 5">
             <a:extLst>
               <a:ext uri="{FF2B5EF4-FFF2-40B4-BE49-F238E27FC236}">
-                <a16:creationId xmlns:a16="http://schemas.microsoft.com/office/drawing/2014/main" id="{FF8E55BC-D07D-4297-9E2D-7BE3B8A54320}"/>
+                <a16:creationId xmlns:a16="http://schemas.microsoft.com/office/drawing/2014/main" id="{5E414CA3-EFA0-433B-A527-02A1779B61AB}"/>
               </a:ext>
             </a:extLst>
           </p:cNvPr>
-          <p:cNvSpPr txBox="1"/>
+          <p:cNvSpPr/>
           <p:nvPr/>
         </p:nvSpPr>
         <p:spPr>
           <a:xfrm>
-            <a:off x="486476" y="1375940"/>
-            <a:ext cx="5406160" cy="369332"/>
-          </a:xfrm>
-          <a:prstGeom prst="rect">
-            <a:avLst/>
-          </a:prstGeom>
-          <a:noFill/>
-        </p:spPr>
-        <p:txBody>
-          <a:bodyPr wrap="none" rtlCol="0">
-            <a:spAutoFit/>
-          </a:bodyPr>
+            <a:off x="6858000" y="4667250"/>
+            <a:ext cx="1943100" cy="323850"/>
+          </a:xfrm>
+          <a:prstGeom prst="rect">
+            <a:avLst/>
+          </a:prstGeom>
+          <a:solidFill>
+            <a:srgbClr val="FFFFFF"/>
+          </a:solidFill>
+          <a:ln>
+            <a:noFill/>
+          </a:ln>
+        </p:spPr>
+        <p:txBody>
+          <a:bodyPr rtlCol="0" anchor="ctr"/>
           <a:lstStyle/>
           <a:p>
-            <a:r>
-              <a:rPr lang="en-US" dirty="0">
-                <a:hlinkClick r:id="rId3"/>
-              </a:rPr>
-              <a:t>https://1drv.ms/u/s!AFvKhos6FFV7gsFc?e=fDHrU7</a:t>
-            </a:r>
-            <a:endParaRPr lang="en-US" dirty="0"/>
+            <a:pPr algn="ctr"/>
+            <a:endParaRPr lang="en-US"/>
           </a:p>
         </p:txBody>
       </p:sp>
     </p:spTree>
     <p:extLst>
       <p:ext uri="{BB962C8B-B14F-4D97-AF65-F5344CB8AC3E}">
-        <p14:creationId xmlns:p14="http://schemas.microsoft.com/office/powerpoint/2010/main" val="2888308187"/>
+        <p14:creationId xmlns:p14="http://schemas.microsoft.com/office/powerpoint/2010/main" val="2124044676"/>
       </p:ext>
     </p:extLst>
   </p:cSld>
@@ -5813,10 +7782,40 @@
           <a:chExt cx="0" cy="0"/>
         </a:xfrm>
       </p:grpSpPr>
+      <p:pic>
+        <p:nvPicPr>
+          <p:cNvPr id="3" name="Picture 2">
+            <a:extLst>
+              <a:ext uri="{FF2B5EF4-FFF2-40B4-BE49-F238E27FC236}">
+                <a16:creationId xmlns:a16="http://schemas.microsoft.com/office/drawing/2014/main" id="{D173A11B-AC4C-417C-A4ED-2223C29A64BA}"/>
+              </a:ext>
+            </a:extLst>
+          </p:cNvPr>
+          <p:cNvPicPr>
+            <a:picLocks noChangeAspect="1"/>
+          </p:cNvPicPr>
+          <p:nvPr/>
+        </p:nvPicPr>
+        <p:blipFill>
+          <a:blip r:embed="rId2"/>
+          <a:stretch>
+            <a:fillRect/>
+          </a:stretch>
+        </p:blipFill>
+        <p:spPr>
+          <a:xfrm>
+            <a:off x="594834" y="1681261"/>
+            <a:ext cx="11002332" cy="3495478"/>
+          </a:xfrm>
+          <a:prstGeom prst="rect">
+            <a:avLst/>
+          </a:prstGeom>
+        </p:spPr>
+      </p:pic>
     </p:spTree>
     <p:extLst>
       <p:ext uri="{BB962C8B-B14F-4D97-AF65-F5344CB8AC3E}">
-        <p14:creationId xmlns:p14="http://schemas.microsoft.com/office/powerpoint/2010/main" val="2599531232"/>
+        <p14:creationId xmlns:p14="http://schemas.microsoft.com/office/powerpoint/2010/main" val="400187601"/>
       </p:ext>
     </p:extLst>
   </p:cSld>
@@ -5848,7 +7847,7 @@
           <p:cNvPr id="7" name="Picture 6">
             <a:extLst>
               <a:ext uri="{FF2B5EF4-FFF2-40B4-BE49-F238E27FC236}">
-                <a16:creationId xmlns:a16="http://schemas.microsoft.com/office/drawing/2014/main" id="{AE6E8106-A882-419B-8CEA-8096B479E69F}"/>
+                <a16:creationId xmlns:a16="http://schemas.microsoft.com/office/drawing/2014/main" id="{1138A6B3-E9FE-4DB9-862D-E05544C1DA4C}"/>
               </a:ext>
             </a:extLst>
           </p:cNvPr>
@@ -5865,18 +7864,54 @@
         </p:blipFill>
         <p:spPr>
           <a:xfrm>
-            <a:off x="1960775" y="328878"/>
-            <a:ext cx="7389158" cy="5994002"/>
+            <a:off x="471487" y="1443389"/>
+            <a:ext cx="11249025" cy="3971221"/>
           </a:xfrm>
           <a:prstGeom prst="rect">
             <a:avLst/>
           </a:prstGeom>
         </p:spPr>
       </p:pic>
+      <p:sp>
+        <p:nvSpPr>
+          <p:cNvPr id="8" name="Rectangle 7">
+            <a:extLst>
+              <a:ext uri="{FF2B5EF4-FFF2-40B4-BE49-F238E27FC236}">
+                <a16:creationId xmlns:a16="http://schemas.microsoft.com/office/drawing/2014/main" id="{DC4CFDBF-A50A-4433-ACD3-77C93AEFB90E}"/>
+              </a:ext>
+            </a:extLst>
+          </p:cNvPr>
+          <p:cNvSpPr/>
+          <p:nvPr/>
+        </p:nvSpPr>
+        <p:spPr>
+          <a:xfrm>
+            <a:off x="9667875" y="1609725"/>
+            <a:ext cx="1676400" cy="371475"/>
+          </a:xfrm>
+          <a:prstGeom prst="rect">
+            <a:avLst/>
+          </a:prstGeom>
+          <a:solidFill>
+            <a:srgbClr val="FFFFFF"/>
+          </a:solidFill>
+          <a:ln>
+            <a:noFill/>
+          </a:ln>
+        </p:spPr>
+        <p:txBody>
+          <a:bodyPr rtlCol="0" anchor="ctr"/>
+          <a:lstStyle/>
+          <a:p>
+            <a:pPr algn="ctr"/>
+            <a:endParaRPr lang="en-US"/>
+          </a:p>
+        </p:txBody>
+      </p:sp>
     </p:spTree>
     <p:extLst>
       <p:ext uri="{BB962C8B-B14F-4D97-AF65-F5344CB8AC3E}">
-        <p14:creationId xmlns:p14="http://schemas.microsoft.com/office/powerpoint/2010/main" val="3611397815"/>
+        <p14:creationId xmlns:p14="http://schemas.microsoft.com/office/powerpoint/2010/main" val="738051792"/>
       </p:ext>
     </p:extLst>
   </p:cSld>
@@ -5903,47 +7938,12 @@
           <a:chExt cx="0" cy="0"/>
         </a:xfrm>
       </p:grpSpPr>
-      <p:sp>
-        <p:nvSpPr>
-          <p:cNvPr id="2" name="TextBox 1">
+      <p:pic>
+        <p:nvPicPr>
+          <p:cNvPr id="3" name="Picture 2">
             <a:extLst>
               <a:ext uri="{FF2B5EF4-FFF2-40B4-BE49-F238E27FC236}">
-                <a16:creationId xmlns:a16="http://schemas.microsoft.com/office/drawing/2014/main" id="{1DB900C8-E0FB-4264-8467-3E97642CCB71}"/>
-              </a:ext>
-            </a:extLst>
-          </p:cNvPr>
-          <p:cNvSpPr txBox="1"/>
-          <p:nvPr/>
-        </p:nvSpPr>
-        <p:spPr>
-          <a:xfrm>
-            <a:off x="1586753" y="654424"/>
-            <a:ext cx="9558001" cy="584775"/>
-          </a:xfrm>
-          <a:prstGeom prst="rect">
-            <a:avLst/>
-          </a:prstGeom>
-          <a:noFill/>
-        </p:spPr>
-        <p:txBody>
-          <a:bodyPr wrap="none" rtlCol="0">
-            <a:spAutoFit/>
-          </a:bodyPr>
-          <a:lstStyle/>
-          <a:p>
-            <a:r>
-              <a:rPr lang="en-US" sz="3200" dirty="0"/>
-              <a:t>https://github.com/JeffPinegar/Proj1_undergraduate</a:t>
-            </a:r>
-          </a:p>
-        </p:txBody>
-      </p:sp>
-      <p:pic>
-        <p:nvPicPr>
-          <p:cNvPr id="10" name="Picture 9">
-            <a:extLst>
-              <a:ext uri="{FF2B5EF4-FFF2-40B4-BE49-F238E27FC236}">
-                <a16:creationId xmlns:a16="http://schemas.microsoft.com/office/drawing/2014/main" id="{70E100F4-F859-48A7-A553-847378296473}"/>
+                <a16:creationId xmlns:a16="http://schemas.microsoft.com/office/drawing/2014/main" id="{FC94B8F7-87A0-459C-8AA6-C5A411CFC3AE}"/>
               </a:ext>
             </a:extLst>
           </p:cNvPr>
@@ -5960,18 +7960,54 @@
         </p:blipFill>
         <p:spPr>
           <a:xfrm>
-            <a:off x="1111624" y="1791693"/>
-            <a:ext cx="9968752" cy="4223289"/>
+            <a:off x="577091" y="1184529"/>
+            <a:ext cx="11037818" cy="4488941"/>
           </a:xfrm>
           <a:prstGeom prst="rect">
             <a:avLst/>
           </a:prstGeom>
         </p:spPr>
       </p:pic>
+      <p:sp>
+        <p:nvSpPr>
+          <p:cNvPr id="4" name="Rectangle 3">
+            <a:extLst>
+              <a:ext uri="{FF2B5EF4-FFF2-40B4-BE49-F238E27FC236}">
+                <a16:creationId xmlns:a16="http://schemas.microsoft.com/office/drawing/2014/main" id="{AE0DC10A-3E96-45A0-8180-18C2F95AE48E}"/>
+              </a:ext>
+            </a:extLst>
+          </p:cNvPr>
+          <p:cNvSpPr/>
+          <p:nvPr/>
+        </p:nvSpPr>
+        <p:spPr>
+          <a:xfrm>
+            <a:off x="615191" y="4375150"/>
+            <a:ext cx="4438650" cy="552450"/>
+          </a:xfrm>
+          <a:prstGeom prst="rect">
+            <a:avLst/>
+          </a:prstGeom>
+          <a:solidFill>
+            <a:srgbClr val="FDFCFA"/>
+          </a:solidFill>
+          <a:ln>
+            <a:noFill/>
+          </a:ln>
+        </p:spPr>
+        <p:txBody>
+          <a:bodyPr rtlCol="0" anchor="ctr"/>
+          <a:lstStyle/>
+          <a:p>
+            <a:pPr algn="ctr"/>
+            <a:endParaRPr lang="en-US"/>
+          </a:p>
+        </p:txBody>
+      </p:sp>
     </p:spTree>
     <p:extLst>
       <p:ext uri="{BB962C8B-B14F-4D97-AF65-F5344CB8AC3E}">
-        <p14:creationId xmlns:p14="http://schemas.microsoft.com/office/powerpoint/2010/main" val="865262567"/>
+        <p14:creationId xmlns:p14="http://schemas.microsoft.com/office/powerpoint/2010/main" val="97934638"/>
       </p:ext>
     </p:extLst>
   </p:cSld>
@@ -6003,7 +8039,7 @@
           <p:cNvPr id="3" name="Picture 2">
             <a:extLst>
               <a:ext uri="{FF2B5EF4-FFF2-40B4-BE49-F238E27FC236}">
-                <a16:creationId xmlns:a16="http://schemas.microsoft.com/office/drawing/2014/main" id="{85EE93D0-E211-4F9F-AA61-3F6AB954E018}"/>
+                <a16:creationId xmlns:a16="http://schemas.microsoft.com/office/drawing/2014/main" id="{702A6869-2FC1-48ED-AFAD-FF0A99130BCC}"/>
               </a:ext>
             </a:extLst>
           </p:cNvPr>
@@ -6020,8 +8056,8 @@
         </p:blipFill>
         <p:spPr>
           <a:xfrm>
-            <a:off x="1963271" y="0"/>
-            <a:ext cx="7502020" cy="6295028"/>
+            <a:off x="1793428" y="988295"/>
+            <a:ext cx="8605143" cy="4881409"/>
           </a:xfrm>
           <a:prstGeom prst="rect">
             <a:avLst/>
@@ -6031,7 +8067,7 @@
     </p:spTree>
     <p:extLst>
       <p:ext uri="{BB962C8B-B14F-4D97-AF65-F5344CB8AC3E}">
-        <p14:creationId xmlns:p14="http://schemas.microsoft.com/office/powerpoint/2010/main" val="1768163937"/>
+        <p14:creationId xmlns:p14="http://schemas.microsoft.com/office/powerpoint/2010/main" val="3674041922"/>
       </p:ext>
     </p:extLst>
   </p:cSld>

</xml_diff>

<commit_message>
Nov. 12 2022 - added student population analysis
</commit_message>
<xml_diff>
--- a/Presentation/Getting Started.pptx
+++ b/Presentation/Getting Started.pptx
@@ -5,41 +5,46 @@
     <p:sldMasterId id="2147483673" r:id="rId1"/>
   </p:sldMasterIdLst>
   <p:notesMasterIdLst>
-    <p:notesMasterId r:id="rId34"/>
+    <p:notesMasterId r:id="rId39"/>
   </p:notesMasterIdLst>
   <p:sldIdLst>
     <p:sldId id="267" r:id="rId2"/>
     <p:sldId id="270" r:id="rId3"/>
     <p:sldId id="281" r:id="rId4"/>
     <p:sldId id="276" r:id="rId5"/>
-    <p:sldId id="279" r:id="rId6"/>
-    <p:sldId id="280" r:id="rId7"/>
-    <p:sldId id="277" r:id="rId8"/>
-    <p:sldId id="285" r:id="rId9"/>
-    <p:sldId id="286" r:id="rId10"/>
-    <p:sldId id="278" r:id="rId11"/>
-    <p:sldId id="282" r:id="rId12"/>
-    <p:sldId id="283" r:id="rId13"/>
-    <p:sldId id="290" r:id="rId14"/>
-    <p:sldId id="284" r:id="rId15"/>
-    <p:sldId id="294" r:id="rId16"/>
-    <p:sldId id="287" r:id="rId17"/>
-    <p:sldId id="296" r:id="rId18"/>
-    <p:sldId id="291" r:id="rId19"/>
-    <p:sldId id="298" r:id="rId20"/>
-    <p:sldId id="299" r:id="rId21"/>
-    <p:sldId id="301" r:id="rId22"/>
-    <p:sldId id="300" r:id="rId23"/>
-    <p:sldId id="302" r:id="rId24"/>
-    <p:sldId id="303" r:id="rId25"/>
-    <p:sldId id="292" r:id="rId26"/>
-    <p:sldId id="295" r:id="rId27"/>
+    <p:sldId id="280" r:id="rId6"/>
+    <p:sldId id="277" r:id="rId7"/>
+    <p:sldId id="285" r:id="rId8"/>
+    <p:sldId id="286" r:id="rId9"/>
+    <p:sldId id="282" r:id="rId10"/>
+    <p:sldId id="283" r:id="rId11"/>
+    <p:sldId id="290" r:id="rId12"/>
+    <p:sldId id="284" r:id="rId13"/>
+    <p:sldId id="294" r:id="rId14"/>
+    <p:sldId id="296" r:id="rId15"/>
+    <p:sldId id="287" r:id="rId16"/>
+    <p:sldId id="298" r:id="rId17"/>
+    <p:sldId id="305" r:id="rId18"/>
+    <p:sldId id="299" r:id="rId19"/>
+    <p:sldId id="306" r:id="rId20"/>
+    <p:sldId id="301" r:id="rId21"/>
+    <p:sldId id="307" r:id="rId22"/>
+    <p:sldId id="302" r:id="rId23"/>
+    <p:sldId id="291" r:id="rId24"/>
+    <p:sldId id="292" r:id="rId25"/>
+    <p:sldId id="295" r:id="rId26"/>
+    <p:sldId id="304" r:id="rId27"/>
     <p:sldId id="293" r:id="rId28"/>
-    <p:sldId id="297" r:id="rId29"/>
-    <p:sldId id="268" r:id="rId30"/>
-    <p:sldId id="274" r:id="rId31"/>
-    <p:sldId id="261" r:id="rId32"/>
-    <p:sldId id="258" r:id="rId33"/>
+    <p:sldId id="308" r:id="rId29"/>
+    <p:sldId id="297" r:id="rId30"/>
+    <p:sldId id="268" r:id="rId31"/>
+    <p:sldId id="279" r:id="rId32"/>
+    <p:sldId id="278" r:id="rId33"/>
+    <p:sldId id="300" r:id="rId34"/>
+    <p:sldId id="303" r:id="rId35"/>
+    <p:sldId id="274" r:id="rId36"/>
+    <p:sldId id="261" r:id="rId37"/>
+    <p:sldId id="258" r:id="rId38"/>
   </p:sldIdLst>
   <p:sldSz cx="12192000" cy="6858000"/>
   <p:notesSz cx="6858000" cy="9144000"/>
@@ -141,12 +146,12 @@
   <p:extLst>
     <p:ext uri="{EFAFB233-063F-42B5-8137-9DF3F51BA10A}">
       <p15:sldGuideLst xmlns:p15="http://schemas.microsoft.com/office/powerpoint/2012/main">
-        <p15:guide id="1" orient="horz" pos="2160" userDrawn="1">
+        <p15:guide id="1" orient="horz" pos="2088" userDrawn="1">
           <p15:clr>
             <a:srgbClr val="A4A3A4"/>
           </p15:clr>
         </p15:guide>
-        <p15:guide id="2" pos="3840" userDrawn="1">
+        <p15:guide id="2" pos="6168" userDrawn="1">
           <p15:clr>
             <a:srgbClr val="A4A3A4"/>
           </p15:clr>
@@ -239,7 +244,7 @@
           <a:p>
             <a:fld id="{91E551B2-72B9-4805-8062-4939F9ED4BD5}" type="datetimeFigureOut">
               <a:rPr lang="en-US"/>
-              <a:t>11/10/2022</a:t>
+              <a:t>11/12/2022</a:t>
             </a:fld>
             <a:endParaRPr lang="en-US" dirty="0"/>
           </a:p>
@@ -574,7 +579,7 @@
           <a:p>
             <a:fld id="{9AC5F7B5-7C12-4AF2-B6DF-8CC8390A6C8D}" type="slidenum">
               <a:rPr lang="en-US" smtClean="0"/>
-              <a:t>17</a:t>
+              <a:t>14</a:t>
             </a:fld>
             <a:endParaRPr lang="en-US"/>
           </a:p>
@@ -630,7 +635,7 @@
             <a:fld id="{7F1FCCB6-F9A8-465F-861C-256322524500}" type="slidenum">
               <a:rPr lang="en-US"/>
               <a:pPr/>
-              <a:t>31</a:t>
+              <a:t>36</a:t>
             </a:fld>
             <a:endParaRPr lang="en-US" dirty="0"/>
           </a:p>
@@ -4308,40 +4313,59 @@
           <a:chExt cx="0" cy="0"/>
         </a:xfrm>
       </p:grpSpPr>
-      <p:pic>
-        <p:nvPicPr>
-          <p:cNvPr id="3" name="Picture 2">
+      <p:sp>
+        <p:nvSpPr>
+          <p:cNvPr id="2" name="TextBox 1">
             <a:extLst>
               <a:ext uri="{FF2B5EF4-FFF2-40B4-BE49-F238E27FC236}">
-                <a16:creationId xmlns:a16="http://schemas.microsoft.com/office/drawing/2014/main" id="{CFA76F85-2BB7-4C0D-9819-344E941CD0D7}"/>
+                <a16:creationId xmlns:a16="http://schemas.microsoft.com/office/drawing/2014/main" id="{DA2BD6CD-CB1E-4C42-AAF0-6B2B67A938CE}"/>
               </a:ext>
             </a:extLst>
           </p:cNvPr>
-          <p:cNvPicPr>
-            <a:picLocks noChangeAspect="1"/>
-          </p:cNvPicPr>
+          <p:cNvSpPr txBox="1"/>
           <p:nvPr/>
-        </p:nvPicPr>
-        <p:blipFill>
-          <a:blip r:embed="rId2"/>
-          <a:stretch>
-            <a:fillRect/>
-          </a:stretch>
-        </p:blipFill>
-        <p:spPr>
-          <a:xfrm>
-            <a:off x="1362666" y="1019476"/>
-            <a:ext cx="9466667" cy="4819048"/>
+        </p:nvSpPr>
+        <p:spPr>
+          <a:xfrm>
+            <a:off x="1619250" y="1217788"/>
+            <a:ext cx="8953500" cy="3279424"/>
           </a:xfrm>
           <a:prstGeom prst="rect">
             <a:avLst/>
           </a:prstGeom>
-        </p:spPr>
-      </p:pic>
+          <a:noFill/>
+        </p:spPr>
+        <p:txBody>
+          <a:bodyPr wrap="square" rtlCol="0">
+            <a:spAutoFit/>
+          </a:bodyPr>
+          <a:lstStyle>
+            <a:defPPr>
+              <a:defRPr lang="en-US"/>
+            </a:defPPr>
+            <a:lvl1pPr algn="ctr">
+              <a:lnSpc>
+                <a:spcPct val="150000"/>
+              </a:lnSpc>
+              <a:defRPr sz="4800" b="1">
+                <a:solidFill>
+                  <a:schemeClr val="accent6"/>
+                </a:solidFill>
+              </a:defRPr>
+            </a:lvl1pPr>
+          </a:lstStyle>
+          <a:p>
+            <a:r>
+              <a:rPr lang="en-US" dirty="0"/>
+              <a:t>What compromises, if any, do I have to make to stay out of debt?</a:t>
+            </a:r>
+          </a:p>
+        </p:txBody>
+      </p:sp>
     </p:spTree>
     <p:extLst>
       <p:ext uri="{BB962C8B-B14F-4D97-AF65-F5344CB8AC3E}">
-        <p14:creationId xmlns:p14="http://schemas.microsoft.com/office/powerpoint/2010/main" val="97304364"/>
+        <p14:creationId xmlns:p14="http://schemas.microsoft.com/office/powerpoint/2010/main" val="3122101512"/>
       </p:ext>
     </p:extLst>
   </p:cSld>
@@ -4382,8 +4406,8 @@
         </p:nvSpPr>
         <p:spPr>
           <a:xfrm>
-            <a:off x="1270000" y="1217788"/>
-            <a:ext cx="9448800" cy="3279424"/>
+            <a:off x="2290762" y="1771786"/>
+            <a:ext cx="7610475" cy="2171428"/>
           </a:xfrm>
           <a:prstGeom prst="rect">
             <a:avLst/>
@@ -4412,7 +4436,7 @@
           <a:p>
             <a:r>
               <a:rPr lang="en-US" dirty="0"/>
-              <a:t>Are there options that won’t leave me in debt for the rest of my life?</a:t>
+              <a:t>If there are options, can I get in?</a:t>
             </a:r>
           </a:p>
         </p:txBody>
@@ -4420,7 +4444,7 @@
     </p:spTree>
     <p:extLst>
       <p:ext uri="{BB962C8B-B14F-4D97-AF65-F5344CB8AC3E}">
-        <p14:creationId xmlns:p14="http://schemas.microsoft.com/office/powerpoint/2010/main" val="612734563"/>
+        <p14:creationId xmlns:p14="http://schemas.microsoft.com/office/powerpoint/2010/main" val="2492401609"/>
       </p:ext>
     </p:extLst>
   </p:cSld>
@@ -4461,8 +4485,8 @@
         </p:nvSpPr>
         <p:spPr>
           <a:xfrm>
-            <a:off x="1619250" y="1217788"/>
-            <a:ext cx="8953500" cy="3279424"/>
+            <a:off x="1619250" y="1771786"/>
+            <a:ext cx="8953500" cy="2171428"/>
           </a:xfrm>
           <a:prstGeom prst="rect">
             <a:avLst/>
@@ -4491,7 +4515,14 @@
           <a:p>
             <a:r>
               <a:rPr lang="en-US" dirty="0"/>
-              <a:t>What compromises, if any, do I have to make to stay out of debt?</a:t>
+              <a:t>If I get in,</a:t>
+            </a:r>
+            <a:br>
+              <a:rPr lang="en-US" dirty="0"/>
+            </a:br>
+            <a:r>
+              <a:rPr lang="en-US" dirty="0"/>
+              <a:t>I’m I likely to graduate?</a:t>
             </a:r>
           </a:p>
         </p:txBody>
@@ -4499,7 +4530,7 @@
     </p:spTree>
     <p:extLst>
       <p:ext uri="{BB962C8B-B14F-4D97-AF65-F5344CB8AC3E}">
-        <p14:creationId xmlns:p14="http://schemas.microsoft.com/office/powerpoint/2010/main" val="3122101512"/>
+        <p14:creationId xmlns:p14="http://schemas.microsoft.com/office/powerpoint/2010/main" val="1411858660"/>
       </p:ext>
     </p:extLst>
   </p:cSld>
@@ -4540,8 +4571,8 @@
         </p:nvSpPr>
         <p:spPr>
           <a:xfrm>
-            <a:off x="2290762" y="1771786"/>
-            <a:ext cx="7610475" cy="2171428"/>
+            <a:off x="1619250" y="1771786"/>
+            <a:ext cx="8953500" cy="2171428"/>
           </a:xfrm>
           <a:prstGeom prst="rect">
             <a:avLst/>
@@ -4570,172 +4601,7 @@
           <a:p>
             <a:r>
               <a:rPr lang="en-US" dirty="0"/>
-              <a:t>If there are options, can I get in?</a:t>
-            </a:r>
-          </a:p>
-        </p:txBody>
-      </p:sp>
-    </p:spTree>
-    <p:extLst>
-      <p:ext uri="{BB962C8B-B14F-4D97-AF65-F5344CB8AC3E}">
-        <p14:creationId xmlns:p14="http://schemas.microsoft.com/office/powerpoint/2010/main" val="2492401609"/>
-      </p:ext>
-    </p:extLst>
-  </p:cSld>
-  <p:clrMapOvr>
-    <a:masterClrMapping/>
-  </p:clrMapOvr>
-</p:sld>
-</file>
-
-<file path=ppt/slides/slide14.xml><?xml version="1.0" encoding="utf-8"?>
-<p:sld xmlns:a="http://schemas.openxmlformats.org/drawingml/2006/main" xmlns:r="http://schemas.openxmlformats.org/officeDocument/2006/relationships" xmlns:p="http://schemas.openxmlformats.org/presentationml/2006/main">
-  <p:cSld>
-    <p:spTree>
-      <p:nvGrpSpPr>
-        <p:cNvPr id="1" name=""/>
-        <p:cNvGrpSpPr/>
-        <p:nvPr/>
-      </p:nvGrpSpPr>
-      <p:grpSpPr>
-        <a:xfrm>
-          <a:off x="0" y="0"/>
-          <a:ext cx="0" cy="0"/>
-          <a:chOff x="0" y="0"/>
-          <a:chExt cx="0" cy="0"/>
-        </a:xfrm>
-      </p:grpSpPr>
-      <p:sp>
-        <p:nvSpPr>
-          <p:cNvPr id="2" name="TextBox 1">
-            <a:extLst>
-              <a:ext uri="{FF2B5EF4-FFF2-40B4-BE49-F238E27FC236}">
-                <a16:creationId xmlns:a16="http://schemas.microsoft.com/office/drawing/2014/main" id="{DA2BD6CD-CB1E-4C42-AAF0-6B2B67A938CE}"/>
-              </a:ext>
-            </a:extLst>
-          </p:cNvPr>
-          <p:cNvSpPr txBox="1"/>
-          <p:nvPr/>
-        </p:nvSpPr>
-        <p:spPr>
-          <a:xfrm>
-            <a:off x="1619250" y="1771786"/>
-            <a:ext cx="8953500" cy="2171428"/>
-          </a:xfrm>
-          <a:prstGeom prst="rect">
-            <a:avLst/>
-          </a:prstGeom>
-          <a:noFill/>
-        </p:spPr>
-        <p:txBody>
-          <a:bodyPr wrap="square" rtlCol="0">
-            <a:spAutoFit/>
-          </a:bodyPr>
-          <a:lstStyle>
-            <a:defPPr>
-              <a:defRPr lang="en-US"/>
-            </a:defPPr>
-            <a:lvl1pPr algn="ctr">
-              <a:lnSpc>
-                <a:spcPct val="150000"/>
-              </a:lnSpc>
-              <a:defRPr sz="4800" b="1">
-                <a:solidFill>
-                  <a:schemeClr val="accent6"/>
-                </a:solidFill>
-              </a:defRPr>
-            </a:lvl1pPr>
-          </a:lstStyle>
-          <a:p>
-            <a:r>
-              <a:rPr lang="en-US" dirty="0"/>
-              <a:t>If there are options,</a:t>
-            </a:r>
-            <a:br>
-              <a:rPr lang="en-US" dirty="0"/>
-            </a:br>
-            <a:r>
-              <a:rPr lang="en-US" dirty="0"/>
-              <a:t>I’m I likely to graduate?</a:t>
-            </a:r>
-          </a:p>
-        </p:txBody>
-      </p:sp>
-    </p:spTree>
-    <p:extLst>
-      <p:ext uri="{BB962C8B-B14F-4D97-AF65-F5344CB8AC3E}">
-        <p14:creationId xmlns:p14="http://schemas.microsoft.com/office/powerpoint/2010/main" val="1411858660"/>
-      </p:ext>
-    </p:extLst>
-  </p:cSld>
-  <p:clrMapOvr>
-    <a:masterClrMapping/>
-  </p:clrMapOvr>
-</p:sld>
-</file>
-
-<file path=ppt/slides/slide15.xml><?xml version="1.0" encoding="utf-8"?>
-<p:sld xmlns:a="http://schemas.openxmlformats.org/drawingml/2006/main" xmlns:r="http://schemas.openxmlformats.org/officeDocument/2006/relationships" xmlns:p="http://schemas.openxmlformats.org/presentationml/2006/main">
-  <p:cSld>
-    <p:spTree>
-      <p:nvGrpSpPr>
-        <p:cNvPr id="1" name=""/>
-        <p:cNvGrpSpPr/>
-        <p:nvPr/>
-      </p:nvGrpSpPr>
-      <p:grpSpPr>
-        <a:xfrm>
-          <a:off x="0" y="0"/>
-          <a:ext cx="0" cy="0"/>
-          <a:chOff x="0" y="0"/>
-          <a:chExt cx="0" cy="0"/>
-        </a:xfrm>
-      </p:grpSpPr>
-      <p:sp>
-        <p:nvSpPr>
-          <p:cNvPr id="2" name="TextBox 1">
-            <a:extLst>
-              <a:ext uri="{FF2B5EF4-FFF2-40B4-BE49-F238E27FC236}">
-                <a16:creationId xmlns:a16="http://schemas.microsoft.com/office/drawing/2014/main" id="{DA2BD6CD-CB1E-4C42-AAF0-6B2B67A938CE}"/>
-              </a:ext>
-            </a:extLst>
-          </p:cNvPr>
-          <p:cNvSpPr txBox="1"/>
-          <p:nvPr/>
-        </p:nvSpPr>
-        <p:spPr>
-          <a:xfrm>
-            <a:off x="1619250" y="1217788"/>
-            <a:ext cx="8953500" cy="3279424"/>
-          </a:xfrm>
-          <a:prstGeom prst="rect">
-            <a:avLst/>
-          </a:prstGeom>
-          <a:noFill/>
-        </p:spPr>
-        <p:txBody>
-          <a:bodyPr wrap="square" rtlCol="0">
-            <a:spAutoFit/>
-          </a:bodyPr>
-          <a:lstStyle>
-            <a:defPPr>
-              <a:defRPr lang="en-US"/>
-            </a:defPPr>
-            <a:lvl1pPr algn="ctr">
-              <a:lnSpc>
-                <a:spcPct val="150000"/>
-              </a:lnSpc>
-              <a:defRPr sz="4800" b="1">
-                <a:solidFill>
-                  <a:schemeClr val="accent6"/>
-                </a:solidFill>
-              </a:defRPr>
-            </a:lvl1pPr>
-          </a:lstStyle>
-          <a:p>
-            <a:r>
-              <a:rPr lang="en-US" dirty="0"/>
-              <a:t>How will a more affordable choice affect my future earnings?</a:t>
+              <a:t>Will my choice affect my future earnings?</a:t>
             </a:r>
           </a:p>
         </p:txBody>
@@ -4753,86 +4619,7 @@
 </p:sld>
 </file>
 
-<file path=ppt/slides/slide16.xml><?xml version="1.0" encoding="utf-8"?>
-<p:sld xmlns:a="http://schemas.openxmlformats.org/drawingml/2006/main" xmlns:r="http://schemas.openxmlformats.org/officeDocument/2006/relationships" xmlns:p="http://schemas.openxmlformats.org/presentationml/2006/main">
-  <p:cSld>
-    <p:spTree>
-      <p:nvGrpSpPr>
-        <p:cNvPr id="1" name=""/>
-        <p:cNvGrpSpPr/>
-        <p:nvPr/>
-      </p:nvGrpSpPr>
-      <p:grpSpPr>
-        <a:xfrm>
-          <a:off x="0" y="0"/>
-          <a:ext cx="0" cy="0"/>
-          <a:chOff x="0" y="0"/>
-          <a:chExt cx="0" cy="0"/>
-        </a:xfrm>
-      </p:grpSpPr>
-      <p:sp>
-        <p:nvSpPr>
-          <p:cNvPr id="6" name="TextBox 5">
-            <a:extLst>
-              <a:ext uri="{FF2B5EF4-FFF2-40B4-BE49-F238E27FC236}">
-                <a16:creationId xmlns:a16="http://schemas.microsoft.com/office/drawing/2014/main" id="{2527CE40-CEEB-4F33-AC48-12DC1AF66A59}"/>
-              </a:ext>
-            </a:extLst>
-          </p:cNvPr>
-          <p:cNvSpPr txBox="1"/>
-          <p:nvPr/>
-        </p:nvSpPr>
-        <p:spPr>
-          <a:xfrm>
-            <a:off x="1619250" y="2325783"/>
-            <a:ext cx="8953500" cy="1063433"/>
-          </a:xfrm>
-          <a:prstGeom prst="rect">
-            <a:avLst/>
-          </a:prstGeom>
-          <a:noFill/>
-        </p:spPr>
-        <p:txBody>
-          <a:bodyPr wrap="square" rtlCol="0">
-            <a:spAutoFit/>
-          </a:bodyPr>
-          <a:lstStyle>
-            <a:defPPr>
-              <a:defRPr lang="en-US"/>
-            </a:defPPr>
-            <a:lvl1pPr algn="ctr">
-              <a:lnSpc>
-                <a:spcPct val="150000"/>
-              </a:lnSpc>
-              <a:defRPr sz="4800" b="1">
-                <a:solidFill>
-                  <a:schemeClr val="accent6"/>
-                </a:solidFill>
-              </a:defRPr>
-            </a:lvl1pPr>
-          </a:lstStyle>
-          <a:p>
-            <a:r>
-              <a:rPr lang="en-US" dirty="0"/>
-              <a:t>Are There Options?</a:t>
-            </a:r>
-          </a:p>
-        </p:txBody>
-      </p:sp>
-    </p:spTree>
-    <p:extLst>
-      <p:ext uri="{BB962C8B-B14F-4D97-AF65-F5344CB8AC3E}">
-        <p14:creationId xmlns:p14="http://schemas.microsoft.com/office/powerpoint/2010/main" val="494161712"/>
-      </p:ext>
-    </p:extLst>
-  </p:cSld>
-  <p:clrMapOvr>
-    <a:masterClrMapping/>
-  </p:clrMapOvr>
-</p:sld>
-</file>
-
-<file path=ppt/slides/slide17.xml><?xml version="1.0" encoding="utf-8"?>
+<file path=ppt/slides/slide14.xml><?xml version="1.0" encoding="utf-8"?>
 <p:sld xmlns:a="http://schemas.openxmlformats.org/drawingml/2006/main" xmlns:r="http://schemas.openxmlformats.org/officeDocument/2006/relationships" xmlns:p="http://schemas.openxmlformats.org/presentationml/2006/main">
   <p:cSld>
     <p:spTree>
@@ -5037,8 +4824,8 @@
         </p:nvSpPr>
         <p:spPr>
           <a:xfrm>
-            <a:off x="527050" y="6211669"/>
-            <a:ext cx="5156200" cy="646331"/>
+            <a:off x="599786" y="5948364"/>
+            <a:ext cx="5156200" cy="738664"/>
           </a:xfrm>
           <a:prstGeom prst="rect">
             <a:avLst/>
@@ -5052,22 +4839,41 @@
           <a:lstStyle/>
           <a:p>
             <a:r>
-              <a:rPr lang="en-US" dirty="0">
+              <a:rPr lang="en-US" sz="1400" dirty="0">
                 <a:latin typeface="Gill Alt One MT" panose="020B0502020104020203" pitchFamily="34" charset="0"/>
                 <a:ea typeface="Calibri" panose="020F0502020204030204" pitchFamily="34" charset="0"/>
                 <a:cs typeface="Times New Roman" panose="02020603050405020304" pitchFamily="18" charset="0"/>
               </a:rPr>
               <a:t>Source:  https://collegescorecard.ed.gov/data/</a:t>
             </a:r>
-            <a:endParaRPr lang="en-US" dirty="0">
-              <a:effectLst/>
-              <a:latin typeface="Gill Alt One MT" panose="020B0502020104020203" pitchFamily="34" charset="0"/>
-              <a:ea typeface="Calibri" panose="020F0502020204030204" pitchFamily="34" charset="0"/>
-              <a:cs typeface="Times New Roman" panose="02020603050405020304" pitchFamily="18" charset="0"/>
-            </a:endParaRPr>
-          </a:p>
-          <a:p>
-            <a:endParaRPr lang="en-US" dirty="0"/>
+          </a:p>
+          <a:p>
+            <a:r>
+              <a:rPr lang="en-US" sz="1400" dirty="0">
+                <a:effectLst/>
+                <a:latin typeface="Gill Alt One MT" panose="020B0502020104020203" pitchFamily="34" charset="0"/>
+                <a:ea typeface="Calibri" panose="020F0502020204030204" pitchFamily="34" charset="0"/>
+                <a:cs typeface="Times New Roman" panose="02020603050405020304" pitchFamily="18" charset="0"/>
+              </a:rPr>
+              <a:t>Source:  Carnegie Foundation for the advancement of Teachers</a:t>
+            </a:r>
+            <a:br>
+              <a:rPr lang="en-US" sz="1400" dirty="0">
+                <a:effectLst/>
+                <a:latin typeface="Gill Alt One MT" panose="020B0502020104020203" pitchFamily="34" charset="0"/>
+                <a:ea typeface="Calibri" panose="020F0502020204030204" pitchFamily="34" charset="0"/>
+                <a:cs typeface="Times New Roman" panose="02020603050405020304" pitchFamily="18" charset="0"/>
+              </a:rPr>
+            </a:br>
+            <a:r>
+              <a:rPr lang="en-US" sz="1400" dirty="0">
+                <a:effectLst/>
+                <a:latin typeface="Gill Alt One MT" panose="020B0502020104020203" pitchFamily="34" charset="0"/>
+                <a:ea typeface="Calibri" panose="020F0502020204030204" pitchFamily="34" charset="0"/>
+                <a:cs typeface="Times New Roman" panose="02020603050405020304" pitchFamily="18" charset="0"/>
+              </a:rPr>
+              <a:t>	    https://carnegieclassifications.acenet.edu/downloads.php</a:t>
+            </a:r>
           </a:p>
         </p:txBody>
       </p:sp>
@@ -5101,8 +4907,8 @@
         </p:blipFill>
         <p:spPr>
           <a:xfrm>
-            <a:off x="8153400" y="1911350"/>
-            <a:ext cx="3035300" cy="3035300"/>
+            <a:off x="8158595" y="1681595"/>
+            <a:ext cx="3266209" cy="3266209"/>
           </a:xfrm>
           <a:prstGeom prst="rect">
             <a:avLst/>
@@ -5122,7 +4928,7 @@
 </p:sld>
 </file>
 
-<file path=ppt/slides/slide18.xml><?xml version="1.0" encoding="utf-8"?>
+<file path=ppt/slides/slide15.xml><?xml version="1.0" encoding="utf-8"?>
 <p:sld xmlns:a="http://schemas.openxmlformats.org/drawingml/2006/main" xmlns:r="http://schemas.openxmlformats.org/officeDocument/2006/relationships" xmlns:p="http://schemas.openxmlformats.org/presentationml/2006/main">
   <p:cSld>
     <p:spTree>
@@ -5153,8 +4959,8 @@
         </p:nvSpPr>
         <p:spPr>
           <a:xfrm>
-            <a:off x="965201" y="1724025"/>
-            <a:ext cx="7289800" cy="3211007"/>
+            <a:off x="943841" y="1648786"/>
+            <a:ext cx="6494318" cy="3211007"/>
           </a:xfrm>
           <a:prstGeom prst="rect">
             <a:avLst/>
@@ -5165,30 +4971,35 @@
           <a:bodyPr wrap="square" rtlCol="0">
             <a:spAutoFit/>
           </a:bodyPr>
-          <a:lstStyle/>
-          <a:p>
-            <a:pPr algn="ctr">
+          <a:lstStyle>
+            <a:defPPr>
+              <a:defRPr lang="en-US"/>
+            </a:defPPr>
+            <a:lvl1pPr algn="ctr">
               <a:lnSpc>
                 <a:spcPct val="150000"/>
               </a:lnSpc>
-            </a:pPr>
-            <a:r>
-              <a:rPr lang="en-US" sz="7200" b="1" dirty="0">
+              <a:defRPr sz="7200" b="1">
                 <a:solidFill>
                   <a:schemeClr val="accent6"/>
                 </a:solidFill>
-              </a:rPr>
-              <a:t>Must I Compromise?</a:t>
+              </a:defRPr>
+            </a:lvl1pPr>
+          </a:lstStyle>
+          <a:p>
+            <a:r>
+              <a:rPr lang="en-US" dirty="0"/>
+              <a:t>Are There Options?</a:t>
             </a:r>
           </a:p>
         </p:txBody>
       </p:sp>
       <p:pic>
         <p:nvPicPr>
-          <p:cNvPr id="5" name="Picture 4">
+          <p:cNvPr id="10" name="Picture 9">
             <a:extLst>
               <a:ext uri="{FF2B5EF4-FFF2-40B4-BE49-F238E27FC236}">
-                <a16:creationId xmlns:a16="http://schemas.microsoft.com/office/drawing/2014/main" id="{3FCE9FCA-E218-48B2-9820-DFAF9B71369C}"/>
+                <a16:creationId xmlns:a16="http://schemas.microsoft.com/office/drawing/2014/main" id="{1F738D80-DFB8-4CF2-9B1D-97911A7B654C}"/>
               </a:ext>
             </a:extLst>
           </p:cNvPr>
@@ -5212,9 +5023,9 @@
           </a:stretch>
         </p:blipFill>
         <p:spPr>
-          <a:xfrm flipH="1">
-            <a:off x="8255001" y="1892300"/>
-            <a:ext cx="3073399" cy="3073399"/>
+          <a:xfrm>
+            <a:off x="8205402" y="1728402"/>
+            <a:ext cx="3172595" cy="3172595"/>
           </a:xfrm>
           <a:prstGeom prst="rect">
             <a:avLst/>
@@ -5224,7 +5035,7 @@
     </p:spTree>
     <p:extLst>
       <p:ext uri="{BB962C8B-B14F-4D97-AF65-F5344CB8AC3E}">
-        <p14:creationId xmlns:p14="http://schemas.microsoft.com/office/powerpoint/2010/main" val="1087119737"/>
+        <p14:creationId xmlns:p14="http://schemas.microsoft.com/office/powerpoint/2010/main" val="494161712"/>
       </p:ext>
     </p:extLst>
   </p:cSld>
@@ -5234,7 +5045,7 @@
 </p:sld>
 </file>
 
-<file path=ppt/slides/slide19.xml><?xml version="1.0" encoding="utf-8"?>
+<file path=ppt/slides/slide16.xml><?xml version="1.0" encoding="utf-8"?>
 <p:sld xmlns:a="http://schemas.openxmlformats.org/drawingml/2006/main" xmlns:r="http://schemas.openxmlformats.org/officeDocument/2006/relationships" xmlns:p="http://schemas.openxmlformats.org/presentationml/2006/main">
   <p:cSld>
     <p:spTree>
@@ -5274,17 +5085,63 @@
           <a:p>
             <a:r>
               <a:rPr lang="en-US" dirty="0"/>
-              <a:t>Distribution of Average Net Price of Tuitions</a:t>
-            </a:r>
+              <a:t>Tuition Distribution</a:t>
+            </a:r>
+          </a:p>
+        </p:txBody>
+      </p:sp>
+      <p:sp>
+        <p:nvSpPr>
+          <p:cNvPr id="6" name="TextBox 5">
+            <a:extLst>
+              <a:ext uri="{FF2B5EF4-FFF2-40B4-BE49-F238E27FC236}">
+                <a16:creationId xmlns:a16="http://schemas.microsoft.com/office/drawing/2014/main" id="{9B2CA274-C0F1-4831-8697-16E5D9E1FC9E}"/>
+              </a:ext>
+            </a:extLst>
+          </p:cNvPr>
+          <p:cNvSpPr txBox="1"/>
+          <p:nvPr/>
+        </p:nvSpPr>
+        <p:spPr>
+          <a:xfrm>
+            <a:off x="8724900" y="1524000"/>
+            <a:ext cx="2940050" cy="1015663"/>
+          </a:xfrm>
+          <a:prstGeom prst="rect">
+            <a:avLst/>
+          </a:prstGeom>
+          <a:noFill/>
+        </p:spPr>
+        <p:txBody>
+          <a:bodyPr wrap="square" rtlCol="0">
+            <a:spAutoFit/>
+          </a:bodyPr>
+          <a:lstStyle/>
+          <a:p>
+            <a:r>
+              <a:rPr lang="en-US" sz="2000" b="0" i="0" dirty="0">
+                <a:solidFill>
+                  <a:srgbClr val="786E6E"/>
+                </a:solidFill>
+                <a:effectLst/>
+                <a:latin typeface="Open Sans" panose="020B0606030504020204" pitchFamily="34" charset="0"/>
+              </a:rPr>
+              <a:t>There is a wide distribution of Average Net Price </a:t>
+            </a:r>
+            <a:endParaRPr lang="en-US" sz="2000" dirty="0">
+              <a:solidFill>
+                <a:srgbClr val="786E6E"/>
+              </a:solidFill>
+            </a:endParaRPr>
           </a:p>
         </p:txBody>
       </p:sp>
       <p:pic>
         <p:nvPicPr>
-          <p:cNvPr id="4" name="Picture 3" descr="Chart, histogram&#10;&#10;Description automatically generated">
+          <p:cNvPr id="16" name="Picture 15" descr="Chart, histogram&#10;&#10;Description automatically generated">
             <a:extLst>
               <a:ext uri="{FF2B5EF4-FFF2-40B4-BE49-F238E27FC236}">
-                <a16:creationId xmlns:a16="http://schemas.microsoft.com/office/drawing/2014/main" id="{AF1420BC-D189-4BDB-96A4-C855EEE25C53}"/>
+                <a16:creationId xmlns:a16="http://schemas.microsoft.com/office/drawing/2014/main" id="{F634FF97-289C-4192-9D6C-FD6326317430}"/>
               </a:ext>
             </a:extLst>
           </p:cNvPr>
@@ -5301,20 +5158,689 @@
         </p:blipFill>
         <p:spPr>
           <a:xfrm>
-            <a:off x="673100" y="1196975"/>
-            <a:ext cx="7748590" cy="5038212"/>
+            <a:off x="718411" y="1196975"/>
+            <a:ext cx="7603774" cy="4944051"/>
           </a:xfrm>
           <a:prstGeom prst="rect">
             <a:avLst/>
           </a:prstGeom>
         </p:spPr>
       </p:pic>
+    </p:spTree>
+    <p:extLst>
+      <p:ext uri="{BB962C8B-B14F-4D97-AF65-F5344CB8AC3E}">
+        <p14:creationId xmlns:p14="http://schemas.microsoft.com/office/powerpoint/2010/main" val="3193461322"/>
+      </p:ext>
+    </p:extLst>
+  </p:cSld>
+  <p:clrMapOvr>
+    <a:masterClrMapping/>
+  </p:clrMapOvr>
+</p:sld>
+</file>
+
+<file path=ppt/slides/slide17.xml><?xml version="1.0" encoding="utf-8"?>
+<p:sld xmlns:a="http://schemas.openxmlformats.org/drawingml/2006/main" xmlns:r="http://schemas.openxmlformats.org/officeDocument/2006/relationships" xmlns:p="http://schemas.openxmlformats.org/presentationml/2006/main">
+  <p:cSld>
+    <p:spTree>
+      <p:nvGrpSpPr>
+        <p:cNvPr id="1" name=""/>
+        <p:cNvGrpSpPr/>
+        <p:nvPr/>
+      </p:nvGrpSpPr>
+      <p:grpSpPr>
+        <a:xfrm>
+          <a:off x="0" y="0"/>
+          <a:ext cx="0" cy="0"/>
+          <a:chOff x="0" y="0"/>
+          <a:chExt cx="0" cy="0"/>
+        </a:xfrm>
+      </p:grpSpPr>
       <p:sp>
         <p:nvSpPr>
-          <p:cNvPr id="6" name="TextBox 5">
+          <p:cNvPr id="2" name="Title 1">
             <a:extLst>
               <a:ext uri="{FF2B5EF4-FFF2-40B4-BE49-F238E27FC236}">
-                <a16:creationId xmlns:a16="http://schemas.microsoft.com/office/drawing/2014/main" id="{9B2CA274-C0F1-4831-8697-16E5D9E1FC9E}"/>
+                <a16:creationId xmlns:a16="http://schemas.microsoft.com/office/drawing/2014/main" id="{768F0036-0E07-4FB1-AD31-33969149FF69}"/>
+              </a:ext>
+            </a:extLst>
+          </p:cNvPr>
+          <p:cNvSpPr>
+            <a:spLocks noGrp="1"/>
+          </p:cNvSpPr>
+          <p:nvPr>
+            <p:ph type="title"/>
+          </p:nvPr>
+        </p:nvSpPr>
+        <p:spPr/>
+        <p:txBody>
+          <a:bodyPr/>
+          <a:lstStyle/>
+          <a:p>
+            <a:r>
+              <a:rPr lang="en-US" dirty="0"/>
+              <a:t>Tuition - Overall</a:t>
+            </a:r>
+          </a:p>
+        </p:txBody>
+      </p:sp>
+      <p:pic>
+        <p:nvPicPr>
+          <p:cNvPr id="4" name="Picture 3" descr="Chart, box and whisker chart&#10;&#10;Description automatically generated">
+            <a:extLst>
+              <a:ext uri="{FF2B5EF4-FFF2-40B4-BE49-F238E27FC236}">
+                <a16:creationId xmlns:a16="http://schemas.microsoft.com/office/drawing/2014/main" id="{1A7FA03E-D07A-47EC-BB65-F68B8025C6AA}"/>
+              </a:ext>
+            </a:extLst>
+          </p:cNvPr>
+          <p:cNvPicPr>
+            <a:picLocks noChangeAspect="1"/>
+          </p:cNvPicPr>
+          <p:nvPr/>
+        </p:nvPicPr>
+        <p:blipFill>
+          <a:blip r:embed="rId2"/>
+          <a:stretch>
+            <a:fillRect/>
+          </a:stretch>
+        </p:blipFill>
+        <p:spPr>
+          <a:xfrm>
+            <a:off x="667211" y="1087582"/>
+            <a:ext cx="5428789" cy="5334000"/>
+          </a:xfrm>
+          <a:prstGeom prst="rect">
+            <a:avLst/>
+          </a:prstGeom>
+        </p:spPr>
+      </p:pic>
+      <p:graphicFrame>
+        <p:nvGraphicFramePr>
+          <p:cNvPr id="5" name="Table 6">
+            <a:extLst>
+              <a:ext uri="{FF2B5EF4-FFF2-40B4-BE49-F238E27FC236}">
+                <a16:creationId xmlns:a16="http://schemas.microsoft.com/office/drawing/2014/main" id="{5D206603-C570-4CF5-8F3C-019CF7793501}"/>
+              </a:ext>
+            </a:extLst>
+          </p:cNvPr>
+          <p:cNvGraphicFramePr>
+            <a:graphicFrameLocks noGrp="1"/>
+          </p:cNvGraphicFramePr>
+          <p:nvPr>
+            <p:extLst>
+              <p:ext uri="{D42A27DB-BD31-4B8C-83A1-F6EECF244321}">
+                <p14:modId xmlns:p14="http://schemas.microsoft.com/office/powerpoint/2010/main" val="2950804227"/>
+              </p:ext>
+            </p:extLst>
+          </p:nvPr>
+        </p:nvGraphicFramePr>
+        <p:xfrm>
+          <a:off x="7632124" y="1409701"/>
+          <a:ext cx="3299112" cy="3383280"/>
+        </p:xfrm>
+        <a:graphic>
+          <a:graphicData uri="http://schemas.openxmlformats.org/drawingml/2006/table">
+            <a:tbl>
+              <a:tblPr firstRow="1" bandRow="1">
+                <a:tableStyleId>{93296810-A885-4BE3-A3E7-6D5BEEA58F35}</a:tableStyleId>
+              </a:tblPr>
+              <a:tblGrid>
+                <a:gridCol w="1917121">
+                  <a:extLst>
+                    <a:ext uri="{9D8B030D-6E8A-4147-A177-3AD203B41FA5}">
+                      <a16:colId xmlns:a16="http://schemas.microsoft.com/office/drawing/2014/main" val="263095903"/>
+                    </a:ext>
+                  </a:extLst>
+                </a:gridCol>
+                <a:gridCol w="1381991">
+                  <a:extLst>
+                    <a:ext uri="{9D8B030D-6E8A-4147-A177-3AD203B41FA5}">
+                      <a16:colId xmlns:a16="http://schemas.microsoft.com/office/drawing/2014/main" val="2336731488"/>
+                    </a:ext>
+                  </a:extLst>
+                </a:gridCol>
+              </a:tblGrid>
+              <a:tr h="331739">
+                <a:tc>
+                  <a:txBody>
+                    <a:bodyPr/>
+                    <a:lstStyle/>
+                    <a:p>
+                      <a:r>
+                        <a:rPr lang="en-US" sz="1600" dirty="0"/>
+                        <a:t>Item</a:t>
+                      </a:r>
+                    </a:p>
+                  </a:txBody>
+                  <a:tcPr/>
+                </a:tc>
+                <a:tc>
+                  <a:txBody>
+                    <a:bodyPr/>
+                    <a:lstStyle/>
+                    <a:p>
+                      <a:pPr algn="ctr"/>
+                      <a:r>
+                        <a:rPr lang="en-US" sz="1600" dirty="0"/>
+                        <a:t>Value [USD]</a:t>
+                      </a:r>
+                    </a:p>
+                  </a:txBody>
+                  <a:tcPr/>
+                </a:tc>
+                <a:extLst>
+                  <a:ext uri="{0D108BD9-81ED-4DB2-BD59-A6C34878D82A}">
+                    <a16:rowId xmlns:a16="http://schemas.microsoft.com/office/drawing/2014/main" val="1982220945"/>
+                  </a:ext>
+                </a:extLst>
+              </a:tr>
+              <a:tr h="331739">
+                <a:tc>
+                  <a:txBody>
+                    <a:bodyPr/>
+                    <a:lstStyle/>
+                    <a:p>
+                      <a:r>
+                        <a:rPr lang="en-US" sz="1600" b="0" i="0" kern="1200" dirty="0">
+                          <a:solidFill>
+                            <a:schemeClr val="dk1"/>
+                          </a:solidFill>
+                          <a:effectLst/>
+                          <a:latin typeface="+mn-lt"/>
+                          <a:ea typeface="+mn-ea"/>
+                          <a:cs typeface="+mn-cs"/>
+                        </a:rPr>
+                        <a:t>Upper Boundary</a:t>
+                      </a:r>
+                      <a:endParaRPr lang="en-US" sz="1600" dirty="0"/>
+                    </a:p>
+                  </a:txBody>
+                  <a:tcPr/>
+                </a:tc>
+                <a:tc>
+                  <a:txBody>
+                    <a:bodyPr/>
+                    <a:lstStyle/>
+                    <a:p>
+                      <a:pPr algn="r"/>
+                      <a:r>
+                        <a:rPr lang="en-US" sz="1600" b="0" i="0" kern="1200" dirty="0">
+                          <a:solidFill>
+                            <a:schemeClr val="dk1"/>
+                          </a:solidFill>
+                          <a:effectLst/>
+                          <a:latin typeface="+mn-lt"/>
+                          <a:ea typeface="+mn-ea"/>
+                          <a:cs typeface="+mn-cs"/>
+                        </a:rPr>
+                        <a:t>41,388.75 </a:t>
+                      </a:r>
+                      <a:endParaRPr lang="en-US" sz="1600" dirty="0"/>
+                    </a:p>
+                  </a:txBody>
+                  <a:tcPr/>
+                </a:tc>
+                <a:extLst>
+                  <a:ext uri="{0D108BD9-81ED-4DB2-BD59-A6C34878D82A}">
+                    <a16:rowId xmlns:a16="http://schemas.microsoft.com/office/drawing/2014/main" val="2175086106"/>
+                  </a:ext>
+                </a:extLst>
+              </a:tr>
+              <a:tr h="331739">
+                <a:tc>
+                  <a:txBody>
+                    <a:bodyPr/>
+                    <a:lstStyle/>
+                    <a:p>
+                      <a:r>
+                        <a:rPr lang="en-US" sz="1600" b="0" i="0" kern="1200" dirty="0">
+                          <a:solidFill>
+                            <a:schemeClr val="dk1"/>
+                          </a:solidFill>
+                          <a:effectLst/>
+                          <a:latin typeface="+mn-lt"/>
+                          <a:ea typeface="+mn-ea"/>
+                          <a:cs typeface="+mn-cs"/>
+                        </a:rPr>
+                        <a:t>upper quartile</a:t>
+                      </a:r>
+                      <a:endParaRPr lang="en-US" sz="1600" dirty="0"/>
+                    </a:p>
+                  </a:txBody>
+                  <a:tcPr/>
+                </a:tc>
+                <a:tc>
+                  <a:txBody>
+                    <a:bodyPr/>
+                    <a:lstStyle/>
+                    <a:p>
+                      <a:pPr algn="r"/>
+                      <a:r>
+                        <a:rPr lang="en-US" sz="1600" b="0" i="0" kern="1200" dirty="0">
+                          <a:solidFill>
+                            <a:schemeClr val="dk1"/>
+                          </a:solidFill>
+                          <a:effectLst/>
+                          <a:latin typeface="+mn-lt"/>
+                          <a:ea typeface="+mn-ea"/>
+                          <a:cs typeface="+mn-cs"/>
+                        </a:rPr>
+                        <a:t>25,693.50</a:t>
+                      </a:r>
+                      <a:endParaRPr lang="en-US" sz="1600" dirty="0"/>
+                    </a:p>
+                  </a:txBody>
+                  <a:tcPr/>
+                </a:tc>
+                <a:extLst>
+                  <a:ext uri="{0D108BD9-81ED-4DB2-BD59-A6C34878D82A}">
+                    <a16:rowId xmlns:a16="http://schemas.microsoft.com/office/drawing/2014/main" val="3941414300"/>
+                  </a:ext>
+                </a:extLst>
+              </a:tr>
+              <a:tr h="331739">
+                <a:tc>
+                  <a:txBody>
+                    <a:bodyPr/>
+                    <a:lstStyle/>
+                    <a:p>
+                      <a:r>
+                        <a:rPr lang="en-US" sz="1600" b="0" i="0" kern="1200" dirty="0">
+                          <a:solidFill>
+                            <a:schemeClr val="dk1"/>
+                          </a:solidFill>
+                          <a:effectLst/>
+                          <a:latin typeface="+mn-lt"/>
+                          <a:ea typeface="+mn-ea"/>
+                          <a:cs typeface="+mn-cs"/>
+                        </a:rPr>
+                        <a:t>median</a:t>
+                      </a:r>
+                      <a:endParaRPr lang="en-US" sz="1600" dirty="0"/>
+                    </a:p>
+                  </a:txBody>
+                  <a:tcPr/>
+                </a:tc>
+                <a:tc>
+                  <a:txBody>
+                    <a:bodyPr/>
+                    <a:lstStyle/>
+                    <a:p>
+                      <a:pPr algn="r"/>
+                      <a:r>
+                        <a:rPr lang="en-US" sz="1600" b="0" i="0" kern="1200" dirty="0">
+                          <a:solidFill>
+                            <a:schemeClr val="dk1"/>
+                          </a:solidFill>
+                          <a:effectLst/>
+                          <a:latin typeface="+mn-lt"/>
+                          <a:ea typeface="+mn-ea"/>
+                          <a:cs typeface="+mn-cs"/>
+                        </a:rPr>
+                        <a:t>20,315.00</a:t>
+                      </a:r>
+                      <a:endParaRPr lang="en-US" sz="1600" dirty="0"/>
+                    </a:p>
+                  </a:txBody>
+                  <a:tcPr/>
+                </a:tc>
+                <a:extLst>
+                  <a:ext uri="{0D108BD9-81ED-4DB2-BD59-A6C34878D82A}">
+                    <a16:rowId xmlns:a16="http://schemas.microsoft.com/office/drawing/2014/main" val="524694421"/>
+                  </a:ext>
+                </a:extLst>
+              </a:tr>
+              <a:tr h="331739">
+                <a:tc>
+                  <a:txBody>
+                    <a:bodyPr/>
+                    <a:lstStyle/>
+                    <a:p>
+                      <a:r>
+                        <a:rPr lang="en-US" sz="1600" b="0" i="0" kern="1200" dirty="0">
+                          <a:solidFill>
+                            <a:schemeClr val="dk1"/>
+                          </a:solidFill>
+                          <a:effectLst/>
+                          <a:latin typeface="+mn-lt"/>
+                          <a:ea typeface="+mn-ea"/>
+                          <a:cs typeface="+mn-cs"/>
+                        </a:rPr>
+                        <a:t>lower quartile</a:t>
+                      </a:r>
+                      <a:endParaRPr lang="en-US" sz="1600" dirty="0"/>
+                    </a:p>
+                  </a:txBody>
+                  <a:tcPr/>
+                </a:tc>
+                <a:tc>
+                  <a:txBody>
+                    <a:bodyPr/>
+                    <a:lstStyle/>
+                    <a:p>
+                      <a:pPr algn="r"/>
+                      <a:r>
+                        <a:rPr lang="en-US" sz="1600" b="0" i="0" kern="1200" dirty="0">
+                          <a:solidFill>
+                            <a:schemeClr val="dk1"/>
+                          </a:solidFill>
+                          <a:effectLst/>
+                          <a:latin typeface="+mn-lt"/>
+                          <a:ea typeface="+mn-ea"/>
+                          <a:cs typeface="+mn-cs"/>
+                        </a:rPr>
+                        <a:t>15,230.00</a:t>
+                      </a:r>
+                      <a:endParaRPr lang="en-US" sz="1600" dirty="0"/>
+                    </a:p>
+                  </a:txBody>
+                  <a:tcPr/>
+                </a:tc>
+                <a:extLst>
+                  <a:ext uri="{0D108BD9-81ED-4DB2-BD59-A6C34878D82A}">
+                    <a16:rowId xmlns:a16="http://schemas.microsoft.com/office/drawing/2014/main" val="440235094"/>
+                  </a:ext>
+                </a:extLst>
+              </a:tr>
+              <a:tr h="331739">
+                <a:tc>
+                  <a:txBody>
+                    <a:bodyPr/>
+                    <a:lstStyle/>
+                    <a:p>
+                      <a:r>
+                        <a:rPr lang="en-US" sz="1600" dirty="0"/>
+                        <a:t>Lower </a:t>
+                      </a:r>
+                      <a:r>
+                        <a:rPr lang="en-US" sz="1600" b="0" i="0" kern="1200" dirty="0">
+                          <a:solidFill>
+                            <a:schemeClr val="dk1"/>
+                          </a:solidFill>
+                          <a:effectLst/>
+                          <a:latin typeface="+mn-lt"/>
+                          <a:ea typeface="+mn-ea"/>
+                          <a:cs typeface="+mn-cs"/>
+                        </a:rPr>
+                        <a:t>Boundary</a:t>
+                      </a:r>
+                      <a:r>
+                        <a:rPr lang="en-US" sz="1600" dirty="0"/>
+                        <a:t> </a:t>
+                      </a:r>
+                    </a:p>
+                  </a:txBody>
+                  <a:tcPr/>
+                </a:tc>
+                <a:tc>
+                  <a:txBody>
+                    <a:bodyPr/>
+                    <a:lstStyle/>
+                    <a:p>
+                      <a:pPr algn="r"/>
+                      <a:r>
+                        <a:rPr lang="en-US" sz="1600" b="0" i="0" kern="1200" dirty="0">
+                          <a:solidFill>
+                            <a:schemeClr val="dk1"/>
+                          </a:solidFill>
+                          <a:effectLst/>
+                          <a:latin typeface="+mn-lt"/>
+                          <a:ea typeface="+mn-ea"/>
+                          <a:cs typeface="+mn-cs"/>
+                        </a:rPr>
+                        <a:t>465.25 </a:t>
+                      </a:r>
+                      <a:endParaRPr lang="en-US" sz="1600" dirty="0"/>
+                    </a:p>
+                  </a:txBody>
+                  <a:tcPr/>
+                </a:tc>
+                <a:extLst>
+                  <a:ext uri="{0D108BD9-81ED-4DB2-BD59-A6C34878D82A}">
+                    <a16:rowId xmlns:a16="http://schemas.microsoft.com/office/drawing/2014/main" val="4164203407"/>
+                  </a:ext>
+                </a:extLst>
+              </a:tr>
+              <a:tr h="331739">
+                <a:tc>
+                  <a:txBody>
+                    <a:bodyPr/>
+                    <a:lstStyle/>
+                    <a:p>
+                      <a:r>
+                        <a:rPr lang="en-US" sz="1600" dirty="0"/>
+                        <a:t>IRQ</a:t>
+                      </a:r>
+                    </a:p>
+                  </a:txBody>
+                  <a:tcPr/>
+                </a:tc>
+                <a:tc>
+                  <a:txBody>
+                    <a:bodyPr/>
+                    <a:lstStyle/>
+                    <a:p>
+                      <a:pPr algn="r"/>
+                      <a:r>
+                        <a:rPr lang="en-US" sz="1800" b="0" i="0" kern="1200" dirty="0">
+                          <a:solidFill>
+                            <a:schemeClr val="dk1"/>
+                          </a:solidFill>
+                          <a:effectLst/>
+                          <a:latin typeface="+mn-lt"/>
+                          <a:ea typeface="+mn-ea"/>
+                          <a:cs typeface="+mn-cs"/>
+                        </a:rPr>
+                        <a:t>9,801.0</a:t>
+                      </a:r>
+                      <a:endParaRPr lang="en-US" sz="1600" dirty="0"/>
+                    </a:p>
+                  </a:txBody>
+                  <a:tcPr/>
+                </a:tc>
+                <a:extLst>
+                  <a:ext uri="{0D108BD9-81ED-4DB2-BD59-A6C34878D82A}">
+                    <a16:rowId xmlns:a16="http://schemas.microsoft.com/office/drawing/2014/main" val="2595121559"/>
+                  </a:ext>
+                </a:extLst>
+              </a:tr>
+              <a:tr h="331739">
+                <a:tc>
+                  <a:txBody>
+                    <a:bodyPr/>
+                    <a:lstStyle/>
+                    <a:p>
+                      <a:r>
+                        <a:rPr lang="en-US" sz="1600" dirty="0"/>
+                        <a:t>Maximum</a:t>
+                      </a:r>
+                    </a:p>
+                  </a:txBody>
+                  <a:tcPr/>
+                </a:tc>
+                <a:tc>
+                  <a:txBody>
+                    <a:bodyPr/>
+                    <a:lstStyle/>
+                    <a:p>
+                      <a:pPr algn="r"/>
+                      <a:r>
+                        <a:rPr lang="en-US" sz="1600" b="0" i="0" kern="1200" dirty="0">
+                          <a:solidFill>
+                            <a:schemeClr val="dk1"/>
+                          </a:solidFill>
+                          <a:effectLst/>
+                          <a:latin typeface="+mn-lt"/>
+                          <a:ea typeface="+mn-ea"/>
+                          <a:cs typeface="+mn-cs"/>
+                        </a:rPr>
+                        <a:t>56,876.00</a:t>
+                      </a:r>
+                      <a:endParaRPr lang="en-US" sz="1600" dirty="0"/>
+                    </a:p>
+                  </a:txBody>
+                  <a:tcPr/>
+                </a:tc>
+                <a:extLst>
+                  <a:ext uri="{0D108BD9-81ED-4DB2-BD59-A6C34878D82A}">
+                    <a16:rowId xmlns:a16="http://schemas.microsoft.com/office/drawing/2014/main" val="199050236"/>
+                  </a:ext>
+                </a:extLst>
+              </a:tr>
+              <a:tr h="331739">
+                <a:tc>
+                  <a:txBody>
+                    <a:bodyPr/>
+                    <a:lstStyle/>
+                    <a:p>
+                      <a:r>
+                        <a:rPr lang="en-US" sz="1600" dirty="0"/>
+                        <a:t>Minimum</a:t>
+                      </a:r>
+                    </a:p>
+                  </a:txBody>
+                  <a:tcPr/>
+                </a:tc>
+                <a:tc>
+                  <a:txBody>
+                    <a:bodyPr/>
+                    <a:lstStyle/>
+                    <a:p>
+                      <a:pPr algn="r"/>
+                      <a:r>
+                        <a:rPr lang="en-US" sz="1600" b="0" i="0" kern="1200" dirty="0">
+                          <a:solidFill>
+                            <a:schemeClr val="dk1"/>
+                          </a:solidFill>
+                          <a:effectLst/>
+                          <a:latin typeface="+mn-lt"/>
+                          <a:ea typeface="+mn-ea"/>
+                          <a:cs typeface="+mn-cs"/>
+                        </a:rPr>
+                        <a:t>462.00</a:t>
+                      </a:r>
+                      <a:endParaRPr lang="en-US" sz="1600" dirty="0"/>
+                    </a:p>
+                  </a:txBody>
+                  <a:tcPr/>
+                </a:tc>
+                <a:extLst>
+                  <a:ext uri="{0D108BD9-81ED-4DB2-BD59-A6C34878D82A}">
+                    <a16:rowId xmlns:a16="http://schemas.microsoft.com/office/drawing/2014/main" val="2050281356"/>
+                  </a:ext>
+                </a:extLst>
+              </a:tr>
+              <a:tr h="331739">
+                <a:tc>
+                  <a:txBody>
+                    <a:bodyPr/>
+                    <a:lstStyle/>
+                    <a:p>
+                      <a:r>
+                        <a:rPr lang="en-US" sz="1600" dirty="0"/>
+                        <a:t>Standard Deviation</a:t>
+                      </a:r>
+                    </a:p>
+                  </a:txBody>
+                  <a:tcPr/>
+                </a:tc>
+                <a:tc>
+                  <a:txBody>
+                    <a:bodyPr/>
+                    <a:lstStyle/>
+                    <a:p>
+                      <a:pPr algn="r"/>
+                      <a:r>
+                        <a:rPr lang="en-US" sz="1600" b="0" i="0" kern="1200" dirty="0">
+                          <a:solidFill>
+                            <a:schemeClr val="dk1"/>
+                          </a:solidFill>
+                          <a:effectLst/>
+                          <a:latin typeface="+mn-lt"/>
+                          <a:ea typeface="+mn-ea"/>
+                          <a:cs typeface="+mn-cs"/>
+                        </a:rPr>
+                        <a:t>7,791.57</a:t>
+                      </a:r>
+                      <a:endParaRPr lang="en-US" sz="1600" dirty="0"/>
+                    </a:p>
+                  </a:txBody>
+                  <a:tcPr/>
+                </a:tc>
+                <a:extLst>
+                  <a:ext uri="{0D108BD9-81ED-4DB2-BD59-A6C34878D82A}">
+                    <a16:rowId xmlns:a16="http://schemas.microsoft.com/office/drawing/2014/main" val="4183951263"/>
+                  </a:ext>
+                </a:extLst>
+              </a:tr>
+            </a:tbl>
+          </a:graphicData>
+        </a:graphic>
+      </p:graphicFrame>
+    </p:spTree>
+    <p:extLst>
+      <p:ext uri="{BB962C8B-B14F-4D97-AF65-F5344CB8AC3E}">
+        <p14:creationId xmlns:p14="http://schemas.microsoft.com/office/powerpoint/2010/main" val="3576260847"/>
+      </p:ext>
+    </p:extLst>
+  </p:cSld>
+  <p:clrMapOvr>
+    <a:masterClrMapping/>
+  </p:clrMapOvr>
+</p:sld>
+</file>
+
+<file path=ppt/slides/slide18.xml><?xml version="1.0" encoding="utf-8"?>
+<p:sld xmlns:a="http://schemas.openxmlformats.org/drawingml/2006/main" xmlns:r="http://schemas.openxmlformats.org/officeDocument/2006/relationships" xmlns:p="http://schemas.openxmlformats.org/presentationml/2006/main">
+  <p:cSld>
+    <p:spTree>
+      <p:nvGrpSpPr>
+        <p:cNvPr id="1" name=""/>
+        <p:cNvGrpSpPr/>
+        <p:nvPr/>
+      </p:nvGrpSpPr>
+      <p:grpSpPr>
+        <a:xfrm>
+          <a:off x="0" y="0"/>
+          <a:ext cx="0" cy="0"/>
+          <a:chOff x="0" y="0"/>
+          <a:chExt cx="0" cy="0"/>
+        </a:xfrm>
+      </p:grpSpPr>
+      <p:sp>
+        <p:nvSpPr>
+          <p:cNvPr id="2" name="Title 1">
+            <a:extLst>
+              <a:ext uri="{FF2B5EF4-FFF2-40B4-BE49-F238E27FC236}">
+                <a16:creationId xmlns:a16="http://schemas.microsoft.com/office/drawing/2014/main" id="{CE80E47A-A32A-4566-B3CC-AA307CF729DB}"/>
+              </a:ext>
+            </a:extLst>
+          </p:cNvPr>
+          <p:cNvSpPr>
+            <a:spLocks noGrp="1"/>
+          </p:cNvSpPr>
+          <p:nvPr>
+            <p:ph type="title"/>
+          </p:nvPr>
+        </p:nvSpPr>
+        <p:spPr/>
+        <p:txBody>
+          <a:bodyPr/>
+          <a:lstStyle/>
+          <a:p>
+            <a:r>
+              <a:rPr lang="en-US" dirty="0"/>
+              <a:t>Tuition - Quartiles</a:t>
+            </a:r>
+          </a:p>
+        </p:txBody>
+      </p:sp>
+      <p:sp>
+        <p:nvSpPr>
+          <p:cNvPr id="5" name="TextBox 4">
+            <a:extLst>
+              <a:ext uri="{FF2B5EF4-FFF2-40B4-BE49-F238E27FC236}">
+                <a16:creationId xmlns:a16="http://schemas.microsoft.com/office/drawing/2014/main" id="{1F002200-35E7-4BB6-9926-106CF7739F44}"/>
               </a:ext>
             </a:extLst>
           </p:cNvPr>
@@ -5324,7 +5850,7 @@
         <p:spPr>
           <a:xfrm>
             <a:off x="8724900" y="1524000"/>
-            <a:ext cx="2940050" cy="3477875"/>
+            <a:ext cx="2940050" cy="1323439"/>
           </a:xfrm>
           <a:prstGeom prst="rect">
             <a:avLst/>
@@ -5345,7 +5871,7 @@
                 <a:effectLst/>
                 <a:latin typeface="Open Sans" panose="020B0606030504020204" pitchFamily="34" charset="0"/>
               </a:rPr>
-              <a:t>Lorem ipsum dolor sit amet, consectetur adipiscing elit. Ut venenatis eget augue eget vulputate. Proin placerat est mattis dignissim blandit. Duis lectus diam, scelerisque sed posuere blandit, euismod sit amet sem</a:t>
+              <a:t>As expected, the Q1 has a long lower tail and Q4 has a long upper tail.</a:t>
             </a:r>
             <a:endParaRPr lang="en-US" sz="2000" dirty="0">
               <a:solidFill>
@@ -5355,10 +5881,691 @@
           </a:p>
         </p:txBody>
       </p:sp>
+      <p:pic>
+        <p:nvPicPr>
+          <p:cNvPr id="8" name="Picture 7" descr="Chart, box and whisker chart&#10;&#10;Description automatically generated">
+            <a:extLst>
+              <a:ext uri="{FF2B5EF4-FFF2-40B4-BE49-F238E27FC236}">
+                <a16:creationId xmlns:a16="http://schemas.microsoft.com/office/drawing/2014/main" id="{F34B6A50-C221-4175-9D36-6E0639E2B278}"/>
+              </a:ext>
+            </a:extLst>
+          </p:cNvPr>
+          <p:cNvPicPr>
+            <a:picLocks noChangeAspect="1"/>
+          </p:cNvPicPr>
+          <p:nvPr/>
+        </p:nvPicPr>
+        <p:blipFill>
+          <a:blip r:embed="rId2"/>
+          <a:stretch>
+            <a:fillRect/>
+          </a:stretch>
+        </p:blipFill>
+        <p:spPr>
+          <a:xfrm>
+            <a:off x="527050" y="1101435"/>
+            <a:ext cx="7461664" cy="5081155"/>
+          </a:xfrm>
+          <a:prstGeom prst="rect">
+            <a:avLst/>
+          </a:prstGeom>
+        </p:spPr>
+      </p:pic>
     </p:spTree>
     <p:extLst>
       <p:ext uri="{BB962C8B-B14F-4D97-AF65-F5344CB8AC3E}">
-        <p14:creationId xmlns:p14="http://schemas.microsoft.com/office/powerpoint/2010/main" val="3193461322"/>
+        <p14:creationId xmlns:p14="http://schemas.microsoft.com/office/powerpoint/2010/main" val="3247578005"/>
+      </p:ext>
+    </p:extLst>
+  </p:cSld>
+  <p:clrMapOvr>
+    <a:masterClrMapping/>
+  </p:clrMapOvr>
+</p:sld>
+</file>
+
+<file path=ppt/slides/slide19.xml><?xml version="1.0" encoding="utf-8"?>
+<p:sld xmlns:a="http://schemas.openxmlformats.org/drawingml/2006/main" xmlns:r="http://schemas.openxmlformats.org/officeDocument/2006/relationships" xmlns:p="http://schemas.openxmlformats.org/presentationml/2006/main">
+  <p:cSld>
+    <p:spTree>
+      <p:nvGrpSpPr>
+        <p:cNvPr id="1" name=""/>
+        <p:cNvGrpSpPr/>
+        <p:nvPr/>
+      </p:nvGrpSpPr>
+      <p:grpSpPr>
+        <a:xfrm>
+          <a:off x="0" y="0"/>
+          <a:ext cx="0" cy="0"/>
+          <a:chOff x="0" y="0"/>
+          <a:chExt cx="0" cy="0"/>
+        </a:xfrm>
+      </p:grpSpPr>
+      <p:sp>
+        <p:nvSpPr>
+          <p:cNvPr id="2" name="Title 1">
+            <a:extLst>
+              <a:ext uri="{FF2B5EF4-FFF2-40B4-BE49-F238E27FC236}">
+                <a16:creationId xmlns:a16="http://schemas.microsoft.com/office/drawing/2014/main" id="{F0CCBB68-8CEC-4D23-B5CA-3C42B84B128D}"/>
+              </a:ext>
+            </a:extLst>
+          </p:cNvPr>
+          <p:cNvSpPr>
+            <a:spLocks noGrp="1"/>
+          </p:cNvSpPr>
+          <p:nvPr>
+            <p:ph type="title"/>
+          </p:nvPr>
+        </p:nvSpPr>
+        <p:spPr/>
+        <p:txBody>
+          <a:bodyPr/>
+          <a:lstStyle/>
+          <a:p>
+            <a:r>
+              <a:rPr lang="en-US" dirty="0"/>
+              <a:t>Summary statistics for Average Net Price</a:t>
+            </a:r>
+          </a:p>
+        </p:txBody>
+      </p:sp>
+      <p:graphicFrame>
+        <p:nvGraphicFramePr>
+          <p:cNvPr id="5" name="Table 5">
+            <a:extLst>
+              <a:ext uri="{FF2B5EF4-FFF2-40B4-BE49-F238E27FC236}">
+                <a16:creationId xmlns:a16="http://schemas.microsoft.com/office/drawing/2014/main" id="{F7F42BDF-F91C-47C4-985A-009496D2BB62}"/>
+              </a:ext>
+            </a:extLst>
+          </p:cNvPr>
+          <p:cNvGraphicFramePr>
+            <a:graphicFrameLocks noGrp="1"/>
+          </p:cNvGraphicFramePr>
+          <p:nvPr>
+            <p:extLst>
+              <p:ext uri="{D42A27DB-BD31-4B8C-83A1-F6EECF244321}">
+                <p14:modId xmlns:p14="http://schemas.microsoft.com/office/powerpoint/2010/main" val="247859197"/>
+              </p:ext>
+            </p:extLst>
+          </p:nvPr>
+        </p:nvGraphicFramePr>
+        <p:xfrm>
+          <a:off x="2389910" y="2233034"/>
+          <a:ext cx="7603838" cy="2688552"/>
+        </p:xfrm>
+        <a:graphic>
+          <a:graphicData uri="http://schemas.openxmlformats.org/drawingml/2006/table">
+            <a:tbl>
+              <a:tblPr firstRow="1" bandRow="1">
+                <a:tableStyleId>{93296810-A885-4BE3-A3E7-6D5BEEA58F35}</a:tableStyleId>
+              </a:tblPr>
+              <a:tblGrid>
+                <a:gridCol w="1005378">
+                  <a:extLst>
+                    <a:ext uri="{9D8B030D-6E8A-4147-A177-3AD203B41FA5}">
+                      <a16:colId xmlns:a16="http://schemas.microsoft.com/office/drawing/2014/main" val="4057585878"/>
+                    </a:ext>
+                  </a:extLst>
+                </a:gridCol>
+                <a:gridCol w="1649615">
+                  <a:extLst>
+                    <a:ext uri="{9D8B030D-6E8A-4147-A177-3AD203B41FA5}">
+                      <a16:colId xmlns:a16="http://schemas.microsoft.com/office/drawing/2014/main" val="2739303345"/>
+                    </a:ext>
+                  </a:extLst>
+                </a:gridCol>
+                <a:gridCol w="1649615">
+                  <a:extLst>
+                    <a:ext uri="{9D8B030D-6E8A-4147-A177-3AD203B41FA5}">
+                      <a16:colId xmlns:a16="http://schemas.microsoft.com/office/drawing/2014/main" val="216525334"/>
+                    </a:ext>
+                  </a:extLst>
+                </a:gridCol>
+                <a:gridCol w="1649615">
+                  <a:extLst>
+                    <a:ext uri="{9D8B030D-6E8A-4147-A177-3AD203B41FA5}">
+                      <a16:colId xmlns:a16="http://schemas.microsoft.com/office/drawing/2014/main" val="2678134826"/>
+                    </a:ext>
+                  </a:extLst>
+                </a:gridCol>
+                <a:gridCol w="1649615">
+                  <a:extLst>
+                    <a:ext uri="{9D8B030D-6E8A-4147-A177-3AD203B41FA5}">
+                      <a16:colId xmlns:a16="http://schemas.microsoft.com/office/drawing/2014/main" val="1007633743"/>
+                    </a:ext>
+                  </a:extLst>
+                </a:gridCol>
+              </a:tblGrid>
+              <a:tr h="677647">
+                <a:tc>
+                  <a:txBody>
+                    <a:bodyPr/>
+                    <a:lstStyle/>
+                    <a:p>
+                      <a:pPr algn="ctr" fontAlgn="ctr"/>
+                      <a:r>
+                        <a:rPr lang="en-US" dirty="0">
+                          <a:effectLst/>
+                        </a:rPr>
+                        <a:t>Group</a:t>
+                      </a:r>
+                    </a:p>
+                  </a:txBody>
+                  <a:tcPr marL="76200" marR="76200" marT="38100" marB="38100" anchor="ctr"/>
+                </a:tc>
+                <a:tc>
+                  <a:txBody>
+                    <a:bodyPr/>
+                    <a:lstStyle/>
+                    <a:p>
+                      <a:pPr algn="ctr" fontAlgn="ctr"/>
+                      <a:r>
+                        <a:rPr lang="en-US" dirty="0">
+                          <a:effectLst/>
+                        </a:rPr>
+                        <a:t>Count of Schools</a:t>
+                      </a:r>
+                    </a:p>
+                  </a:txBody>
+                  <a:tcPr marL="76200" marR="76200" marT="38100" marB="38100" anchor="ctr"/>
+                </a:tc>
+                <a:tc>
+                  <a:txBody>
+                    <a:bodyPr/>
+                    <a:lstStyle/>
+                    <a:p>
+                      <a:pPr algn="ctr" fontAlgn="ctr"/>
+                      <a:r>
+                        <a:rPr lang="en-US" dirty="0">
+                          <a:effectLst/>
+                        </a:rPr>
+                        <a:t>Mean Price [USD]</a:t>
+                      </a:r>
+                    </a:p>
+                  </a:txBody>
+                  <a:tcPr marL="76200" marR="76200" marT="38100" marB="38100" anchor="ctr"/>
+                </a:tc>
+                <a:tc>
+                  <a:txBody>
+                    <a:bodyPr/>
+                    <a:lstStyle/>
+                    <a:p>
+                      <a:pPr algn="ctr" fontAlgn="ctr"/>
+                      <a:r>
+                        <a:rPr lang="en-US">
+                          <a:effectLst/>
+                        </a:rPr>
+                        <a:t>Median Price [USD]</a:t>
+                      </a:r>
+                    </a:p>
+                  </a:txBody>
+                  <a:tcPr marL="76200" marR="76200" marT="38100" marB="38100" anchor="ctr"/>
+                </a:tc>
+                <a:tc>
+                  <a:txBody>
+                    <a:bodyPr/>
+                    <a:lstStyle/>
+                    <a:p>
+                      <a:pPr algn="ctr" fontAlgn="ctr"/>
+                      <a:r>
+                        <a:rPr lang="en-US">
+                          <a:effectLst/>
+                        </a:rPr>
+                        <a:t>Price Stdev</a:t>
+                      </a:r>
+                    </a:p>
+                  </a:txBody>
+                  <a:tcPr marL="76200" marR="76200" marT="38100" marB="38100" anchor="ctr"/>
+                </a:tc>
+                <a:extLst>
+                  <a:ext uri="{0D108BD9-81ED-4DB2-BD59-A6C34878D82A}">
+                    <a16:rowId xmlns:a16="http://schemas.microsoft.com/office/drawing/2014/main" val="2671605844"/>
+                  </a:ext>
+                </a:extLst>
+              </a:tr>
+              <a:tr h="402181">
+                <a:tc>
+                  <a:txBody>
+                    <a:bodyPr/>
+                    <a:lstStyle/>
+                    <a:p>
+                      <a:pPr algn="ctr" fontAlgn="ctr"/>
+                      <a:r>
+                        <a:rPr lang="en-US" b="0">
+                          <a:effectLst/>
+                        </a:rPr>
+                        <a:t>Total</a:t>
+                      </a:r>
+                    </a:p>
+                  </a:txBody>
+                  <a:tcPr marL="76200" marR="76200" marT="38100" marB="38100" anchor="ctr"/>
+                </a:tc>
+                <a:tc>
+                  <a:txBody>
+                    <a:bodyPr/>
+                    <a:lstStyle/>
+                    <a:p>
+                      <a:pPr algn="ctr"/>
+                      <a:r>
+                        <a:rPr lang="en-US" dirty="0">
+                          <a:effectLst/>
+                        </a:rPr>
+                        <a:t>1548.0</a:t>
+                      </a:r>
+                    </a:p>
+                  </a:txBody>
+                  <a:tcPr marL="76200" marR="76200" marT="38100" marB="38100" anchor="ctr"/>
+                </a:tc>
+                <a:tc>
+                  <a:txBody>
+                    <a:bodyPr/>
+                    <a:lstStyle/>
+                    <a:p>
+                      <a:pPr algn="ctr"/>
+                      <a:r>
+                        <a:rPr lang="en-US" dirty="0">
+                          <a:effectLst/>
+                        </a:rPr>
+                        <a:t>21066.29</a:t>
+                      </a:r>
+                    </a:p>
+                  </a:txBody>
+                  <a:tcPr marL="76200" marR="76200" marT="38100" marB="38100" anchor="ctr"/>
+                </a:tc>
+                <a:tc>
+                  <a:txBody>
+                    <a:bodyPr/>
+                    <a:lstStyle/>
+                    <a:p>
+                      <a:pPr algn="ctr"/>
+                      <a:r>
+                        <a:rPr lang="en-US" dirty="0">
+                          <a:effectLst/>
+                        </a:rPr>
+                        <a:t>20315.0</a:t>
+                      </a:r>
+                    </a:p>
+                  </a:txBody>
+                  <a:tcPr marL="76200" marR="76200" marT="38100" marB="38100" anchor="ctr"/>
+                </a:tc>
+                <a:tc>
+                  <a:txBody>
+                    <a:bodyPr/>
+                    <a:lstStyle/>
+                    <a:p>
+                      <a:pPr algn="ctr"/>
+                      <a:r>
+                        <a:rPr lang="en-US" dirty="0">
+                          <a:effectLst/>
+                        </a:rPr>
+                        <a:t>8286.56</a:t>
+                      </a:r>
+                    </a:p>
+                  </a:txBody>
+                  <a:tcPr marL="76200" marR="76200" marT="38100" marB="38100" anchor="ctr"/>
+                </a:tc>
+                <a:extLst>
+                  <a:ext uri="{0D108BD9-81ED-4DB2-BD59-A6C34878D82A}">
+                    <a16:rowId xmlns:a16="http://schemas.microsoft.com/office/drawing/2014/main" val="2026061867"/>
+                  </a:ext>
+                </a:extLst>
+              </a:tr>
+              <a:tr h="402181">
+                <a:tc>
+                  <a:txBody>
+                    <a:bodyPr/>
+                    <a:lstStyle/>
+                    <a:p>
+                      <a:pPr algn="ctr" fontAlgn="ctr"/>
+                      <a:r>
+                        <a:rPr lang="en-US" b="0">
+                          <a:effectLst/>
+                        </a:rPr>
+                        <a:t>Q1</a:t>
+                      </a:r>
+                    </a:p>
+                  </a:txBody>
+                  <a:tcPr marL="76200" marR="76200" marT="38100" marB="38100" anchor="ctr"/>
+                </a:tc>
+                <a:tc>
+                  <a:txBody>
+                    <a:bodyPr/>
+                    <a:lstStyle/>
+                    <a:p>
+                      <a:pPr algn="ctr"/>
+                      <a:r>
+                        <a:rPr lang="en-US" dirty="0">
+                          <a:effectLst/>
+                        </a:rPr>
+                        <a:t>387.0</a:t>
+                      </a:r>
+                    </a:p>
+                  </a:txBody>
+                  <a:tcPr marL="76200" marR="76200" marT="38100" marB="38100" anchor="ctr"/>
+                </a:tc>
+                <a:tc>
+                  <a:txBody>
+                    <a:bodyPr/>
+                    <a:lstStyle/>
+                    <a:p>
+                      <a:pPr algn="ctr"/>
+                      <a:r>
+                        <a:rPr lang="en-US">
+                          <a:effectLst/>
+                        </a:rPr>
+                        <a:t>11458.31</a:t>
+                      </a:r>
+                    </a:p>
+                  </a:txBody>
+                  <a:tcPr marL="76200" marR="76200" marT="38100" marB="38100" anchor="ctr"/>
+                </a:tc>
+                <a:tc>
+                  <a:txBody>
+                    <a:bodyPr/>
+                    <a:lstStyle/>
+                    <a:p>
+                      <a:pPr algn="ctr"/>
+                      <a:r>
+                        <a:rPr lang="en-US">
+                          <a:effectLst/>
+                        </a:rPr>
+                        <a:t>12253.0</a:t>
+                      </a:r>
+                    </a:p>
+                  </a:txBody>
+                  <a:tcPr marL="76200" marR="76200" marT="38100" marB="38100" anchor="ctr"/>
+                </a:tc>
+                <a:tc>
+                  <a:txBody>
+                    <a:bodyPr/>
+                    <a:lstStyle/>
+                    <a:p>
+                      <a:pPr algn="ctr"/>
+                      <a:r>
+                        <a:rPr lang="en-US" dirty="0">
+                          <a:effectLst/>
+                        </a:rPr>
+                        <a:t>3094.45</a:t>
+                      </a:r>
+                    </a:p>
+                  </a:txBody>
+                  <a:tcPr marL="76200" marR="76200" marT="38100" marB="38100" anchor="ctr"/>
+                </a:tc>
+                <a:extLst>
+                  <a:ext uri="{0D108BD9-81ED-4DB2-BD59-A6C34878D82A}">
+                    <a16:rowId xmlns:a16="http://schemas.microsoft.com/office/drawing/2014/main" val="1330896242"/>
+                  </a:ext>
+                </a:extLst>
+              </a:tr>
+              <a:tr h="402181">
+                <a:tc>
+                  <a:txBody>
+                    <a:bodyPr/>
+                    <a:lstStyle/>
+                    <a:p>
+                      <a:pPr algn="ctr" fontAlgn="ctr"/>
+                      <a:r>
+                        <a:rPr lang="en-US" b="0">
+                          <a:effectLst/>
+                        </a:rPr>
+                        <a:t>Q2</a:t>
+                      </a:r>
+                    </a:p>
+                  </a:txBody>
+                  <a:tcPr marL="76200" marR="76200" marT="38100" marB="38100" anchor="ctr"/>
+                </a:tc>
+                <a:tc>
+                  <a:txBody>
+                    <a:bodyPr/>
+                    <a:lstStyle/>
+                    <a:p>
+                      <a:pPr algn="ctr"/>
+                      <a:r>
+                        <a:rPr lang="en-US" dirty="0">
+                          <a:effectLst/>
+                        </a:rPr>
+                        <a:t>387.0</a:t>
+                      </a:r>
+                    </a:p>
+                  </a:txBody>
+                  <a:tcPr marL="76200" marR="76200" marT="38100" marB="38100" anchor="ctr"/>
+                </a:tc>
+                <a:tc>
+                  <a:txBody>
+                    <a:bodyPr/>
+                    <a:lstStyle/>
+                    <a:p>
+                      <a:pPr algn="ctr"/>
+                      <a:r>
+                        <a:rPr lang="en-US">
+                          <a:effectLst/>
+                        </a:rPr>
+                        <a:t>17877.88</a:t>
+                      </a:r>
+                    </a:p>
+                  </a:txBody>
+                  <a:tcPr marL="76200" marR="76200" marT="38100" marB="38100" anchor="ctr"/>
+                </a:tc>
+                <a:tc>
+                  <a:txBody>
+                    <a:bodyPr/>
+                    <a:lstStyle/>
+                    <a:p>
+                      <a:pPr algn="ctr"/>
+                      <a:r>
+                        <a:rPr lang="en-US">
+                          <a:effectLst/>
+                        </a:rPr>
+                        <a:t>17945.0</a:t>
+                      </a:r>
+                    </a:p>
+                  </a:txBody>
+                  <a:tcPr marL="76200" marR="76200" marT="38100" marB="38100" anchor="ctr"/>
+                </a:tc>
+                <a:tc>
+                  <a:txBody>
+                    <a:bodyPr/>
+                    <a:lstStyle/>
+                    <a:p>
+                      <a:pPr algn="ctr"/>
+                      <a:r>
+                        <a:rPr lang="en-US">
+                          <a:effectLst/>
+                        </a:rPr>
+                        <a:t>1461.06</a:t>
+                      </a:r>
+                    </a:p>
+                  </a:txBody>
+                  <a:tcPr marL="76200" marR="76200" marT="38100" marB="38100" anchor="ctr"/>
+                </a:tc>
+                <a:extLst>
+                  <a:ext uri="{0D108BD9-81ED-4DB2-BD59-A6C34878D82A}">
+                    <a16:rowId xmlns:a16="http://schemas.microsoft.com/office/drawing/2014/main" val="3724125150"/>
+                  </a:ext>
+                </a:extLst>
+              </a:tr>
+              <a:tr h="402181">
+                <a:tc>
+                  <a:txBody>
+                    <a:bodyPr/>
+                    <a:lstStyle/>
+                    <a:p>
+                      <a:pPr algn="ctr" fontAlgn="ctr"/>
+                      <a:r>
+                        <a:rPr lang="en-US" b="0">
+                          <a:effectLst/>
+                        </a:rPr>
+                        <a:t>Q3</a:t>
+                      </a:r>
+                    </a:p>
+                  </a:txBody>
+                  <a:tcPr marL="76200" marR="76200" marT="38100" marB="38100" anchor="ctr"/>
+                </a:tc>
+                <a:tc>
+                  <a:txBody>
+                    <a:bodyPr/>
+                    <a:lstStyle/>
+                    <a:p>
+                      <a:pPr algn="ctr"/>
+                      <a:r>
+                        <a:rPr lang="en-US" dirty="0">
+                          <a:effectLst/>
+                        </a:rPr>
+                        <a:t>387.0</a:t>
+                      </a:r>
+                    </a:p>
+                  </a:txBody>
+                  <a:tcPr marL="76200" marR="76200" marT="38100" marB="38100" anchor="ctr"/>
+                </a:tc>
+                <a:tc>
+                  <a:txBody>
+                    <a:bodyPr/>
+                    <a:lstStyle/>
+                    <a:p>
+                      <a:pPr algn="ctr"/>
+                      <a:r>
+                        <a:rPr lang="en-US">
+                          <a:effectLst/>
+                        </a:rPr>
+                        <a:t>22760.00</a:t>
+                      </a:r>
+                    </a:p>
+                  </a:txBody>
+                  <a:tcPr marL="76200" marR="76200" marT="38100" marB="38100" anchor="ctr"/>
+                </a:tc>
+                <a:tc>
+                  <a:txBody>
+                    <a:bodyPr/>
+                    <a:lstStyle/>
+                    <a:p>
+                      <a:pPr algn="ctr"/>
+                      <a:r>
+                        <a:rPr lang="en-US" dirty="0">
+                          <a:effectLst/>
+                        </a:rPr>
+                        <a:t>22672.0</a:t>
+                      </a:r>
+                    </a:p>
+                  </a:txBody>
+                  <a:tcPr marL="76200" marR="76200" marT="38100" marB="38100" anchor="ctr"/>
+                </a:tc>
+                <a:tc>
+                  <a:txBody>
+                    <a:bodyPr/>
+                    <a:lstStyle/>
+                    <a:p>
+                      <a:pPr algn="ctr"/>
+                      <a:r>
+                        <a:rPr lang="en-US">
+                          <a:effectLst/>
+                        </a:rPr>
+                        <a:t>1551.42</a:t>
+                      </a:r>
+                    </a:p>
+                  </a:txBody>
+                  <a:tcPr marL="76200" marR="76200" marT="38100" marB="38100" anchor="ctr"/>
+                </a:tc>
+                <a:extLst>
+                  <a:ext uri="{0D108BD9-81ED-4DB2-BD59-A6C34878D82A}">
+                    <a16:rowId xmlns:a16="http://schemas.microsoft.com/office/drawing/2014/main" val="270162463"/>
+                  </a:ext>
+                </a:extLst>
+              </a:tr>
+              <a:tr h="402181">
+                <a:tc>
+                  <a:txBody>
+                    <a:bodyPr/>
+                    <a:lstStyle/>
+                    <a:p>
+                      <a:pPr algn="ctr" fontAlgn="ctr"/>
+                      <a:r>
+                        <a:rPr lang="en-US" b="0" dirty="0">
+                          <a:effectLst/>
+                        </a:rPr>
+                        <a:t>Q4</a:t>
+                      </a:r>
+                    </a:p>
+                  </a:txBody>
+                  <a:tcPr marL="76200" marR="76200" marT="38100" marB="38100" anchor="ctr"/>
+                </a:tc>
+                <a:tc>
+                  <a:txBody>
+                    <a:bodyPr/>
+                    <a:lstStyle/>
+                    <a:p>
+                      <a:pPr algn="ctr"/>
+                      <a:r>
+                        <a:rPr lang="en-US" dirty="0">
+                          <a:effectLst/>
+                        </a:rPr>
+                        <a:t>357.0</a:t>
+                      </a:r>
+                    </a:p>
+                  </a:txBody>
+                  <a:tcPr marL="76200" marR="76200" marT="38100" marB="38100" anchor="ctr"/>
+                </a:tc>
+                <a:tc>
+                  <a:txBody>
+                    <a:bodyPr/>
+                    <a:lstStyle/>
+                    <a:p>
+                      <a:pPr algn="ctr"/>
+                      <a:r>
+                        <a:rPr lang="en-US" dirty="0">
+                          <a:effectLst/>
+                        </a:rPr>
+                        <a:t>31036.67</a:t>
+                      </a:r>
+                    </a:p>
+                  </a:txBody>
+                  <a:tcPr marL="76200" marR="76200" marT="38100" marB="38100" anchor="ctr"/>
+                </a:tc>
+                <a:tc>
+                  <a:txBody>
+                    <a:bodyPr/>
+                    <a:lstStyle/>
+                    <a:p>
+                      <a:pPr algn="ctr"/>
+                      <a:r>
+                        <a:rPr lang="en-US" dirty="0">
+                          <a:effectLst/>
+                        </a:rPr>
+                        <a:t>29962.0</a:t>
+                      </a:r>
+                    </a:p>
+                  </a:txBody>
+                  <a:tcPr marL="76200" marR="76200" marT="38100" marB="38100" anchor="ctr"/>
+                </a:tc>
+                <a:tc>
+                  <a:txBody>
+                    <a:bodyPr/>
+                    <a:lstStyle/>
+                    <a:p>
+                      <a:pPr algn="ctr"/>
+                      <a:r>
+                        <a:rPr lang="en-US" dirty="0">
+                          <a:effectLst/>
+                        </a:rPr>
+                        <a:t>4151.79</a:t>
+                      </a:r>
+                    </a:p>
+                  </a:txBody>
+                  <a:tcPr marL="76200" marR="76200" marT="38100" marB="38100" anchor="ctr"/>
+                </a:tc>
+                <a:extLst>
+                  <a:ext uri="{0D108BD9-81ED-4DB2-BD59-A6C34878D82A}">
+                    <a16:rowId xmlns:a16="http://schemas.microsoft.com/office/drawing/2014/main" val="971900245"/>
+                  </a:ext>
+                </a:extLst>
+              </a:tr>
+            </a:tbl>
+          </a:graphicData>
+        </a:graphic>
+      </p:graphicFrame>
+    </p:spTree>
+    <p:extLst>
+      <p:ext uri="{BB962C8B-B14F-4D97-AF65-F5344CB8AC3E}">
+        <p14:creationId xmlns:p14="http://schemas.microsoft.com/office/powerpoint/2010/main" val="3658985045"/>
       </p:ext>
     </p:extLst>
   </p:cSld>
@@ -5744,7 +6951,7 @@
           <p:cNvPr id="2" name="Title 1">
             <a:extLst>
               <a:ext uri="{FF2B5EF4-FFF2-40B4-BE49-F238E27FC236}">
-                <a16:creationId xmlns:a16="http://schemas.microsoft.com/office/drawing/2014/main" id="{CE80E47A-A32A-4566-B3CC-AA307CF729DB}"/>
+                <a16:creationId xmlns:a16="http://schemas.microsoft.com/office/drawing/2014/main" id="{677184D2-9F9D-4DAE-BC9A-1C71B8D13A04}"/>
               </a:ext>
             </a:extLst>
           </p:cNvPr>
@@ -5762,17 +6969,63 @@
           <a:p>
             <a:r>
               <a:rPr lang="en-US" dirty="0"/>
-              <a:t>Average Net Price - Quartiles</a:t>
-            </a:r>
+              <a:t>Q1 Schools - Tuition Distribution</a:t>
+            </a:r>
+          </a:p>
+        </p:txBody>
+      </p:sp>
+      <p:sp>
+        <p:nvSpPr>
+          <p:cNvPr id="5" name="TextBox 4">
+            <a:extLst>
+              <a:ext uri="{FF2B5EF4-FFF2-40B4-BE49-F238E27FC236}">
+                <a16:creationId xmlns:a16="http://schemas.microsoft.com/office/drawing/2014/main" id="{C01F0B17-3A4D-4CC5-9F6A-3356F29842B1}"/>
+              </a:ext>
+            </a:extLst>
+          </p:cNvPr>
+          <p:cNvSpPr txBox="1"/>
+          <p:nvPr/>
+        </p:nvSpPr>
+        <p:spPr>
+          <a:xfrm>
+            <a:off x="8724900" y="1524000"/>
+            <a:ext cx="2940050" cy="1323439"/>
+          </a:xfrm>
+          <a:prstGeom prst="rect">
+            <a:avLst/>
+          </a:prstGeom>
+          <a:noFill/>
+        </p:spPr>
+        <p:txBody>
+          <a:bodyPr wrap="square" rtlCol="0">
+            <a:spAutoFit/>
+          </a:bodyPr>
+          <a:lstStyle/>
+          <a:p>
+            <a:r>
+              <a:rPr lang="en-US" sz="2000" b="0" i="0" dirty="0">
+                <a:solidFill>
+                  <a:srgbClr val="786E6E"/>
+                </a:solidFill>
+                <a:effectLst/>
+                <a:latin typeface="Open Sans" panose="020B0606030504020204" pitchFamily="34" charset="0"/>
+              </a:rPr>
+              <a:t>Within the first Quartile, we see a wide distribution of available options</a:t>
+            </a:r>
+            <a:endParaRPr lang="en-US" sz="2000" dirty="0">
+              <a:solidFill>
+                <a:srgbClr val="786E6E"/>
+              </a:solidFill>
+            </a:endParaRPr>
           </a:p>
         </p:txBody>
       </p:sp>
       <p:pic>
         <p:nvPicPr>
-          <p:cNvPr id="4" name="Picture 3" descr="Chart, box and whisker chart&#10;&#10;Description automatically generated">
+          <p:cNvPr id="10" name="Picture 9" descr="Chart, histogram&#10;&#10;Description automatically generated">
             <a:extLst>
               <a:ext uri="{FF2B5EF4-FFF2-40B4-BE49-F238E27FC236}">
-                <a16:creationId xmlns:a16="http://schemas.microsoft.com/office/drawing/2014/main" id="{4B559267-EC73-4494-B203-AA953EC0F4A6}"/>
+                <a16:creationId xmlns:a16="http://schemas.microsoft.com/office/drawing/2014/main" id="{2A970744-E9B3-49D7-9C28-624C99AA02A8}"/>
               </a:ext>
             </a:extLst>
           </p:cNvPr>
@@ -5789,64 +7042,18 @@
         </p:blipFill>
         <p:spPr>
           <a:xfrm>
-            <a:off x="527050" y="1321444"/>
-            <a:ext cx="7531100" cy="4793605"/>
+            <a:off x="633084" y="1196975"/>
+            <a:ext cx="7359912" cy="5031220"/>
           </a:xfrm>
           <a:prstGeom prst="rect">
             <a:avLst/>
           </a:prstGeom>
         </p:spPr>
       </p:pic>
-      <p:sp>
-        <p:nvSpPr>
-          <p:cNvPr id="5" name="TextBox 4">
-            <a:extLst>
-              <a:ext uri="{FF2B5EF4-FFF2-40B4-BE49-F238E27FC236}">
-                <a16:creationId xmlns:a16="http://schemas.microsoft.com/office/drawing/2014/main" id="{1F002200-35E7-4BB6-9926-106CF7739F44}"/>
-              </a:ext>
-            </a:extLst>
-          </p:cNvPr>
-          <p:cNvSpPr txBox="1"/>
-          <p:nvPr/>
-        </p:nvSpPr>
-        <p:spPr>
-          <a:xfrm>
-            <a:off x="8724900" y="1524000"/>
-            <a:ext cx="2940050" cy="3477875"/>
-          </a:xfrm>
-          <a:prstGeom prst="rect">
-            <a:avLst/>
-          </a:prstGeom>
-          <a:noFill/>
-        </p:spPr>
-        <p:txBody>
-          <a:bodyPr wrap="square" rtlCol="0">
-            <a:spAutoFit/>
-          </a:bodyPr>
-          <a:lstStyle/>
-          <a:p>
-            <a:r>
-              <a:rPr lang="en-US" sz="2000" b="0" i="0" dirty="0">
-                <a:solidFill>
-                  <a:srgbClr val="786E6E"/>
-                </a:solidFill>
-                <a:effectLst/>
-                <a:latin typeface="Open Sans" panose="020B0606030504020204" pitchFamily="34" charset="0"/>
-              </a:rPr>
-              <a:t>Lorem ipsum dolor sit amet, consectetur adipiscing elit. Ut venenatis eget augue eget vulputate. Proin placerat est mattis dignissim blandit. Duis lectus diam, scelerisque sed posuere blandit, euismod sit amet sem</a:t>
-            </a:r>
-            <a:endParaRPr lang="en-US" sz="2000" dirty="0">
-              <a:solidFill>
-                <a:srgbClr val="786E6E"/>
-              </a:solidFill>
-            </a:endParaRPr>
-          </a:p>
-        </p:txBody>
-      </p:sp>
     </p:spTree>
     <p:extLst>
       <p:ext uri="{BB962C8B-B14F-4D97-AF65-F5344CB8AC3E}">
-        <p14:creationId xmlns:p14="http://schemas.microsoft.com/office/powerpoint/2010/main" val="3247578005"/>
+        <p14:creationId xmlns:p14="http://schemas.microsoft.com/office/powerpoint/2010/main" val="1685302603"/>
       </p:ext>
     </p:extLst>
   </p:cSld>
@@ -5878,7 +7085,7 @@
           <p:cNvPr id="2" name="Title 1">
             <a:extLst>
               <a:ext uri="{FF2B5EF4-FFF2-40B4-BE49-F238E27FC236}">
-                <a16:creationId xmlns:a16="http://schemas.microsoft.com/office/drawing/2014/main" id="{677184D2-9F9D-4DAE-BC9A-1C71B8D13A04}"/>
+                <a16:creationId xmlns:a16="http://schemas.microsoft.com/office/drawing/2014/main" id="{9917F31D-A635-4A5E-BEE6-0BD743E41E61}"/>
               </a:ext>
             </a:extLst>
           </p:cNvPr>
@@ -5896,17 +7103,17 @@
           <a:p>
             <a:r>
               <a:rPr lang="en-US" dirty="0"/>
-              <a:t>Distribution of Average Net Price of Tuitions – Q1</a:t>
+              <a:t>Student Population</a:t>
             </a:r>
           </a:p>
         </p:txBody>
       </p:sp>
       <p:pic>
         <p:nvPicPr>
-          <p:cNvPr id="4" name="Picture 3" descr="Chart, histogram&#10;&#10;Description automatically generated">
+          <p:cNvPr id="7" name="Picture 6" descr="Chart, box and whisker chart&#10;&#10;Description automatically generated">
             <a:extLst>
               <a:ext uri="{FF2B5EF4-FFF2-40B4-BE49-F238E27FC236}">
-                <a16:creationId xmlns:a16="http://schemas.microsoft.com/office/drawing/2014/main" id="{8B14362A-C844-4846-B81B-9DE6F8E71B3A}"/>
+                <a16:creationId xmlns:a16="http://schemas.microsoft.com/office/drawing/2014/main" id="{BF664009-BA11-471C-BE5A-08F3A69C6575}"/>
               </a:ext>
             </a:extLst>
           </p:cNvPr>
@@ -5923,64 +7130,48 @@
         </p:blipFill>
         <p:spPr>
           <a:xfrm>
-            <a:off x="775368" y="1196975"/>
-            <a:ext cx="7364663" cy="4997450"/>
+            <a:off x="872835" y="1265526"/>
+            <a:ext cx="3345873" cy="4162971"/>
           </a:xfrm>
           <a:prstGeom prst="rect">
             <a:avLst/>
           </a:prstGeom>
         </p:spPr>
       </p:pic>
-      <p:sp>
-        <p:nvSpPr>
-          <p:cNvPr id="5" name="TextBox 4">
+      <p:pic>
+        <p:nvPicPr>
+          <p:cNvPr id="9" name="Picture 8" descr="Chart, box and whisker chart&#10;&#10;Description automatically generated">
             <a:extLst>
               <a:ext uri="{FF2B5EF4-FFF2-40B4-BE49-F238E27FC236}">
-                <a16:creationId xmlns:a16="http://schemas.microsoft.com/office/drawing/2014/main" id="{C01F0B17-3A4D-4CC5-9F6A-3356F29842B1}"/>
+                <a16:creationId xmlns:a16="http://schemas.microsoft.com/office/drawing/2014/main" id="{5731FE12-DB45-4E56-90FC-A435A1268ADF}"/>
               </a:ext>
             </a:extLst>
           </p:cNvPr>
-          <p:cNvSpPr txBox="1"/>
+          <p:cNvPicPr>
+            <a:picLocks noChangeAspect="1"/>
+          </p:cNvPicPr>
           <p:nvPr/>
-        </p:nvSpPr>
-        <p:spPr>
-          <a:xfrm>
-            <a:off x="8724900" y="1524000"/>
-            <a:ext cx="2940050" cy="3477875"/>
+        </p:nvPicPr>
+        <p:blipFill>
+          <a:blip r:embed="rId3"/>
+          <a:stretch>
+            <a:fillRect/>
+          </a:stretch>
+        </p:blipFill>
+        <p:spPr>
+          <a:xfrm>
+            <a:off x="4687452" y="1265526"/>
+            <a:ext cx="6795151" cy="4436918"/>
           </a:xfrm>
           <a:prstGeom prst="rect">
             <a:avLst/>
           </a:prstGeom>
-          <a:noFill/>
-        </p:spPr>
-        <p:txBody>
-          <a:bodyPr wrap="square" rtlCol="0">
-            <a:spAutoFit/>
-          </a:bodyPr>
-          <a:lstStyle/>
-          <a:p>
-            <a:r>
-              <a:rPr lang="en-US" sz="2000" b="0" i="0" dirty="0">
-                <a:solidFill>
-                  <a:srgbClr val="786E6E"/>
-                </a:solidFill>
-                <a:effectLst/>
-                <a:latin typeface="Open Sans" panose="020B0606030504020204" pitchFamily="34" charset="0"/>
-              </a:rPr>
-              <a:t>Lorem ipsum dolor sit amet, consectetur adipiscing elit. Ut venenatis eget augue eget vulputate. Proin placerat est mattis dignissim blandit. Duis lectus diam, scelerisque sed posuere blandit, euismod sit amet sem</a:t>
-            </a:r>
-            <a:endParaRPr lang="en-US" sz="2000" dirty="0">
-              <a:solidFill>
-                <a:srgbClr val="786E6E"/>
-              </a:solidFill>
-            </a:endParaRPr>
-          </a:p>
-        </p:txBody>
-      </p:sp>
+        </p:spPr>
+      </p:pic>
     </p:spTree>
     <p:extLst>
       <p:ext uri="{BB962C8B-B14F-4D97-AF65-F5344CB8AC3E}">
-        <p14:creationId xmlns:p14="http://schemas.microsoft.com/office/powerpoint/2010/main" val="1685302603"/>
+        <p14:creationId xmlns:p14="http://schemas.microsoft.com/office/powerpoint/2010/main" val="2465114437"/>
       </p:ext>
     </p:extLst>
   </p:cSld>
@@ -5991,7 +7182,7 @@
 </file>
 
 <file path=ppt/slides/slide22.xml><?xml version="1.0" encoding="utf-8"?>
-<p:sld xmlns:a="http://schemas.openxmlformats.org/drawingml/2006/main" xmlns:r="http://schemas.openxmlformats.org/officeDocument/2006/relationships" xmlns:p="http://schemas.openxmlformats.org/presentationml/2006/main" show="0">
+<p:sld xmlns:a="http://schemas.openxmlformats.org/drawingml/2006/main" xmlns:r="http://schemas.openxmlformats.org/officeDocument/2006/relationships" xmlns:p="http://schemas.openxmlformats.org/presentationml/2006/main">
   <p:cSld>
     <p:spTree>
       <p:nvGrpSpPr>
@@ -6012,7 +7203,7 @@
           <p:cNvPr id="4" name="Picture 3">
             <a:extLst>
               <a:ext uri="{FF2B5EF4-FFF2-40B4-BE49-F238E27FC236}">
-                <a16:creationId xmlns:a16="http://schemas.microsoft.com/office/drawing/2014/main" id="{38A0E1E0-0EE9-46D3-8943-18405E79CC5D}"/>
+                <a16:creationId xmlns:a16="http://schemas.microsoft.com/office/drawing/2014/main" id="{19F1D972-DB83-4F41-80BC-BAABA76283F7}"/>
               </a:ext>
             </a:extLst>
           </p:cNvPr>
@@ -6029,8 +7220,8 @@
         </p:blipFill>
         <p:spPr>
           <a:xfrm>
-            <a:off x="335461" y="0"/>
-            <a:ext cx="11521077" cy="6858000"/>
+            <a:off x="405228" y="0"/>
+            <a:ext cx="11381544" cy="6858000"/>
           </a:xfrm>
           <a:prstGeom prst="rect">
             <a:avLst/>
@@ -6042,7 +7233,7 @@
           <p:cNvPr id="5" name="TextBox 4">
             <a:extLst>
               <a:ext uri="{FF2B5EF4-FFF2-40B4-BE49-F238E27FC236}">
-                <a16:creationId xmlns:a16="http://schemas.microsoft.com/office/drawing/2014/main" id="{4B812974-6929-4234-97CA-F66EB18D1462}"/>
+                <a16:creationId xmlns:a16="http://schemas.microsoft.com/office/drawing/2014/main" id="{7DC9F103-DE6C-4B25-8324-506DEF5EF46B}"/>
               </a:ext>
             </a:extLst>
           </p:cNvPr>
@@ -6051,13 +7242,15 @@
         </p:nvSpPr>
         <p:spPr>
           <a:xfrm>
-            <a:off x="1271088" y="3530600"/>
-            <a:ext cx="2132512" cy="2462213"/>
+            <a:off x="1686724" y="3904673"/>
+            <a:ext cx="2132512" cy="1477328"/>
           </a:xfrm>
           <a:prstGeom prst="rect">
             <a:avLst/>
           </a:prstGeom>
-          <a:noFill/>
+          <a:solidFill>
+            <a:schemeClr val="bg2"/>
+          </a:solidFill>
         </p:spPr>
         <p:txBody>
           <a:bodyPr wrap="square" rtlCol="0">
@@ -6066,16 +7259,16 @@
           <a:lstStyle/>
           <a:p>
             <a:r>
-              <a:rPr lang="en-US" sz="1400" b="0" i="0" dirty="0">
+              <a:rPr lang="en-US" b="0" i="0" dirty="0">
                 <a:solidFill>
                   <a:srgbClr val="786E6E"/>
                 </a:solidFill>
                 <a:effectLst/>
                 <a:latin typeface="Open Sans" panose="020B0606030504020204" pitchFamily="34" charset="0"/>
               </a:rPr>
-              <a:t>Lorem ipsum dolor sit amet, consectetur adipiscing elit. Ut venenatis eget augue eget vulputate. Proin placerat est mattis dignissim blandit. Duis lectus diam, scelerisque sed posuere blandit, euismod sit amet sem</a:t>
-            </a:r>
-            <a:endParaRPr lang="en-US" sz="1400" dirty="0">
+              <a:t>Schools from all quartiles are distributed thought out the USA.  </a:t>
+            </a:r>
+            <a:endParaRPr lang="en-US" dirty="0">
               <a:solidFill>
                 <a:srgbClr val="786E6E"/>
               </a:solidFill>
@@ -6086,7 +7279,7 @@
     </p:spTree>
     <p:extLst>
       <p:ext uri="{BB962C8B-B14F-4D97-AF65-F5344CB8AC3E}">
-        <p14:creationId xmlns:p14="http://schemas.microsoft.com/office/powerpoint/2010/main" val="3636843643"/>
+        <p14:creationId xmlns:p14="http://schemas.microsoft.com/office/powerpoint/2010/main" val="118389558"/>
       </p:ext>
     </p:extLst>
   </p:cSld>
@@ -6113,12 +7306,56 @@
           <a:chExt cx="0" cy="0"/>
         </a:xfrm>
       </p:grpSpPr>
+      <p:sp>
+        <p:nvSpPr>
+          <p:cNvPr id="6" name="TextBox 5">
+            <a:extLst>
+              <a:ext uri="{FF2B5EF4-FFF2-40B4-BE49-F238E27FC236}">
+                <a16:creationId xmlns:a16="http://schemas.microsoft.com/office/drawing/2014/main" id="{2527CE40-CEEB-4F33-AC48-12DC1AF66A59}"/>
+              </a:ext>
+            </a:extLst>
+          </p:cNvPr>
+          <p:cNvSpPr txBox="1"/>
+          <p:nvPr/>
+        </p:nvSpPr>
+        <p:spPr>
+          <a:xfrm>
+            <a:off x="546100" y="1709196"/>
+            <a:ext cx="7289800" cy="3211007"/>
+          </a:xfrm>
+          <a:prstGeom prst="rect">
+            <a:avLst/>
+          </a:prstGeom>
+          <a:noFill/>
+        </p:spPr>
+        <p:txBody>
+          <a:bodyPr wrap="square" rtlCol="0">
+            <a:spAutoFit/>
+          </a:bodyPr>
+          <a:lstStyle/>
+          <a:p>
+            <a:pPr algn="ctr">
+              <a:lnSpc>
+                <a:spcPct val="150000"/>
+              </a:lnSpc>
+            </a:pPr>
+            <a:r>
+              <a:rPr lang="en-US" sz="7200" b="1" dirty="0">
+                <a:solidFill>
+                  <a:schemeClr val="accent6"/>
+                </a:solidFill>
+              </a:rPr>
+              <a:t>Must I Compromise?</a:t>
+            </a:r>
+          </a:p>
+        </p:txBody>
+      </p:sp>
       <p:pic>
         <p:nvPicPr>
-          <p:cNvPr id="3" name="Picture 2">
+          <p:cNvPr id="5" name="Picture 4">
             <a:extLst>
               <a:ext uri="{FF2B5EF4-FFF2-40B4-BE49-F238E27FC236}">
-                <a16:creationId xmlns:a16="http://schemas.microsoft.com/office/drawing/2014/main" id="{DD61B2D0-77CF-444A-825A-69D0D47685A2}"/>
+                <a16:creationId xmlns:a16="http://schemas.microsoft.com/office/drawing/2014/main" id="{3FCE9FCA-E218-48B2-9820-DFAF9B71369C}"/>
               </a:ext>
             </a:extLst>
           </p:cNvPr>
@@ -6128,71 +7365,33 @@
           <p:nvPr/>
         </p:nvPicPr>
         <p:blipFill>
-          <a:blip r:embed="rId2"/>
+          <a:blip r:embed="rId2">
+            <a:duotone>
+              <a:schemeClr val="accent6">
+                <a:shade val="45000"/>
+                <a:satMod val="135000"/>
+              </a:schemeClr>
+              <a:prstClr val="white"/>
+            </a:duotone>
+          </a:blip>
           <a:stretch>
             <a:fillRect/>
           </a:stretch>
         </p:blipFill>
         <p:spPr>
-          <a:xfrm>
-            <a:off x="260529" y="0"/>
-            <a:ext cx="11670941" cy="6858000"/>
+          <a:xfrm flipH="1">
+            <a:off x="8255000" y="1846804"/>
+            <a:ext cx="3073399" cy="3073399"/>
           </a:xfrm>
           <a:prstGeom prst="rect">
             <a:avLst/>
           </a:prstGeom>
         </p:spPr>
       </p:pic>
-      <p:sp>
-        <p:nvSpPr>
-          <p:cNvPr id="5" name="TextBox 4">
-            <a:extLst>
-              <a:ext uri="{FF2B5EF4-FFF2-40B4-BE49-F238E27FC236}">
-                <a16:creationId xmlns:a16="http://schemas.microsoft.com/office/drawing/2014/main" id="{7DC9F103-DE6C-4B25-8324-506DEF5EF46B}"/>
-              </a:ext>
-            </a:extLst>
-          </p:cNvPr>
-          <p:cNvSpPr txBox="1"/>
-          <p:nvPr/>
-        </p:nvSpPr>
-        <p:spPr>
-          <a:xfrm>
-            <a:off x="1271088" y="3530600"/>
-            <a:ext cx="2132512" cy="2462213"/>
-          </a:xfrm>
-          <a:prstGeom prst="rect">
-            <a:avLst/>
-          </a:prstGeom>
-          <a:noFill/>
-        </p:spPr>
-        <p:txBody>
-          <a:bodyPr wrap="square" rtlCol="0">
-            <a:spAutoFit/>
-          </a:bodyPr>
-          <a:lstStyle/>
-          <a:p>
-            <a:r>
-              <a:rPr lang="en-US" sz="1400" b="0" i="0" dirty="0">
-                <a:solidFill>
-                  <a:srgbClr val="786E6E"/>
-                </a:solidFill>
-                <a:effectLst/>
-                <a:latin typeface="Open Sans" panose="020B0606030504020204" pitchFamily="34" charset="0"/>
-              </a:rPr>
-              <a:t>Lorem ipsum dolor sit amet, consectetur adipiscing elit. Ut venenatis eget augue eget vulputate. Proin placerat est mattis dignissim blandit. Duis lectus diam, scelerisque sed posuere blandit, euismod sit amet sem</a:t>
-            </a:r>
-            <a:endParaRPr lang="en-US" sz="1400" dirty="0">
-              <a:solidFill>
-                <a:srgbClr val="786E6E"/>
-              </a:solidFill>
-            </a:endParaRPr>
-          </a:p>
-        </p:txBody>
-      </p:sp>
     </p:spTree>
     <p:extLst>
       <p:ext uri="{BB962C8B-B14F-4D97-AF65-F5344CB8AC3E}">
-        <p14:creationId xmlns:p14="http://schemas.microsoft.com/office/powerpoint/2010/main" val="118389558"/>
+        <p14:creationId xmlns:p14="http://schemas.microsoft.com/office/powerpoint/2010/main" val="1087119737"/>
       </p:ext>
     </p:extLst>
   </p:cSld>
@@ -6203,7 +7402,7 @@
 </file>
 
 <file path=ppt/slides/slide24.xml><?xml version="1.0" encoding="utf-8"?>
-<p:sld xmlns:a="http://schemas.openxmlformats.org/drawingml/2006/main" xmlns:r="http://schemas.openxmlformats.org/officeDocument/2006/relationships" xmlns:p="http://schemas.openxmlformats.org/presentationml/2006/main" show="0">
+<p:sld xmlns:a="http://schemas.openxmlformats.org/drawingml/2006/main" xmlns:r="http://schemas.openxmlformats.org/officeDocument/2006/relationships" xmlns:p="http://schemas.openxmlformats.org/presentationml/2006/main">
   <p:cSld>
     <p:spTree>
       <p:nvGrpSpPr>
@@ -6219,12 +7418,56 @@
           <a:chExt cx="0" cy="0"/>
         </a:xfrm>
       </p:grpSpPr>
+      <p:sp>
+        <p:nvSpPr>
+          <p:cNvPr id="6" name="TextBox 5">
+            <a:extLst>
+              <a:ext uri="{FF2B5EF4-FFF2-40B4-BE49-F238E27FC236}">
+                <a16:creationId xmlns:a16="http://schemas.microsoft.com/office/drawing/2014/main" id="{2527CE40-CEEB-4F33-AC48-12DC1AF66A59}"/>
+              </a:ext>
+            </a:extLst>
+          </p:cNvPr>
+          <p:cNvSpPr txBox="1"/>
+          <p:nvPr/>
+        </p:nvSpPr>
+        <p:spPr>
+          <a:xfrm>
+            <a:off x="1546513" y="1722943"/>
+            <a:ext cx="5289550" cy="3211007"/>
+          </a:xfrm>
+          <a:prstGeom prst="rect">
+            <a:avLst/>
+          </a:prstGeom>
+          <a:noFill/>
+        </p:spPr>
+        <p:txBody>
+          <a:bodyPr wrap="square" rtlCol="0">
+            <a:spAutoFit/>
+          </a:bodyPr>
+          <a:lstStyle/>
+          <a:p>
+            <a:pPr algn="ctr">
+              <a:lnSpc>
+                <a:spcPct val="150000"/>
+              </a:lnSpc>
+            </a:pPr>
+            <a:r>
+              <a:rPr lang="en-US" sz="7200" b="1" dirty="0">
+                <a:solidFill>
+                  <a:schemeClr val="accent6"/>
+                </a:solidFill>
+              </a:rPr>
+              <a:t>Can I get in?</a:t>
+            </a:r>
+          </a:p>
+        </p:txBody>
+      </p:sp>
       <p:pic>
         <p:nvPicPr>
           <p:cNvPr id="3" name="Picture 2">
             <a:extLst>
               <a:ext uri="{FF2B5EF4-FFF2-40B4-BE49-F238E27FC236}">
-                <a16:creationId xmlns:a16="http://schemas.microsoft.com/office/drawing/2014/main" id="{C79BC6A8-167E-4963-880A-FF0CD9F07589}"/>
+                <a16:creationId xmlns:a16="http://schemas.microsoft.com/office/drawing/2014/main" id="{CF7B6682-9F3E-46BA-B61F-4A3B9F176540}"/>
               </a:ext>
             </a:extLst>
           </p:cNvPr>
@@ -6234,71 +7477,33 @@
           <p:nvPr/>
         </p:nvPicPr>
         <p:blipFill>
-          <a:blip r:embed="rId2"/>
+          <a:blip r:embed="rId2">
+            <a:duotone>
+              <a:schemeClr val="accent6">
+                <a:shade val="45000"/>
+                <a:satMod val="135000"/>
+              </a:schemeClr>
+              <a:prstClr val="white"/>
+            </a:duotone>
+          </a:blip>
           <a:stretch>
             <a:fillRect/>
           </a:stretch>
         </p:blipFill>
         <p:spPr>
           <a:xfrm>
-            <a:off x="512771" y="0"/>
-            <a:ext cx="11166458" cy="6858000"/>
+            <a:off x="8286750" y="1823496"/>
+            <a:ext cx="3009900" cy="3009900"/>
           </a:xfrm>
           <a:prstGeom prst="rect">
             <a:avLst/>
           </a:prstGeom>
         </p:spPr>
       </p:pic>
-      <p:sp>
-        <p:nvSpPr>
-          <p:cNvPr id="5" name="TextBox 4">
-            <a:extLst>
-              <a:ext uri="{FF2B5EF4-FFF2-40B4-BE49-F238E27FC236}">
-                <a16:creationId xmlns:a16="http://schemas.microsoft.com/office/drawing/2014/main" id="{9E39C366-A849-4C70-8D9C-E2E30842862C}"/>
-              </a:ext>
-            </a:extLst>
-          </p:cNvPr>
-          <p:cNvSpPr txBox="1"/>
-          <p:nvPr/>
-        </p:nvSpPr>
-        <p:spPr>
-          <a:xfrm>
-            <a:off x="1271088" y="3530600"/>
-            <a:ext cx="2132512" cy="2462213"/>
-          </a:xfrm>
-          <a:prstGeom prst="rect">
-            <a:avLst/>
-          </a:prstGeom>
-          <a:noFill/>
-        </p:spPr>
-        <p:txBody>
-          <a:bodyPr wrap="square" rtlCol="0">
-            <a:spAutoFit/>
-          </a:bodyPr>
-          <a:lstStyle/>
-          <a:p>
-            <a:r>
-              <a:rPr lang="en-US" sz="1400" b="0" i="0" dirty="0">
-                <a:solidFill>
-                  <a:srgbClr val="786E6E"/>
-                </a:solidFill>
-                <a:effectLst/>
-                <a:latin typeface="Open Sans" panose="020B0606030504020204" pitchFamily="34" charset="0"/>
-              </a:rPr>
-              <a:t>Lorem ipsum dolor sit amet, consectetur adipiscing elit. Ut venenatis eget augue eget vulputate. Proin placerat est mattis dignissim blandit. Duis lectus diam, scelerisque sed posuere blandit, euismod sit amet sem</a:t>
-            </a:r>
-            <a:endParaRPr lang="en-US" sz="1400" dirty="0">
-              <a:solidFill>
-                <a:srgbClr val="786E6E"/>
-              </a:solidFill>
-            </a:endParaRPr>
-          </a:p>
-        </p:txBody>
-      </p:sp>
     </p:spTree>
     <p:extLst>
       <p:ext uri="{BB962C8B-B14F-4D97-AF65-F5344CB8AC3E}">
-        <p14:creationId xmlns:p14="http://schemas.microsoft.com/office/powerpoint/2010/main" val="2963159764"/>
+        <p14:creationId xmlns:p14="http://schemas.microsoft.com/office/powerpoint/2010/main" val="2337597564"/>
       </p:ext>
     </p:extLst>
   </p:cSld>
@@ -6339,119 +7544,7 @@
         </p:nvSpPr>
         <p:spPr>
           <a:xfrm>
-            <a:off x="1619250" y="2047875"/>
-            <a:ext cx="5289550" cy="3211007"/>
-          </a:xfrm>
-          <a:prstGeom prst="rect">
-            <a:avLst/>
-          </a:prstGeom>
-          <a:noFill/>
-        </p:spPr>
-        <p:txBody>
-          <a:bodyPr wrap="square" rtlCol="0">
-            <a:spAutoFit/>
-          </a:bodyPr>
-          <a:lstStyle/>
-          <a:p>
-            <a:pPr algn="ctr">
-              <a:lnSpc>
-                <a:spcPct val="150000"/>
-              </a:lnSpc>
-            </a:pPr>
-            <a:r>
-              <a:rPr lang="en-US" sz="7200" b="1" dirty="0">
-                <a:solidFill>
-                  <a:schemeClr val="accent6"/>
-                </a:solidFill>
-              </a:rPr>
-              <a:t>Can I get in?</a:t>
-            </a:r>
-          </a:p>
-        </p:txBody>
-      </p:sp>
-      <p:pic>
-        <p:nvPicPr>
-          <p:cNvPr id="3" name="Picture 2">
-            <a:extLst>
-              <a:ext uri="{FF2B5EF4-FFF2-40B4-BE49-F238E27FC236}">
-                <a16:creationId xmlns:a16="http://schemas.microsoft.com/office/drawing/2014/main" id="{CF7B6682-9F3E-46BA-B61F-4A3B9F176540}"/>
-              </a:ext>
-            </a:extLst>
-          </p:cNvPr>
-          <p:cNvPicPr>
-            <a:picLocks noChangeAspect="1"/>
-          </p:cNvPicPr>
-          <p:nvPr/>
-        </p:nvPicPr>
-        <p:blipFill>
-          <a:blip r:embed="rId2">
-            <a:duotone>
-              <a:schemeClr val="accent6">
-                <a:shade val="45000"/>
-                <a:satMod val="135000"/>
-              </a:schemeClr>
-              <a:prstClr val="white"/>
-            </a:duotone>
-          </a:blip>
-          <a:stretch>
-            <a:fillRect/>
-          </a:stretch>
-        </p:blipFill>
-        <p:spPr>
-          <a:xfrm>
-            <a:off x="8089900" y="1924050"/>
-            <a:ext cx="3009900" cy="3009900"/>
-          </a:xfrm>
-          <a:prstGeom prst="rect">
-            <a:avLst/>
-          </a:prstGeom>
-        </p:spPr>
-      </p:pic>
-    </p:spTree>
-    <p:extLst>
-      <p:ext uri="{BB962C8B-B14F-4D97-AF65-F5344CB8AC3E}">
-        <p14:creationId xmlns:p14="http://schemas.microsoft.com/office/powerpoint/2010/main" val="2337597564"/>
-      </p:ext>
-    </p:extLst>
-  </p:cSld>
-  <p:clrMapOvr>
-    <a:masterClrMapping/>
-  </p:clrMapOvr>
-</p:sld>
-</file>
-
-<file path=ppt/slides/slide26.xml><?xml version="1.0" encoding="utf-8"?>
-<p:sld xmlns:a="http://schemas.openxmlformats.org/drawingml/2006/main" xmlns:r="http://schemas.openxmlformats.org/officeDocument/2006/relationships" xmlns:p="http://schemas.openxmlformats.org/presentationml/2006/main">
-  <p:cSld>
-    <p:spTree>
-      <p:nvGrpSpPr>
-        <p:cNvPr id="1" name=""/>
-        <p:cNvGrpSpPr/>
-        <p:nvPr/>
-      </p:nvGrpSpPr>
-      <p:grpSpPr>
-        <a:xfrm>
-          <a:off x="0" y="0"/>
-          <a:ext cx="0" cy="0"/>
-          <a:chOff x="0" y="0"/>
-          <a:chExt cx="0" cy="0"/>
-        </a:xfrm>
-      </p:grpSpPr>
-      <p:sp>
-        <p:nvSpPr>
-          <p:cNvPr id="6" name="TextBox 5">
-            <a:extLst>
-              <a:ext uri="{FF2B5EF4-FFF2-40B4-BE49-F238E27FC236}">
-                <a16:creationId xmlns:a16="http://schemas.microsoft.com/office/drawing/2014/main" id="{2527CE40-CEEB-4F33-AC48-12DC1AF66A59}"/>
-              </a:ext>
-            </a:extLst>
-          </p:cNvPr>
-          <p:cNvSpPr txBox="1"/>
-          <p:nvPr/>
-        </p:nvSpPr>
-        <p:spPr>
-          <a:xfrm>
-            <a:off x="1035050" y="2136775"/>
+            <a:off x="930275" y="2540193"/>
             <a:ext cx="6521450" cy="1549014"/>
           </a:xfrm>
           <a:prstGeom prst="rect">
@@ -6511,7 +7604,7 @@
         </p:blipFill>
         <p:spPr>
           <a:xfrm>
-            <a:off x="8242300" y="1777614"/>
+            <a:off x="8190345" y="1715268"/>
             <a:ext cx="3200400" cy="3200400"/>
           </a:xfrm>
           <a:prstGeom prst="rect">
@@ -6523,6 +7616,140 @@
     <p:extLst>
       <p:ext uri="{BB962C8B-B14F-4D97-AF65-F5344CB8AC3E}">
         <p14:creationId xmlns:p14="http://schemas.microsoft.com/office/powerpoint/2010/main" val="2142660946"/>
+      </p:ext>
+    </p:extLst>
+  </p:cSld>
+  <p:clrMapOvr>
+    <a:masterClrMapping/>
+  </p:clrMapOvr>
+</p:sld>
+</file>
+
+<file path=ppt/slides/slide26.xml><?xml version="1.0" encoding="utf-8"?>
+<p:sld xmlns:a="http://schemas.openxmlformats.org/drawingml/2006/main" xmlns:r="http://schemas.openxmlformats.org/officeDocument/2006/relationships" xmlns:p="http://schemas.openxmlformats.org/presentationml/2006/main">
+  <p:cSld>
+    <p:spTree>
+      <p:nvGrpSpPr>
+        <p:cNvPr id="1" name=""/>
+        <p:cNvGrpSpPr/>
+        <p:nvPr/>
+      </p:nvGrpSpPr>
+      <p:grpSpPr>
+        <a:xfrm>
+          <a:off x="0" y="0"/>
+          <a:ext cx="0" cy="0"/>
+          <a:chOff x="0" y="0"/>
+          <a:chExt cx="0" cy="0"/>
+        </a:xfrm>
+      </p:grpSpPr>
+      <p:sp>
+        <p:nvSpPr>
+          <p:cNvPr id="2" name="Title 1">
+            <a:extLst>
+              <a:ext uri="{FF2B5EF4-FFF2-40B4-BE49-F238E27FC236}">
+                <a16:creationId xmlns:a16="http://schemas.microsoft.com/office/drawing/2014/main" id="{CE80E47A-A32A-4566-B3CC-AA307CF729DB}"/>
+              </a:ext>
+            </a:extLst>
+          </p:cNvPr>
+          <p:cNvSpPr>
+            <a:spLocks noGrp="1"/>
+          </p:cNvSpPr>
+          <p:nvPr>
+            <p:ph type="title"/>
+          </p:nvPr>
+        </p:nvSpPr>
+        <p:spPr/>
+        <p:txBody>
+          <a:bodyPr/>
+          <a:lstStyle/>
+          <a:p>
+            <a:r>
+              <a:rPr lang="en-US" dirty="0"/>
+              <a:t>Graduation Rate - Quartiles</a:t>
+            </a:r>
+          </a:p>
+        </p:txBody>
+      </p:sp>
+      <p:sp>
+        <p:nvSpPr>
+          <p:cNvPr id="5" name="TextBox 4">
+            <a:extLst>
+              <a:ext uri="{FF2B5EF4-FFF2-40B4-BE49-F238E27FC236}">
+                <a16:creationId xmlns:a16="http://schemas.microsoft.com/office/drawing/2014/main" id="{1F002200-35E7-4BB6-9926-106CF7739F44}"/>
+              </a:ext>
+            </a:extLst>
+          </p:cNvPr>
+          <p:cNvSpPr txBox="1"/>
+          <p:nvPr/>
+        </p:nvSpPr>
+        <p:spPr>
+          <a:xfrm>
+            <a:off x="8724900" y="1524000"/>
+            <a:ext cx="2940050" cy="3477875"/>
+          </a:xfrm>
+          <a:prstGeom prst="rect">
+            <a:avLst/>
+          </a:prstGeom>
+          <a:noFill/>
+        </p:spPr>
+        <p:txBody>
+          <a:bodyPr wrap="square" rtlCol="0">
+            <a:spAutoFit/>
+          </a:bodyPr>
+          <a:lstStyle/>
+          <a:p>
+            <a:r>
+              <a:rPr lang="en-US" sz="2000" b="0" i="0" dirty="0">
+                <a:solidFill>
+                  <a:srgbClr val="786E6E"/>
+                </a:solidFill>
+                <a:effectLst/>
+                <a:latin typeface="Open Sans" panose="020B0606030504020204" pitchFamily="34" charset="0"/>
+              </a:rPr>
+              <a:t>Lorem ipsum dolor sit amet, consectetur adipiscing elit. Ut venenatis eget augue eget vulputate. Proin placerat est mattis dignissim blandit. Duis lectus diam, scelerisque sed posuere blandit, euismod sit amet sem</a:t>
+            </a:r>
+            <a:endParaRPr lang="en-US" sz="2000" dirty="0">
+              <a:solidFill>
+                <a:srgbClr val="786E6E"/>
+              </a:solidFill>
+            </a:endParaRPr>
+          </a:p>
+        </p:txBody>
+      </p:sp>
+      <p:pic>
+        <p:nvPicPr>
+          <p:cNvPr id="4" name="Picture 3" descr="Chart, box and whisker chart&#10;&#10;Description automatically generated">
+            <a:extLst>
+              <a:ext uri="{FF2B5EF4-FFF2-40B4-BE49-F238E27FC236}">
+                <a16:creationId xmlns:a16="http://schemas.microsoft.com/office/drawing/2014/main" id="{C91B47A0-C6A2-4978-BC4B-650EF47D5E53}"/>
+              </a:ext>
+            </a:extLst>
+          </p:cNvPr>
+          <p:cNvPicPr>
+            <a:picLocks noChangeAspect="1"/>
+          </p:cNvPicPr>
+          <p:nvPr/>
+        </p:nvPicPr>
+        <p:blipFill>
+          <a:blip r:embed="rId2"/>
+          <a:stretch>
+            <a:fillRect/>
+          </a:stretch>
+        </p:blipFill>
+        <p:spPr>
+          <a:xfrm>
+            <a:off x="527049" y="1018309"/>
+            <a:ext cx="7411605" cy="5137496"/>
+          </a:xfrm>
+          <a:prstGeom prst="rect">
+            <a:avLst/>
+          </a:prstGeom>
+        </p:spPr>
+      </p:pic>
+    </p:spTree>
+    <p:extLst>
+      <p:ext uri="{BB962C8B-B14F-4D97-AF65-F5344CB8AC3E}">
+        <p14:creationId xmlns:p14="http://schemas.microsoft.com/office/powerpoint/2010/main" val="3040465965"/>
       </p:ext>
     </p:extLst>
   </p:cSld>
@@ -6563,8 +7790,8 @@
         </p:nvSpPr>
         <p:spPr>
           <a:xfrm>
-            <a:off x="254000" y="2124075"/>
-            <a:ext cx="8229600" cy="1549014"/>
+            <a:off x="76200" y="1709196"/>
+            <a:ext cx="8229600" cy="3211007"/>
           </a:xfrm>
           <a:prstGeom prst="rect">
             <a:avLst/>
@@ -6588,7 +7815,22 @@
                   <a:schemeClr val="accent6"/>
                 </a:solidFill>
               </a:rPr>
-              <a:t>… and my future?</a:t>
+              <a:t>… and my </a:t>
+            </a:r>
+            <a:br>
+              <a:rPr lang="en-US" sz="7200" b="1" dirty="0">
+                <a:solidFill>
+                  <a:schemeClr val="accent6"/>
+                </a:solidFill>
+              </a:rPr>
+            </a:br>
+            <a:r>
+              <a:rPr lang="en-US" sz="7200" b="1" dirty="0">
+                <a:solidFill>
+                  <a:schemeClr val="accent6"/>
+                </a:solidFill>
+              </a:rPr>
+              <a:t>future?</a:t>
             </a:r>
           </a:p>
         </p:txBody>
@@ -6623,8 +7865,8 @@
         </p:blipFill>
         <p:spPr>
           <a:xfrm>
-            <a:off x="8842375" y="1958974"/>
-            <a:ext cx="2676525" cy="2676525"/>
+            <a:off x="8250959" y="1773959"/>
+            <a:ext cx="3081482" cy="3081482"/>
           </a:xfrm>
           <a:prstGeom prst="rect">
             <a:avLst/>
@@ -6645,6 +7887,180 @@
 </file>
 
 <file path=ppt/slides/slide28.xml><?xml version="1.0" encoding="utf-8"?>
+<p:sld xmlns:a="http://schemas.openxmlformats.org/drawingml/2006/main" xmlns:r="http://schemas.openxmlformats.org/officeDocument/2006/relationships" xmlns:p="http://schemas.openxmlformats.org/presentationml/2006/main">
+  <p:cSld>
+    <p:spTree>
+      <p:nvGrpSpPr>
+        <p:cNvPr id="1" name=""/>
+        <p:cNvGrpSpPr/>
+        <p:nvPr/>
+      </p:nvGrpSpPr>
+      <p:grpSpPr>
+        <a:xfrm>
+          <a:off x="0" y="0"/>
+          <a:ext cx="0" cy="0"/>
+          <a:chOff x="0" y="0"/>
+          <a:chExt cx="0" cy="0"/>
+        </a:xfrm>
+      </p:grpSpPr>
+      <p:sp>
+        <p:nvSpPr>
+          <p:cNvPr id="2" name="Content Placeholder 1">
+            <a:extLst>
+              <a:ext uri="{FF2B5EF4-FFF2-40B4-BE49-F238E27FC236}">
+                <a16:creationId xmlns:a16="http://schemas.microsoft.com/office/drawing/2014/main" id="{05979C55-382B-4FE0-8A66-7CB5CD9348CF}"/>
+              </a:ext>
+            </a:extLst>
+          </p:cNvPr>
+          <p:cNvSpPr>
+            <a:spLocks noGrp="1"/>
+          </p:cNvSpPr>
+          <p:nvPr>
+            <p:ph idx="1"/>
+          </p:nvPr>
+        </p:nvSpPr>
+        <p:spPr/>
+        <p:txBody>
+          <a:bodyPr/>
+          <a:lstStyle/>
+          <a:p>
+            <a:r>
+              <a:rPr lang="en-US" dirty="0"/>
+              <a:t>Are there options that won’t leave me in debt for the rest of my life?</a:t>
+            </a:r>
+          </a:p>
+          <a:p>
+            <a:pPr lvl="1"/>
+            <a:r>
+              <a:rPr lang="en-US" dirty="0"/>
+              <a:t>Yes. Q1 schools are available in equal numbers and geographic distribution </a:t>
+            </a:r>
+          </a:p>
+          <a:p>
+            <a:r>
+              <a:rPr lang="en-US" dirty="0"/>
+              <a:t>Will in need to make compromises to stay out of debt?</a:t>
+            </a:r>
+          </a:p>
+          <a:p>
+            <a:pPr lvl="1"/>
+            <a:r>
+              <a:rPr lang="en-US" dirty="0"/>
+              <a:t>Q1 schools tend to have larger student populations</a:t>
+            </a:r>
+          </a:p>
+          <a:p>
+            <a:pPr lvl="1"/>
+            <a:r>
+              <a:rPr lang="en-US" dirty="0"/>
+              <a:t>Q1 schools </a:t>
+            </a:r>
+            <a:r>
+              <a:rPr lang="en-US" dirty="0">
+                <a:highlight>
+                  <a:srgbClr val="FFFF00"/>
+                </a:highlight>
+              </a:rPr>
+              <a:t>[something about race] </a:t>
+            </a:r>
+          </a:p>
+          <a:p>
+            <a:r>
+              <a:rPr lang="en-US" dirty="0"/>
+              <a:t>Can I get into a more affordable school?</a:t>
+            </a:r>
+          </a:p>
+          <a:p>
+            <a:pPr lvl="1"/>
+            <a:r>
+              <a:rPr lang="en-US" dirty="0"/>
+              <a:t>? Q1 schools </a:t>
+            </a:r>
+            <a:r>
+              <a:rPr lang="en-US" dirty="0">
+                <a:highlight>
+                  <a:srgbClr val="FFFF00"/>
+                </a:highlight>
+              </a:rPr>
+              <a:t>[something about admissions] </a:t>
+            </a:r>
+            <a:endParaRPr lang="en-US" dirty="0"/>
+          </a:p>
+          <a:p>
+            <a:r>
+              <a:rPr lang="en-US" dirty="0"/>
+              <a:t>Will I be able to graduate?</a:t>
+            </a:r>
+          </a:p>
+          <a:p>
+            <a:pPr lvl="1"/>
+            <a:r>
+              <a:rPr lang="en-US" dirty="0"/>
+              <a:t>Yes. Graduation rates are higher at more expensive schools,  but the rates are acceptable at Q1 schools,  More research is needed to determine the root cause of the differences.</a:t>
+            </a:r>
+          </a:p>
+          <a:p>
+            <a:r>
+              <a:rPr lang="en-US" dirty="0"/>
+              <a:t>Will it impact my earnings?</a:t>
+            </a:r>
+          </a:p>
+          <a:p>
+            <a:endParaRPr lang="en-US" dirty="0"/>
+          </a:p>
+          <a:p>
+            <a:endParaRPr lang="en-US" dirty="0"/>
+          </a:p>
+          <a:p>
+            <a:endParaRPr lang="en-US" dirty="0"/>
+          </a:p>
+          <a:p>
+            <a:endParaRPr lang="en-US" dirty="0"/>
+          </a:p>
+        </p:txBody>
+      </p:sp>
+      <p:sp>
+        <p:nvSpPr>
+          <p:cNvPr id="3" name="Title 2">
+            <a:extLst>
+              <a:ext uri="{FF2B5EF4-FFF2-40B4-BE49-F238E27FC236}">
+                <a16:creationId xmlns:a16="http://schemas.microsoft.com/office/drawing/2014/main" id="{12E072EB-EC40-486B-833C-2503D1547BEE}"/>
+              </a:ext>
+            </a:extLst>
+          </p:cNvPr>
+          <p:cNvSpPr>
+            <a:spLocks noGrp="1"/>
+          </p:cNvSpPr>
+          <p:nvPr>
+            <p:ph type="title"/>
+          </p:nvPr>
+        </p:nvSpPr>
+        <p:spPr/>
+        <p:txBody>
+          <a:bodyPr/>
+          <a:lstStyle/>
+          <a:p>
+            <a:r>
+              <a:rPr lang="en-US" dirty="0"/>
+              <a:t>Summary</a:t>
+            </a:r>
+          </a:p>
+        </p:txBody>
+      </p:sp>
+    </p:spTree>
+    <p:extLst>
+      <p:ext uri="{BB962C8B-B14F-4D97-AF65-F5344CB8AC3E}">
+        <p14:creationId xmlns:p14="http://schemas.microsoft.com/office/powerpoint/2010/main" val="114328860"/>
+      </p:ext>
+    </p:extLst>
+  </p:cSld>
+  <p:clrMapOvr>
+    <a:masterClrMapping/>
+  </p:clrMapOvr>
+</p:sld>
+</file>
+
+<file path=ppt/slides/slide29.xml><?xml version="1.0" encoding="utf-8"?>
 <p:sld xmlns:a="http://schemas.openxmlformats.org/drawingml/2006/main" xmlns:r="http://schemas.openxmlformats.org/officeDocument/2006/relationships" xmlns:p="http://schemas.openxmlformats.org/presentationml/2006/main">
   <p:cSld>
     <p:spTree>
@@ -6695,36 +8111,6 @@
     <p:extLst>
       <p:ext uri="{BB962C8B-B14F-4D97-AF65-F5344CB8AC3E}">
         <p14:creationId xmlns:p14="http://schemas.microsoft.com/office/powerpoint/2010/main" val="3839672882"/>
-      </p:ext>
-    </p:extLst>
-  </p:cSld>
-  <p:clrMapOvr>
-    <a:masterClrMapping/>
-  </p:clrMapOvr>
-</p:sld>
-</file>
-
-<file path=ppt/slides/slide29.xml><?xml version="1.0" encoding="utf-8"?>
-<p:sld xmlns:a="http://schemas.openxmlformats.org/drawingml/2006/main" xmlns:r="http://schemas.openxmlformats.org/officeDocument/2006/relationships" xmlns:p="http://schemas.openxmlformats.org/presentationml/2006/main">
-  <p:cSld>
-    <p:spTree>
-      <p:nvGrpSpPr>
-        <p:cNvPr id="1" name=""/>
-        <p:cNvGrpSpPr/>
-        <p:nvPr/>
-      </p:nvGrpSpPr>
-      <p:grpSpPr>
-        <a:xfrm>
-          <a:off x="0" y="0"/>
-          <a:ext cx="0" cy="0"/>
-          <a:chOff x="0" y="0"/>
-          <a:chExt cx="0" cy="0"/>
-        </a:xfrm>
-      </p:grpSpPr>
-    </p:spTree>
-    <p:extLst>
-      <p:ext uri="{BB962C8B-B14F-4D97-AF65-F5344CB8AC3E}">
-        <p14:creationId xmlns:p14="http://schemas.microsoft.com/office/powerpoint/2010/main" val="3949269715"/>
       </p:ext>
     </p:extLst>
   </p:cSld>
@@ -6881,7 +8267,405 @@
 </file>
 
 <file path=ppt/slides/slide30.xml><?xml version="1.0" encoding="utf-8"?>
-<p:sld xmlns:a="http://schemas.openxmlformats.org/drawingml/2006/main" xmlns:r="http://schemas.openxmlformats.org/officeDocument/2006/relationships" xmlns:p="http://schemas.openxmlformats.org/presentationml/2006/main">
+<p:sld xmlns:a="http://schemas.openxmlformats.org/drawingml/2006/main" xmlns:r="http://schemas.openxmlformats.org/officeDocument/2006/relationships" xmlns:p="http://schemas.openxmlformats.org/presentationml/2006/main" show="0">
+  <p:cSld>
+    <p:spTree>
+      <p:nvGrpSpPr>
+        <p:cNvPr id="1" name=""/>
+        <p:cNvGrpSpPr/>
+        <p:nvPr/>
+      </p:nvGrpSpPr>
+      <p:grpSpPr>
+        <a:xfrm>
+          <a:off x="0" y="0"/>
+          <a:ext cx="0" cy="0"/>
+          <a:chOff x="0" y="0"/>
+          <a:chExt cx="0" cy="0"/>
+        </a:xfrm>
+      </p:grpSpPr>
+    </p:spTree>
+    <p:extLst>
+      <p:ext uri="{BB962C8B-B14F-4D97-AF65-F5344CB8AC3E}">
+        <p14:creationId xmlns:p14="http://schemas.microsoft.com/office/powerpoint/2010/main" val="3949269715"/>
+      </p:ext>
+    </p:extLst>
+  </p:cSld>
+  <p:clrMapOvr>
+    <a:masterClrMapping/>
+  </p:clrMapOvr>
+</p:sld>
+</file>
+
+<file path=ppt/slides/slide31.xml><?xml version="1.0" encoding="utf-8"?>
+<p:sld xmlns:a="http://schemas.openxmlformats.org/drawingml/2006/main" xmlns:r="http://schemas.openxmlformats.org/officeDocument/2006/relationships" xmlns:p="http://schemas.openxmlformats.org/presentationml/2006/main" show="0">
+  <p:cSld>
+    <p:spTree>
+      <p:nvGrpSpPr>
+        <p:cNvPr id="1" name=""/>
+        <p:cNvGrpSpPr/>
+        <p:nvPr/>
+      </p:nvGrpSpPr>
+      <p:grpSpPr>
+        <a:xfrm>
+          <a:off x="0" y="0"/>
+          <a:ext cx="0" cy="0"/>
+          <a:chOff x="0" y="0"/>
+          <a:chExt cx="0" cy="0"/>
+        </a:xfrm>
+      </p:grpSpPr>
+      <p:pic>
+        <p:nvPicPr>
+          <p:cNvPr id="5" name="Picture 4">
+            <a:extLst>
+              <a:ext uri="{FF2B5EF4-FFF2-40B4-BE49-F238E27FC236}">
+                <a16:creationId xmlns:a16="http://schemas.microsoft.com/office/drawing/2014/main" id="{234BC3BD-3A62-4DFC-8200-441CFFF0D04C}"/>
+              </a:ext>
+            </a:extLst>
+          </p:cNvPr>
+          <p:cNvPicPr>
+            <a:picLocks noChangeAspect="1"/>
+          </p:cNvPicPr>
+          <p:nvPr/>
+        </p:nvPicPr>
+        <p:blipFill>
+          <a:blip r:embed="rId2"/>
+          <a:stretch>
+            <a:fillRect/>
+          </a:stretch>
+        </p:blipFill>
+        <p:spPr>
+          <a:xfrm>
+            <a:off x="829333" y="1362333"/>
+            <a:ext cx="10533333" cy="4133333"/>
+          </a:xfrm>
+          <a:prstGeom prst="rect">
+            <a:avLst/>
+          </a:prstGeom>
+        </p:spPr>
+      </p:pic>
+      <p:sp>
+        <p:nvSpPr>
+          <p:cNvPr id="6" name="Rectangle 5">
+            <a:extLst>
+              <a:ext uri="{FF2B5EF4-FFF2-40B4-BE49-F238E27FC236}">
+                <a16:creationId xmlns:a16="http://schemas.microsoft.com/office/drawing/2014/main" id="{5E414CA3-EFA0-433B-A527-02A1779B61AB}"/>
+              </a:ext>
+            </a:extLst>
+          </p:cNvPr>
+          <p:cNvSpPr/>
+          <p:nvPr/>
+        </p:nvSpPr>
+        <p:spPr>
+          <a:xfrm>
+            <a:off x="6858000" y="4667250"/>
+            <a:ext cx="1943100" cy="323850"/>
+          </a:xfrm>
+          <a:prstGeom prst="rect">
+            <a:avLst/>
+          </a:prstGeom>
+          <a:solidFill>
+            <a:srgbClr val="FFFFFF"/>
+          </a:solidFill>
+          <a:ln>
+            <a:noFill/>
+          </a:ln>
+        </p:spPr>
+        <p:txBody>
+          <a:bodyPr rtlCol="0" anchor="ctr"/>
+          <a:lstStyle/>
+          <a:p>
+            <a:pPr algn="ctr"/>
+            <a:endParaRPr lang="en-US"/>
+          </a:p>
+        </p:txBody>
+      </p:sp>
+    </p:spTree>
+    <p:extLst>
+      <p:ext uri="{BB962C8B-B14F-4D97-AF65-F5344CB8AC3E}">
+        <p14:creationId xmlns:p14="http://schemas.microsoft.com/office/powerpoint/2010/main" val="2124044676"/>
+      </p:ext>
+    </p:extLst>
+  </p:cSld>
+  <p:clrMapOvr>
+    <a:masterClrMapping/>
+  </p:clrMapOvr>
+</p:sld>
+</file>
+
+<file path=ppt/slides/slide32.xml><?xml version="1.0" encoding="utf-8"?>
+<p:sld xmlns:a="http://schemas.openxmlformats.org/drawingml/2006/main" xmlns:r="http://schemas.openxmlformats.org/officeDocument/2006/relationships" xmlns:p="http://schemas.openxmlformats.org/presentationml/2006/main" show="0">
+  <p:cSld>
+    <p:spTree>
+      <p:nvGrpSpPr>
+        <p:cNvPr id="1" name=""/>
+        <p:cNvGrpSpPr/>
+        <p:nvPr/>
+      </p:nvGrpSpPr>
+      <p:grpSpPr>
+        <a:xfrm>
+          <a:off x="0" y="0"/>
+          <a:ext cx="0" cy="0"/>
+          <a:chOff x="0" y="0"/>
+          <a:chExt cx="0" cy="0"/>
+        </a:xfrm>
+      </p:grpSpPr>
+      <p:pic>
+        <p:nvPicPr>
+          <p:cNvPr id="3" name="Picture 2">
+            <a:extLst>
+              <a:ext uri="{FF2B5EF4-FFF2-40B4-BE49-F238E27FC236}">
+                <a16:creationId xmlns:a16="http://schemas.microsoft.com/office/drawing/2014/main" id="{CFA76F85-2BB7-4C0D-9819-344E941CD0D7}"/>
+              </a:ext>
+            </a:extLst>
+          </p:cNvPr>
+          <p:cNvPicPr>
+            <a:picLocks noChangeAspect="1"/>
+          </p:cNvPicPr>
+          <p:nvPr/>
+        </p:nvPicPr>
+        <p:blipFill>
+          <a:blip r:embed="rId2"/>
+          <a:stretch>
+            <a:fillRect/>
+          </a:stretch>
+        </p:blipFill>
+        <p:spPr>
+          <a:xfrm>
+            <a:off x="1362666" y="1019476"/>
+            <a:ext cx="9466667" cy="4819048"/>
+          </a:xfrm>
+          <a:prstGeom prst="rect">
+            <a:avLst/>
+          </a:prstGeom>
+        </p:spPr>
+      </p:pic>
+    </p:spTree>
+    <p:extLst>
+      <p:ext uri="{BB962C8B-B14F-4D97-AF65-F5344CB8AC3E}">
+        <p14:creationId xmlns:p14="http://schemas.microsoft.com/office/powerpoint/2010/main" val="97304364"/>
+      </p:ext>
+    </p:extLst>
+  </p:cSld>
+  <p:clrMapOvr>
+    <a:masterClrMapping/>
+  </p:clrMapOvr>
+</p:sld>
+</file>
+
+<file path=ppt/slides/slide33.xml><?xml version="1.0" encoding="utf-8"?>
+<p:sld xmlns:a="http://schemas.openxmlformats.org/drawingml/2006/main" xmlns:r="http://schemas.openxmlformats.org/officeDocument/2006/relationships" xmlns:p="http://schemas.openxmlformats.org/presentationml/2006/main" show="0">
+  <p:cSld>
+    <p:spTree>
+      <p:nvGrpSpPr>
+        <p:cNvPr id="1" name=""/>
+        <p:cNvGrpSpPr/>
+        <p:nvPr/>
+      </p:nvGrpSpPr>
+      <p:grpSpPr>
+        <a:xfrm>
+          <a:off x="0" y="0"/>
+          <a:ext cx="0" cy="0"/>
+          <a:chOff x="0" y="0"/>
+          <a:chExt cx="0" cy="0"/>
+        </a:xfrm>
+      </p:grpSpPr>
+      <p:pic>
+        <p:nvPicPr>
+          <p:cNvPr id="4" name="Picture 3">
+            <a:extLst>
+              <a:ext uri="{FF2B5EF4-FFF2-40B4-BE49-F238E27FC236}">
+                <a16:creationId xmlns:a16="http://schemas.microsoft.com/office/drawing/2014/main" id="{38A0E1E0-0EE9-46D3-8943-18405E79CC5D}"/>
+              </a:ext>
+            </a:extLst>
+          </p:cNvPr>
+          <p:cNvPicPr>
+            <a:picLocks noChangeAspect="1"/>
+          </p:cNvPicPr>
+          <p:nvPr/>
+        </p:nvPicPr>
+        <p:blipFill>
+          <a:blip r:embed="rId2"/>
+          <a:stretch>
+            <a:fillRect/>
+          </a:stretch>
+        </p:blipFill>
+        <p:spPr>
+          <a:xfrm>
+            <a:off x="335461" y="0"/>
+            <a:ext cx="11521077" cy="6858000"/>
+          </a:xfrm>
+          <a:prstGeom prst="rect">
+            <a:avLst/>
+          </a:prstGeom>
+        </p:spPr>
+      </p:pic>
+      <p:sp>
+        <p:nvSpPr>
+          <p:cNvPr id="5" name="TextBox 4">
+            <a:extLst>
+              <a:ext uri="{FF2B5EF4-FFF2-40B4-BE49-F238E27FC236}">
+                <a16:creationId xmlns:a16="http://schemas.microsoft.com/office/drawing/2014/main" id="{4B812974-6929-4234-97CA-F66EB18D1462}"/>
+              </a:ext>
+            </a:extLst>
+          </p:cNvPr>
+          <p:cNvSpPr txBox="1"/>
+          <p:nvPr/>
+        </p:nvSpPr>
+        <p:spPr>
+          <a:xfrm>
+            <a:off x="1271088" y="3530600"/>
+            <a:ext cx="2132512" cy="2462213"/>
+          </a:xfrm>
+          <a:prstGeom prst="rect">
+            <a:avLst/>
+          </a:prstGeom>
+          <a:noFill/>
+        </p:spPr>
+        <p:txBody>
+          <a:bodyPr wrap="square" rtlCol="0">
+            <a:spAutoFit/>
+          </a:bodyPr>
+          <a:lstStyle/>
+          <a:p>
+            <a:r>
+              <a:rPr lang="en-US" sz="1400" b="0" i="0" dirty="0">
+                <a:solidFill>
+                  <a:srgbClr val="786E6E"/>
+                </a:solidFill>
+                <a:effectLst/>
+                <a:latin typeface="Open Sans" panose="020B0606030504020204" pitchFamily="34" charset="0"/>
+              </a:rPr>
+              <a:t>Lorem ipsum dolor sit amet, consectetur adipiscing elit. Ut venenatis eget augue eget vulputate. Proin placerat est mattis dignissim blandit. Duis lectus diam, scelerisque sed posuere blandit, euismod sit amet sem</a:t>
+            </a:r>
+            <a:endParaRPr lang="en-US" sz="1400" dirty="0">
+              <a:solidFill>
+                <a:srgbClr val="786E6E"/>
+              </a:solidFill>
+            </a:endParaRPr>
+          </a:p>
+        </p:txBody>
+      </p:sp>
+    </p:spTree>
+    <p:extLst>
+      <p:ext uri="{BB962C8B-B14F-4D97-AF65-F5344CB8AC3E}">
+        <p14:creationId xmlns:p14="http://schemas.microsoft.com/office/powerpoint/2010/main" val="3636843643"/>
+      </p:ext>
+    </p:extLst>
+  </p:cSld>
+  <p:clrMapOvr>
+    <a:masterClrMapping/>
+  </p:clrMapOvr>
+</p:sld>
+</file>
+
+<file path=ppt/slides/slide34.xml><?xml version="1.0" encoding="utf-8"?>
+<p:sld xmlns:a="http://schemas.openxmlformats.org/drawingml/2006/main" xmlns:r="http://schemas.openxmlformats.org/officeDocument/2006/relationships" xmlns:p="http://schemas.openxmlformats.org/presentationml/2006/main" show="0">
+  <p:cSld>
+    <p:spTree>
+      <p:nvGrpSpPr>
+        <p:cNvPr id="1" name=""/>
+        <p:cNvGrpSpPr/>
+        <p:nvPr/>
+      </p:nvGrpSpPr>
+      <p:grpSpPr>
+        <a:xfrm>
+          <a:off x="0" y="0"/>
+          <a:ext cx="0" cy="0"/>
+          <a:chOff x="0" y="0"/>
+          <a:chExt cx="0" cy="0"/>
+        </a:xfrm>
+      </p:grpSpPr>
+      <p:pic>
+        <p:nvPicPr>
+          <p:cNvPr id="3" name="Picture 2">
+            <a:extLst>
+              <a:ext uri="{FF2B5EF4-FFF2-40B4-BE49-F238E27FC236}">
+                <a16:creationId xmlns:a16="http://schemas.microsoft.com/office/drawing/2014/main" id="{C79BC6A8-167E-4963-880A-FF0CD9F07589}"/>
+              </a:ext>
+            </a:extLst>
+          </p:cNvPr>
+          <p:cNvPicPr>
+            <a:picLocks noChangeAspect="1"/>
+          </p:cNvPicPr>
+          <p:nvPr/>
+        </p:nvPicPr>
+        <p:blipFill>
+          <a:blip r:embed="rId2"/>
+          <a:stretch>
+            <a:fillRect/>
+          </a:stretch>
+        </p:blipFill>
+        <p:spPr>
+          <a:xfrm>
+            <a:off x="512771" y="0"/>
+            <a:ext cx="11166458" cy="6858000"/>
+          </a:xfrm>
+          <a:prstGeom prst="rect">
+            <a:avLst/>
+          </a:prstGeom>
+        </p:spPr>
+      </p:pic>
+      <p:sp>
+        <p:nvSpPr>
+          <p:cNvPr id="5" name="TextBox 4">
+            <a:extLst>
+              <a:ext uri="{FF2B5EF4-FFF2-40B4-BE49-F238E27FC236}">
+                <a16:creationId xmlns:a16="http://schemas.microsoft.com/office/drawing/2014/main" id="{9E39C366-A849-4C70-8D9C-E2E30842862C}"/>
+              </a:ext>
+            </a:extLst>
+          </p:cNvPr>
+          <p:cNvSpPr txBox="1"/>
+          <p:nvPr/>
+        </p:nvSpPr>
+        <p:spPr>
+          <a:xfrm>
+            <a:off x="1271088" y="3530600"/>
+            <a:ext cx="2132512" cy="2462213"/>
+          </a:xfrm>
+          <a:prstGeom prst="rect">
+            <a:avLst/>
+          </a:prstGeom>
+          <a:noFill/>
+        </p:spPr>
+        <p:txBody>
+          <a:bodyPr wrap="square" rtlCol="0">
+            <a:spAutoFit/>
+          </a:bodyPr>
+          <a:lstStyle/>
+          <a:p>
+            <a:r>
+              <a:rPr lang="en-US" sz="1400" b="0" i="0" dirty="0">
+                <a:solidFill>
+                  <a:srgbClr val="786E6E"/>
+                </a:solidFill>
+                <a:effectLst/>
+                <a:latin typeface="Open Sans" panose="020B0606030504020204" pitchFamily="34" charset="0"/>
+              </a:rPr>
+              <a:t>Lorem ipsum dolor sit amet, consectetur adipiscing elit. Ut venenatis eget augue eget vulputate. Proin placerat est mattis dignissim blandit. Duis lectus diam, scelerisque sed posuere blandit, euismod sit amet sem</a:t>
+            </a:r>
+            <a:endParaRPr lang="en-US" sz="1400" dirty="0">
+              <a:solidFill>
+                <a:srgbClr val="786E6E"/>
+              </a:solidFill>
+            </a:endParaRPr>
+          </a:p>
+        </p:txBody>
+      </p:sp>
+    </p:spTree>
+    <p:extLst>
+      <p:ext uri="{BB962C8B-B14F-4D97-AF65-F5344CB8AC3E}">
+        <p14:creationId xmlns:p14="http://schemas.microsoft.com/office/powerpoint/2010/main" val="2963159764"/>
+      </p:ext>
+    </p:extLst>
+  </p:cSld>
+  <p:clrMapOvr>
+    <a:masterClrMapping/>
+  </p:clrMapOvr>
+</p:sld>
+</file>
+
+<file path=ppt/slides/slide35.xml><?xml version="1.0" encoding="utf-8"?>
+<p:sld xmlns:a="http://schemas.openxmlformats.org/drawingml/2006/main" xmlns:r="http://schemas.openxmlformats.org/officeDocument/2006/relationships" xmlns:p="http://schemas.openxmlformats.org/presentationml/2006/main" show="0">
   <p:cSld>
     <p:spTree>
       <p:nvGrpSpPr>
@@ -6963,8 +8747,8 @@
 </p:sld>
 </file>
 
-<file path=ppt/slides/slide31.xml><?xml version="1.0" encoding="utf-8"?>
-<p:sld xmlns:a="http://schemas.openxmlformats.org/drawingml/2006/main" xmlns:r="http://schemas.openxmlformats.org/officeDocument/2006/relationships" xmlns:p="http://schemas.openxmlformats.org/presentationml/2006/main">
+<file path=ppt/slides/slide36.xml><?xml version="1.0" encoding="utf-8"?>
+<p:sld xmlns:a="http://schemas.openxmlformats.org/drawingml/2006/main" xmlns:r="http://schemas.openxmlformats.org/officeDocument/2006/relationships" xmlns:p="http://schemas.openxmlformats.org/presentationml/2006/main" show="0">
   <p:cSld>
     <p:spTree>
       <p:nvGrpSpPr>
@@ -7037,8 +8821,8 @@
 </p:sld>
 </file>
 
-<file path=ppt/slides/slide32.xml><?xml version="1.0" encoding="utf-8"?>
-<p:sld xmlns:a="http://schemas.openxmlformats.org/drawingml/2006/main" xmlns:r="http://schemas.openxmlformats.org/officeDocument/2006/relationships" xmlns:p="http://schemas.openxmlformats.org/presentationml/2006/main">
+<file path=ppt/slides/slide37.xml><?xml version="1.0" encoding="utf-8"?>
+<p:sld xmlns:a="http://schemas.openxmlformats.org/drawingml/2006/main" xmlns:r="http://schemas.openxmlformats.org/officeDocument/2006/relationships" xmlns:p="http://schemas.openxmlformats.org/presentationml/2006/main" show="0">
   <p:cSld>
     <p:spTree>
       <p:nvGrpSpPr>
@@ -7140,11 +8924,14 @@
           <a:lstStyle/>
           <a:p>
             <a:pPr algn="ctr" defTabSz="914400"/>
-            <a:endParaRPr lang="en-US" dirty="0">
-              <a:solidFill>
-                <a:prstClr val="white"/>
-              </a:solidFill>
-            </a:endParaRPr>
+            <a:r>
+              <a:rPr lang="en-US" dirty="0">
+                <a:solidFill>
+                  <a:prstClr val="white"/>
+                </a:solidFill>
+              </a:rPr>
+              <a:t>brown</a:t>
+            </a:r>
           </a:p>
         </p:txBody>
       </p:sp>
@@ -7187,11 +8974,14 @@
           <a:lstStyle/>
           <a:p>
             <a:pPr algn="ctr" defTabSz="914400"/>
-            <a:endParaRPr lang="en-US" dirty="0">
-              <a:solidFill>
-                <a:prstClr val="white"/>
-              </a:solidFill>
-            </a:endParaRPr>
+            <a:r>
+              <a:rPr lang="en-US" dirty="0">
+                <a:solidFill>
+                  <a:prstClr val="white"/>
+                </a:solidFill>
+              </a:rPr>
+              <a:t>Blue</a:t>
+            </a:r>
           </a:p>
         </p:txBody>
       </p:sp>
@@ -7234,11 +9024,14 @@
           <a:lstStyle/>
           <a:p>
             <a:pPr algn="ctr" defTabSz="914400"/>
-            <a:endParaRPr lang="en-US" dirty="0">
-              <a:solidFill>
-                <a:prstClr val="white"/>
-              </a:solidFill>
-            </a:endParaRPr>
+            <a:r>
+              <a:rPr lang="en-US" dirty="0">
+                <a:solidFill>
+                  <a:schemeClr val="bg1"/>
+                </a:solidFill>
+              </a:rPr>
+              <a:t>rust</a:t>
+            </a:r>
           </a:p>
         </p:txBody>
       </p:sp>
@@ -7257,7 +9050,7 @@
             <a:avLst/>
           </a:prstGeom>
           <a:solidFill>
-            <a:schemeClr val="accent3"/>
+            <a:srgbClr val="A5AB81"/>
           </a:solidFill>
         </p:spPr>
         <p:style>
@@ -7281,11 +9074,14 @@
           <a:lstStyle/>
           <a:p>
             <a:pPr algn="ctr" defTabSz="914400"/>
-            <a:endParaRPr lang="en-US" dirty="0">
-              <a:solidFill>
-                <a:prstClr val="white"/>
-              </a:solidFill>
-            </a:endParaRPr>
+            <a:r>
+              <a:rPr lang="en-US" dirty="0">
+                <a:solidFill>
+                  <a:prstClr val="white"/>
+                </a:solidFill>
+              </a:rPr>
+              <a:t>sage</a:t>
+            </a:r>
           </a:p>
         </p:txBody>
       </p:sp>
@@ -7328,11 +9124,14 @@
           <a:lstStyle/>
           <a:p>
             <a:pPr algn="ctr" defTabSz="914400"/>
-            <a:endParaRPr lang="en-US" dirty="0">
-              <a:solidFill>
-                <a:prstClr val="white"/>
-              </a:solidFill>
-            </a:endParaRPr>
+            <a:r>
+              <a:rPr lang="en-US" dirty="0">
+                <a:solidFill>
+                  <a:prstClr val="white"/>
+                </a:solidFill>
+              </a:rPr>
+              <a:t>Gold</a:t>
+            </a:r>
           </a:p>
         </p:txBody>
       </p:sp>
@@ -7375,11 +9174,14 @@
           <a:lstStyle/>
           <a:p>
             <a:pPr algn="ctr" defTabSz="914400"/>
-            <a:endParaRPr lang="en-US" dirty="0">
-              <a:solidFill>
-                <a:prstClr val="white"/>
-              </a:solidFill>
-            </a:endParaRPr>
+            <a:r>
+              <a:rPr lang="en-US" dirty="0">
+                <a:solidFill>
+                  <a:prstClr val="white"/>
+                </a:solidFill>
+              </a:rPr>
+              <a:t>Green</a:t>
+            </a:r>
           </a:p>
         </p:txBody>
       </p:sp>
@@ -7398,7 +9200,7 @@
             <a:avLst/>
           </a:prstGeom>
           <a:solidFill>
-            <a:schemeClr val="accent6"/>
+            <a:srgbClr val="968C8C"/>
           </a:solidFill>
         </p:spPr>
         <p:style>
@@ -7422,11 +9224,14 @@
           <a:lstStyle/>
           <a:p>
             <a:pPr algn="ctr" defTabSz="914400"/>
-            <a:endParaRPr lang="en-US" dirty="0">
-              <a:solidFill>
-                <a:prstClr val="white"/>
-              </a:solidFill>
-            </a:endParaRPr>
+            <a:r>
+              <a:rPr lang="en-US" dirty="0">
+                <a:solidFill>
+                  <a:schemeClr val="bg1"/>
+                </a:solidFill>
+              </a:rPr>
+              <a:t>taupe</a:t>
+            </a:r>
           </a:p>
         </p:txBody>
       </p:sp>
@@ -7688,102 +9493,6 @@
       </p:grpSpPr>
       <p:pic>
         <p:nvPicPr>
-          <p:cNvPr id="5" name="Picture 4">
-            <a:extLst>
-              <a:ext uri="{FF2B5EF4-FFF2-40B4-BE49-F238E27FC236}">
-                <a16:creationId xmlns:a16="http://schemas.microsoft.com/office/drawing/2014/main" id="{234BC3BD-3A62-4DFC-8200-441CFFF0D04C}"/>
-              </a:ext>
-            </a:extLst>
-          </p:cNvPr>
-          <p:cNvPicPr>
-            <a:picLocks noChangeAspect="1"/>
-          </p:cNvPicPr>
-          <p:nvPr/>
-        </p:nvPicPr>
-        <p:blipFill>
-          <a:blip r:embed="rId2"/>
-          <a:stretch>
-            <a:fillRect/>
-          </a:stretch>
-        </p:blipFill>
-        <p:spPr>
-          <a:xfrm>
-            <a:off x="829333" y="1362333"/>
-            <a:ext cx="10533333" cy="4133333"/>
-          </a:xfrm>
-          <a:prstGeom prst="rect">
-            <a:avLst/>
-          </a:prstGeom>
-        </p:spPr>
-      </p:pic>
-      <p:sp>
-        <p:nvSpPr>
-          <p:cNvPr id="6" name="Rectangle 5">
-            <a:extLst>
-              <a:ext uri="{FF2B5EF4-FFF2-40B4-BE49-F238E27FC236}">
-                <a16:creationId xmlns:a16="http://schemas.microsoft.com/office/drawing/2014/main" id="{5E414CA3-EFA0-433B-A527-02A1779B61AB}"/>
-              </a:ext>
-            </a:extLst>
-          </p:cNvPr>
-          <p:cNvSpPr/>
-          <p:nvPr/>
-        </p:nvSpPr>
-        <p:spPr>
-          <a:xfrm>
-            <a:off x="6858000" y="4667250"/>
-            <a:ext cx="1943100" cy="323850"/>
-          </a:xfrm>
-          <a:prstGeom prst="rect">
-            <a:avLst/>
-          </a:prstGeom>
-          <a:solidFill>
-            <a:srgbClr val="FFFFFF"/>
-          </a:solidFill>
-          <a:ln>
-            <a:noFill/>
-          </a:ln>
-        </p:spPr>
-        <p:txBody>
-          <a:bodyPr rtlCol="0" anchor="ctr"/>
-          <a:lstStyle/>
-          <a:p>
-            <a:pPr algn="ctr"/>
-            <a:endParaRPr lang="en-US"/>
-          </a:p>
-        </p:txBody>
-      </p:sp>
-    </p:spTree>
-    <p:extLst>
-      <p:ext uri="{BB962C8B-B14F-4D97-AF65-F5344CB8AC3E}">
-        <p14:creationId xmlns:p14="http://schemas.microsoft.com/office/powerpoint/2010/main" val="2124044676"/>
-      </p:ext>
-    </p:extLst>
-  </p:cSld>
-  <p:clrMapOvr>
-    <a:masterClrMapping/>
-  </p:clrMapOvr>
-</p:sld>
-</file>
-
-<file path=ppt/slides/slide6.xml><?xml version="1.0" encoding="utf-8"?>
-<p:sld xmlns:a="http://schemas.openxmlformats.org/drawingml/2006/main" xmlns:r="http://schemas.openxmlformats.org/officeDocument/2006/relationships" xmlns:p="http://schemas.openxmlformats.org/presentationml/2006/main">
-  <p:cSld>
-    <p:spTree>
-      <p:nvGrpSpPr>
-        <p:cNvPr id="1" name=""/>
-        <p:cNvGrpSpPr/>
-        <p:nvPr/>
-      </p:nvGrpSpPr>
-      <p:grpSpPr>
-        <a:xfrm>
-          <a:off x="0" y="0"/>
-          <a:ext cx="0" cy="0"/>
-          <a:chOff x="0" y="0"/>
-          <a:chExt cx="0" cy="0"/>
-        </a:xfrm>
-      </p:grpSpPr>
-      <p:pic>
-        <p:nvPicPr>
           <p:cNvPr id="3" name="Picture 2">
             <a:extLst>
               <a:ext uri="{FF2B5EF4-FFF2-40B4-BE49-F238E27FC236}">
@@ -7825,7 +9534,7 @@
 </p:sld>
 </file>
 
-<file path=ppt/slides/slide7.xml><?xml version="1.0" encoding="utf-8"?>
+<file path=ppt/slides/slide6.xml><?xml version="1.0" encoding="utf-8"?>
 <p:sld xmlns:a="http://schemas.openxmlformats.org/drawingml/2006/main" xmlns:r="http://schemas.openxmlformats.org/officeDocument/2006/relationships" xmlns:p="http://schemas.openxmlformats.org/presentationml/2006/main">
   <p:cSld>
     <p:spTree>
@@ -7921,7 +9630,7 @@
 </p:sld>
 </file>
 
-<file path=ppt/slides/slide8.xml><?xml version="1.0" encoding="utf-8"?>
+<file path=ppt/slides/slide7.xml><?xml version="1.0" encoding="utf-8"?>
 <p:sld xmlns:a="http://schemas.openxmlformats.org/drawingml/2006/main" xmlns:r="http://schemas.openxmlformats.org/officeDocument/2006/relationships" xmlns:p="http://schemas.openxmlformats.org/presentationml/2006/main">
   <p:cSld>
     <p:spTree>
@@ -8017,7 +9726,7 @@
 </p:sld>
 </file>
 
-<file path=ppt/slides/slide9.xml><?xml version="1.0" encoding="utf-8"?>
+<file path=ppt/slides/slide8.xml><?xml version="1.0" encoding="utf-8"?>
 <p:sld xmlns:a="http://schemas.openxmlformats.org/drawingml/2006/main" xmlns:r="http://schemas.openxmlformats.org/officeDocument/2006/relationships" xmlns:p="http://schemas.openxmlformats.org/presentationml/2006/main">
   <p:cSld>
     <p:spTree>
@@ -8068,6 +9777,85 @@
     <p:extLst>
       <p:ext uri="{BB962C8B-B14F-4D97-AF65-F5344CB8AC3E}">
         <p14:creationId xmlns:p14="http://schemas.microsoft.com/office/powerpoint/2010/main" val="3674041922"/>
+      </p:ext>
+    </p:extLst>
+  </p:cSld>
+  <p:clrMapOvr>
+    <a:masterClrMapping/>
+  </p:clrMapOvr>
+</p:sld>
+</file>
+
+<file path=ppt/slides/slide9.xml><?xml version="1.0" encoding="utf-8"?>
+<p:sld xmlns:a="http://schemas.openxmlformats.org/drawingml/2006/main" xmlns:r="http://schemas.openxmlformats.org/officeDocument/2006/relationships" xmlns:p="http://schemas.openxmlformats.org/presentationml/2006/main">
+  <p:cSld>
+    <p:spTree>
+      <p:nvGrpSpPr>
+        <p:cNvPr id="1" name=""/>
+        <p:cNvGrpSpPr/>
+        <p:nvPr/>
+      </p:nvGrpSpPr>
+      <p:grpSpPr>
+        <a:xfrm>
+          <a:off x="0" y="0"/>
+          <a:ext cx="0" cy="0"/>
+          <a:chOff x="0" y="0"/>
+          <a:chExt cx="0" cy="0"/>
+        </a:xfrm>
+      </p:grpSpPr>
+      <p:sp>
+        <p:nvSpPr>
+          <p:cNvPr id="2" name="TextBox 1">
+            <a:extLst>
+              <a:ext uri="{FF2B5EF4-FFF2-40B4-BE49-F238E27FC236}">
+                <a16:creationId xmlns:a16="http://schemas.microsoft.com/office/drawing/2014/main" id="{DA2BD6CD-CB1E-4C42-AAF0-6B2B67A938CE}"/>
+              </a:ext>
+            </a:extLst>
+          </p:cNvPr>
+          <p:cNvSpPr txBox="1"/>
+          <p:nvPr/>
+        </p:nvSpPr>
+        <p:spPr>
+          <a:xfrm>
+            <a:off x="1270000" y="1217788"/>
+            <a:ext cx="9448800" cy="3279424"/>
+          </a:xfrm>
+          <a:prstGeom prst="rect">
+            <a:avLst/>
+          </a:prstGeom>
+          <a:noFill/>
+        </p:spPr>
+        <p:txBody>
+          <a:bodyPr wrap="square" rtlCol="0">
+            <a:spAutoFit/>
+          </a:bodyPr>
+          <a:lstStyle>
+            <a:defPPr>
+              <a:defRPr lang="en-US"/>
+            </a:defPPr>
+            <a:lvl1pPr algn="ctr">
+              <a:lnSpc>
+                <a:spcPct val="150000"/>
+              </a:lnSpc>
+              <a:defRPr sz="4800" b="1">
+                <a:solidFill>
+                  <a:schemeClr val="accent6"/>
+                </a:solidFill>
+              </a:defRPr>
+            </a:lvl1pPr>
+          </a:lstStyle>
+          <a:p>
+            <a:r>
+              <a:rPr lang="en-US" dirty="0"/>
+              <a:t>Are there options that won’t leave me in debt for the rest of my life?</a:t>
+            </a:r>
+          </a:p>
+        </p:txBody>
+      </p:sp>
+    </p:spTree>
+    <p:extLst>
+      <p:ext uri="{BB962C8B-B14F-4D97-AF65-F5344CB8AC3E}">
+        <p14:creationId xmlns:p14="http://schemas.microsoft.com/office/powerpoint/2010/main" val="612734563"/>
       </p:ext>
     </p:extLst>
   </p:cSld>

</xml_diff>